<commit_message>
Added plots and intro to poster
</commit_message>
<xml_diff>
--- a/Lord_Stanley_Seekers_Final_Poster.pptx
+++ b/Lord_Stanley_Seekers_Final_Poster.pptx
@@ -34,7 +34,7 @@
       </p:grpSpPr>
       <p:sp>
         <p:nvSpPr>
-          <p:cNvPr id="38" name="PlaceHolder 1"/>
+          <p:cNvPr id="36" name="PlaceHolder 1"/>
           <p:cNvSpPr>
             <a:spLocks noGrp="1"/>
           </p:cNvSpPr>
@@ -56,26 +56,20 @@
           <a:p>
             <a:pPr algn="ctr"/>
             <a:r>
-              <a:rPr b="0" lang="en-US" sz="13800" spc="-1" strike="noStrike">
-                <a:solidFill>
-                  <a:srgbClr val="000000"/>
-                </a:solidFill>
-                <a:latin typeface="Gill Sans"/>
+              <a:rPr b="0" lang="en-US" sz="4400" spc="-1" strike="noStrike">
+                <a:latin typeface="Arial"/>
               </a:rPr>
               <a:t>Click to move the slide</a:t>
             </a:r>
-            <a:endParaRPr b="0" lang="en-US" sz="13800" spc="-1" strike="noStrike">
-              <a:solidFill>
-                <a:srgbClr val="000000"/>
-              </a:solidFill>
-              <a:latin typeface="Gill Sans"/>
-            </a:endParaRPr>
-          </a:p>
-        </p:txBody>
-      </p:sp>
-      <p:sp>
-        <p:nvSpPr>
-          <p:cNvPr id="39" name="PlaceHolder 2"/>
+            <a:endParaRPr b="0" lang="en-US" sz="4400" spc="-1" strike="noStrike">
+              <a:latin typeface="Arial"/>
+            </a:endParaRPr>
+          </a:p>
+        </p:txBody>
+      </p:sp>
+      <p:sp>
+        <p:nvSpPr>
+          <p:cNvPr id="37" name="PlaceHolder 2"/>
           <p:cNvSpPr>
             <a:spLocks noGrp="1"/>
           </p:cNvSpPr>
@@ -109,7 +103,7 @@
       </p:sp>
       <p:sp>
         <p:nvSpPr>
-          <p:cNvPr id="40" name="PlaceHolder 3"/>
+          <p:cNvPr id="38" name="PlaceHolder 3"/>
           <p:cNvSpPr>
             <a:spLocks noGrp="1"/>
           </p:cNvSpPr>
@@ -143,7 +137,7 @@
       </p:sp>
       <p:sp>
         <p:nvSpPr>
-          <p:cNvPr id="41" name="PlaceHolder 4"/>
+          <p:cNvPr id="39" name="PlaceHolder 4"/>
           <p:cNvSpPr>
             <a:spLocks noGrp="1"/>
           </p:cNvSpPr>
@@ -178,7 +172,7 @@
       </p:sp>
       <p:sp>
         <p:nvSpPr>
-          <p:cNvPr id="42" name="PlaceHolder 5"/>
+          <p:cNvPr id="40" name="PlaceHolder 5"/>
           <p:cNvSpPr>
             <a:spLocks noGrp="1"/>
           </p:cNvSpPr>
@@ -212,7 +206,7 @@
       </p:sp>
       <p:sp>
         <p:nvSpPr>
-          <p:cNvPr id="43" name="PlaceHolder 6"/>
+          <p:cNvPr id="41" name="PlaceHolder 6"/>
           <p:cNvSpPr>
             <a:spLocks noGrp="1"/>
           </p:cNvSpPr>
@@ -233,7 +227,7 @@
           <a:bodyPr lIns="0" rIns="0" tIns="0" bIns="0" anchor="b"/>
           <a:p>
             <a:pPr algn="r"/>
-            <a:fld id="{7A302AB0-F229-4545-99C0-4D99C778A1B4}" type="slidenum">
+            <a:fld id="{8CB2FF65-EDB2-4EA6-841F-C07727382AE9}" type="slidenum">
               <a:rPr b="0" lang="en-US" sz="1400" spc="-1" strike="noStrike">
                 <a:latin typeface="Times New Roman"/>
               </a:rPr>
@@ -270,14 +264,14 @@
       </p:grpSpPr>
       <p:sp>
         <p:nvSpPr>
-          <p:cNvPr id="52" name="TextShape 1"/>
-          <p:cNvSpPr txBox="1"/>
+          <p:cNvPr id="62" name="CustomShape 1"/>
+          <p:cNvSpPr/>
           <p:nvPr/>
         </p:nvSpPr>
         <p:spPr>
           <a:xfrm>
             <a:off x="3886200" y="8686800"/>
-            <a:ext cx="2971440" cy="456840"/>
+            <a:ext cx="2971080" cy="456480"/>
           </a:xfrm>
           <a:prstGeom prst="rect">
             <a:avLst/>
@@ -287,15 +281,21 @@
             <a:noFill/>
           </a:ln>
         </p:spPr>
-        <p:txBody>
-          <a:bodyPr anchor="b"/>
+        <p:style>
+          <a:lnRef idx="0"/>
+          <a:fillRef idx="0"/>
+          <a:effectRef idx="0"/>
+          <a:fontRef idx="minor"/>
+        </p:style>
+        <p:txBody>
+          <a:bodyPr lIns="90000" rIns="90000" tIns="45000" bIns="45000" anchor="b"/>
           <a:p>
             <a:pPr algn="r">
               <a:lnSpc>
                 <a:spcPct val="100000"/>
               </a:lnSpc>
             </a:pPr>
-            <a:fld id="{1E889151-24C2-4E01-BD39-8F6799A18D65}" type="slidenum">
+            <a:fld id="{7CDA9381-5CC0-4896-BE00-CA2686E80317}" type="slidenum">
               <a:rPr b="0" lang="en-US" sz="1200" spc="-1" strike="noStrike">
                 <a:solidFill>
                   <a:srgbClr val="000000"/>
@@ -306,14 +306,14 @@
               <a:t>&lt;number&gt;</a:t>
             </a:fld>
             <a:endParaRPr b="0" lang="en-US" sz="1200" spc="-1" strike="noStrike">
-              <a:latin typeface="Times New Roman"/>
-            </a:endParaRPr>
-          </a:p>
-        </p:txBody>
-      </p:sp>
-      <p:sp>
-        <p:nvSpPr>
-          <p:cNvPr id="53" name="PlaceHolder 2"/>
+              <a:latin typeface="Arial"/>
+            </a:endParaRPr>
+          </a:p>
+        </p:txBody>
+      </p:sp>
+      <p:sp>
+        <p:nvSpPr>
+          <p:cNvPr id="63" name="PlaceHolder 2"/>
           <p:cNvSpPr>
             <a:spLocks noGrp="1"/>
           </p:cNvSpPr>
@@ -324,16 +324,16 @@
         <p:spPr>
           <a:xfrm>
             <a:off x="857160" y="685800"/>
-            <a:ext cx="5143320" cy="3428640"/>
-          </a:xfrm>
-          <a:prstGeom prst="rect">
-            <a:avLst/>
-          </a:prstGeom>
-        </p:spPr>
-      </p:sp>
-      <p:sp>
-        <p:nvSpPr>
-          <p:cNvPr id="54" name="PlaceHolder 3"/>
+            <a:ext cx="5142960" cy="3428280"/>
+          </a:xfrm>
+          <a:prstGeom prst="rect">
+            <a:avLst/>
+          </a:prstGeom>
+        </p:spPr>
+      </p:sp>
+      <p:sp>
+        <p:nvSpPr>
+          <p:cNvPr id="64" name="PlaceHolder 3"/>
           <p:cNvSpPr>
             <a:spLocks noGrp="1"/>
           </p:cNvSpPr>
@@ -344,14 +344,14 @@
         <p:spPr>
           <a:xfrm>
             <a:off x="914400" y="4343400"/>
-            <a:ext cx="5028840" cy="4114440"/>
-          </a:xfrm>
-          <a:prstGeom prst="rect">
-            <a:avLst/>
-          </a:prstGeom>
-        </p:spPr>
-        <p:txBody>
-          <a:bodyPr/>
+            <a:ext cx="5028480" cy="4114080"/>
+          </a:xfrm>
+          <a:prstGeom prst="rect">
+            <a:avLst/>
+          </a:prstGeom>
+        </p:spPr>
+        <p:txBody>
+          <a:bodyPr lIns="0" rIns="0" tIns="0" bIns="0"/>
           <a:p>
             <a:endParaRPr b="0" lang="en-US" sz="2000" spc="-1" strike="noStrike">
               <a:latin typeface="Arial"/>
@@ -405,7 +405,7 @@
       </p:grpSpPr>
       <p:sp>
         <p:nvSpPr>
-          <p:cNvPr id="23" name="PlaceHolder 1"/>
+          <p:cNvPr id="21" name="PlaceHolder 1"/>
           <p:cNvSpPr>
             <a:spLocks noGrp="1"/>
           </p:cNvSpPr>
@@ -415,8 +415,8 @@
         </p:nvSpPr>
         <p:spPr>
           <a:xfrm>
-            <a:off x="1646280" y="879480"/>
-            <a:ext cx="29625480" cy="3657240"/>
+            <a:off x="1645920" y="875520"/>
+            <a:ext cx="29626200" cy="3664440"/>
           </a:xfrm>
           <a:prstGeom prst="rect">
             <a:avLst/>
@@ -426,18 +426,15 @@
           <a:bodyPr lIns="0" rIns="0" tIns="0" bIns="0" anchor="ctr"/>
           <a:p>
             <a:pPr algn="ctr"/>
-            <a:endParaRPr b="0" lang="en-US" sz="13800" spc="-1" strike="noStrike">
-              <a:solidFill>
-                <a:srgbClr val="000000"/>
-              </a:solidFill>
-              <a:latin typeface="Gill Sans"/>
-            </a:endParaRPr>
-          </a:p>
-        </p:txBody>
-      </p:sp>
-      <p:sp>
-        <p:nvSpPr>
-          <p:cNvPr id="24" name="PlaceHolder 2"/>
+            <a:endParaRPr b="0" lang="en-US" sz="4400" spc="-1" strike="noStrike">
+              <a:latin typeface="Arial"/>
+            </a:endParaRPr>
+          </a:p>
+        </p:txBody>
+      </p:sp>
+      <p:sp>
+        <p:nvSpPr>
+          <p:cNvPr id="22" name="PlaceHolder 2"/>
           <p:cNvSpPr>
             <a:spLocks noGrp="1"/>
           </p:cNvSpPr>
@@ -447,8 +444,8 @@
         </p:nvSpPr>
         <p:spPr>
           <a:xfrm>
-            <a:off x="1646280" y="5121360"/>
-            <a:ext cx="29625480" cy="6908040"/>
+            <a:off x="1645920" y="5135040"/>
+            <a:ext cx="29626200" cy="6071040"/>
           </a:xfrm>
           <a:prstGeom prst="rect">
             <a:avLst/>
@@ -459,23 +456,15 @@
             <a:normAutofit/>
           </a:bodyPr>
           <a:p>
-            <a:pPr algn="ctr">
-              <a:spcBef>
-                <a:spcPts val="1417"/>
-              </a:spcBef>
-            </a:pPr>
-            <a:endParaRPr b="0" lang="en-US" sz="8600" spc="-1" strike="noStrike">
-              <a:solidFill>
-                <a:srgbClr val="000000"/>
-              </a:solidFill>
-              <a:latin typeface="Gill Sans"/>
-            </a:endParaRPr>
-          </a:p>
-        </p:txBody>
-      </p:sp>
-      <p:sp>
-        <p:nvSpPr>
-          <p:cNvPr id="25" name="PlaceHolder 3"/>
+            <a:endParaRPr b="0" lang="en-US" sz="3200" spc="-1" strike="noStrike">
+              <a:latin typeface="Arial"/>
+            </a:endParaRPr>
+          </a:p>
+        </p:txBody>
+      </p:sp>
+      <p:sp>
+        <p:nvSpPr>
+          <p:cNvPr id="23" name="PlaceHolder 3"/>
           <p:cNvSpPr>
             <a:spLocks noGrp="1"/>
           </p:cNvSpPr>
@@ -485,8 +474,8 @@
         </p:nvSpPr>
         <p:spPr>
           <a:xfrm>
-            <a:off x="1646280" y="12686040"/>
-            <a:ext cx="29625480" cy="6908040"/>
+            <a:off x="1645920" y="11783160"/>
+            <a:ext cx="29626200" cy="6071040"/>
           </a:xfrm>
           <a:prstGeom prst="rect">
             <a:avLst/>
@@ -497,16 +486,8 @@
             <a:normAutofit/>
           </a:bodyPr>
           <a:p>
-            <a:pPr algn="ctr">
-              <a:spcBef>
-                <a:spcPts val="1417"/>
-              </a:spcBef>
-            </a:pPr>
-            <a:endParaRPr b="0" lang="en-US" sz="8600" spc="-1" strike="noStrike">
-              <a:solidFill>
-                <a:srgbClr val="000000"/>
-              </a:solidFill>
-              <a:latin typeface="Gill Sans"/>
+            <a:endParaRPr b="0" lang="en-US" sz="3200" spc="-1" strike="noStrike">
+              <a:latin typeface="Arial"/>
             </a:endParaRPr>
           </a:p>
         </p:txBody>
@@ -535,7 +516,7 @@
       </p:grpSpPr>
       <p:sp>
         <p:nvSpPr>
-          <p:cNvPr id="26" name="PlaceHolder 1"/>
+          <p:cNvPr id="24" name="PlaceHolder 1"/>
           <p:cNvSpPr>
             <a:spLocks noGrp="1"/>
           </p:cNvSpPr>
@@ -545,8 +526,8 @@
         </p:nvSpPr>
         <p:spPr>
           <a:xfrm>
-            <a:off x="1646280" y="879480"/>
-            <a:ext cx="29625480" cy="3657240"/>
+            <a:off x="1645920" y="875520"/>
+            <a:ext cx="29626200" cy="3664440"/>
           </a:xfrm>
           <a:prstGeom prst="rect">
             <a:avLst/>
@@ -556,18 +537,15 @@
           <a:bodyPr lIns="0" rIns="0" tIns="0" bIns="0" anchor="ctr"/>
           <a:p>
             <a:pPr algn="ctr"/>
-            <a:endParaRPr b="0" lang="en-US" sz="13800" spc="-1" strike="noStrike">
-              <a:solidFill>
-                <a:srgbClr val="000000"/>
-              </a:solidFill>
-              <a:latin typeface="Gill Sans"/>
-            </a:endParaRPr>
-          </a:p>
-        </p:txBody>
-      </p:sp>
-      <p:sp>
-        <p:nvSpPr>
-          <p:cNvPr id="27" name="PlaceHolder 2"/>
+            <a:endParaRPr b="0" lang="en-US" sz="4400" spc="-1" strike="noStrike">
+              <a:latin typeface="Arial"/>
+            </a:endParaRPr>
+          </a:p>
+        </p:txBody>
+      </p:sp>
+      <p:sp>
+        <p:nvSpPr>
+          <p:cNvPr id="25" name="PlaceHolder 2"/>
           <p:cNvSpPr>
             <a:spLocks noGrp="1"/>
           </p:cNvSpPr>
@@ -577,8 +555,8 @@
         </p:nvSpPr>
         <p:spPr>
           <a:xfrm>
-            <a:off x="1646280" y="5121360"/>
-            <a:ext cx="14456880" cy="6908040"/>
+            <a:off x="1645920" y="5135040"/>
+            <a:ext cx="14457240" cy="6071040"/>
           </a:xfrm>
           <a:prstGeom prst="rect">
             <a:avLst/>
@@ -589,23 +567,15 @@
             <a:normAutofit/>
           </a:bodyPr>
           <a:p>
-            <a:pPr algn="ctr">
-              <a:spcBef>
-                <a:spcPts val="1417"/>
-              </a:spcBef>
-            </a:pPr>
-            <a:endParaRPr b="0" lang="en-US" sz="8600" spc="-1" strike="noStrike">
-              <a:solidFill>
-                <a:srgbClr val="000000"/>
-              </a:solidFill>
-              <a:latin typeface="Gill Sans"/>
-            </a:endParaRPr>
-          </a:p>
-        </p:txBody>
-      </p:sp>
-      <p:sp>
-        <p:nvSpPr>
-          <p:cNvPr id="28" name="PlaceHolder 3"/>
+            <a:endParaRPr b="0" lang="en-US" sz="3200" spc="-1" strike="noStrike">
+              <a:latin typeface="Arial"/>
+            </a:endParaRPr>
+          </a:p>
+        </p:txBody>
+      </p:sp>
+      <p:sp>
+        <p:nvSpPr>
+          <p:cNvPr id="26" name="PlaceHolder 3"/>
           <p:cNvSpPr>
             <a:spLocks noGrp="1"/>
           </p:cNvSpPr>
@@ -615,8 +585,8 @@
         </p:nvSpPr>
         <p:spPr>
           <a:xfrm>
-            <a:off x="16826400" y="5121360"/>
-            <a:ext cx="14456880" cy="6908040"/>
+            <a:off x="16826400" y="5135040"/>
+            <a:ext cx="14457240" cy="6071040"/>
           </a:xfrm>
           <a:prstGeom prst="rect">
             <a:avLst/>
@@ -627,23 +597,15 @@
             <a:normAutofit/>
           </a:bodyPr>
           <a:p>
-            <a:pPr algn="ctr">
-              <a:spcBef>
-                <a:spcPts val="1417"/>
-              </a:spcBef>
-            </a:pPr>
-            <a:endParaRPr b="0" lang="en-US" sz="8600" spc="-1" strike="noStrike">
-              <a:solidFill>
-                <a:srgbClr val="000000"/>
-              </a:solidFill>
-              <a:latin typeface="Gill Sans"/>
-            </a:endParaRPr>
-          </a:p>
-        </p:txBody>
-      </p:sp>
-      <p:sp>
-        <p:nvSpPr>
-          <p:cNvPr id="29" name="PlaceHolder 4"/>
+            <a:endParaRPr b="0" lang="en-US" sz="3200" spc="-1" strike="noStrike">
+              <a:latin typeface="Arial"/>
+            </a:endParaRPr>
+          </a:p>
+        </p:txBody>
+      </p:sp>
+      <p:sp>
+        <p:nvSpPr>
+          <p:cNvPr id="27" name="PlaceHolder 4"/>
           <p:cNvSpPr>
             <a:spLocks noGrp="1"/>
           </p:cNvSpPr>
@@ -653,8 +615,8 @@
         </p:nvSpPr>
         <p:spPr>
           <a:xfrm>
-            <a:off x="1646280" y="12686040"/>
-            <a:ext cx="14456880" cy="6908040"/>
+            <a:off x="1645920" y="11783160"/>
+            <a:ext cx="14457240" cy="6071040"/>
           </a:xfrm>
           <a:prstGeom prst="rect">
             <a:avLst/>
@@ -665,23 +627,15 @@
             <a:normAutofit/>
           </a:bodyPr>
           <a:p>
-            <a:pPr algn="ctr">
-              <a:spcBef>
-                <a:spcPts val="1417"/>
-              </a:spcBef>
-            </a:pPr>
-            <a:endParaRPr b="0" lang="en-US" sz="8600" spc="-1" strike="noStrike">
-              <a:solidFill>
-                <a:srgbClr val="000000"/>
-              </a:solidFill>
-              <a:latin typeface="Gill Sans"/>
-            </a:endParaRPr>
-          </a:p>
-        </p:txBody>
-      </p:sp>
-      <p:sp>
-        <p:nvSpPr>
-          <p:cNvPr id="30" name="PlaceHolder 5"/>
+            <a:endParaRPr b="0" lang="en-US" sz="3200" spc="-1" strike="noStrike">
+              <a:latin typeface="Arial"/>
+            </a:endParaRPr>
+          </a:p>
+        </p:txBody>
+      </p:sp>
+      <p:sp>
+        <p:nvSpPr>
+          <p:cNvPr id="28" name="PlaceHolder 5"/>
           <p:cNvSpPr>
             <a:spLocks noGrp="1"/>
           </p:cNvSpPr>
@@ -691,8 +645,8 @@
         </p:nvSpPr>
         <p:spPr>
           <a:xfrm>
-            <a:off x="16826400" y="12686040"/>
-            <a:ext cx="14456880" cy="6908040"/>
+            <a:off x="16826400" y="11783160"/>
+            <a:ext cx="14457240" cy="6071040"/>
           </a:xfrm>
           <a:prstGeom prst="rect">
             <a:avLst/>
@@ -703,16 +657,8 @@
             <a:normAutofit/>
           </a:bodyPr>
           <a:p>
-            <a:pPr algn="ctr">
-              <a:spcBef>
-                <a:spcPts val="1417"/>
-              </a:spcBef>
-            </a:pPr>
-            <a:endParaRPr b="0" lang="en-US" sz="8600" spc="-1" strike="noStrike">
-              <a:solidFill>
-                <a:srgbClr val="000000"/>
-              </a:solidFill>
-              <a:latin typeface="Gill Sans"/>
+            <a:endParaRPr b="0" lang="en-US" sz="3200" spc="-1" strike="noStrike">
+              <a:latin typeface="Arial"/>
             </a:endParaRPr>
           </a:p>
         </p:txBody>
@@ -741,7 +687,7 @@
       </p:grpSpPr>
       <p:sp>
         <p:nvSpPr>
-          <p:cNvPr id="31" name="PlaceHolder 1"/>
+          <p:cNvPr id="29" name="PlaceHolder 1"/>
           <p:cNvSpPr>
             <a:spLocks noGrp="1"/>
           </p:cNvSpPr>
@@ -751,8 +697,8 @@
         </p:nvSpPr>
         <p:spPr>
           <a:xfrm>
-            <a:off x="1646280" y="879480"/>
-            <a:ext cx="29625480" cy="3657240"/>
+            <a:off x="1645920" y="875520"/>
+            <a:ext cx="29626200" cy="3664440"/>
           </a:xfrm>
           <a:prstGeom prst="rect">
             <a:avLst/>
@@ -762,18 +708,15 @@
           <a:bodyPr lIns="0" rIns="0" tIns="0" bIns="0" anchor="ctr"/>
           <a:p>
             <a:pPr algn="ctr"/>
-            <a:endParaRPr b="0" lang="en-US" sz="13800" spc="-1" strike="noStrike">
-              <a:solidFill>
-                <a:srgbClr val="000000"/>
-              </a:solidFill>
-              <a:latin typeface="Gill Sans"/>
-            </a:endParaRPr>
-          </a:p>
-        </p:txBody>
-      </p:sp>
-      <p:sp>
-        <p:nvSpPr>
-          <p:cNvPr id="32" name="PlaceHolder 2"/>
+            <a:endParaRPr b="0" lang="en-US" sz="4400" spc="-1" strike="noStrike">
+              <a:latin typeface="Arial"/>
+            </a:endParaRPr>
+          </a:p>
+        </p:txBody>
+      </p:sp>
+      <p:sp>
+        <p:nvSpPr>
+          <p:cNvPr id="30" name="PlaceHolder 2"/>
           <p:cNvSpPr>
             <a:spLocks noGrp="1"/>
           </p:cNvSpPr>
@@ -783,8 +726,8 @@
         </p:nvSpPr>
         <p:spPr>
           <a:xfrm>
-            <a:off x="1646280" y="5121360"/>
-            <a:ext cx="9539280" cy="6908040"/>
+            <a:off x="1645920" y="5135040"/>
+            <a:ext cx="9539280" cy="6071040"/>
           </a:xfrm>
           <a:prstGeom prst="rect">
             <a:avLst/>
@@ -795,23 +738,15 @@
             <a:normAutofit/>
           </a:bodyPr>
           <a:p>
-            <a:pPr algn="ctr">
-              <a:spcBef>
-                <a:spcPts val="1417"/>
-              </a:spcBef>
-            </a:pPr>
-            <a:endParaRPr b="0" lang="en-US" sz="8600" spc="-1" strike="noStrike">
-              <a:solidFill>
-                <a:srgbClr val="000000"/>
-              </a:solidFill>
-              <a:latin typeface="Gill Sans"/>
-            </a:endParaRPr>
-          </a:p>
-        </p:txBody>
-      </p:sp>
-      <p:sp>
-        <p:nvSpPr>
-          <p:cNvPr id="33" name="PlaceHolder 3"/>
+            <a:endParaRPr b="0" lang="en-US" sz="3200" spc="-1" strike="noStrike">
+              <a:latin typeface="Arial"/>
+            </a:endParaRPr>
+          </a:p>
+        </p:txBody>
+      </p:sp>
+      <p:sp>
+        <p:nvSpPr>
+          <p:cNvPr id="31" name="PlaceHolder 3"/>
           <p:cNvSpPr>
             <a:spLocks noGrp="1"/>
           </p:cNvSpPr>
@@ -821,8 +756,8 @@
         </p:nvSpPr>
         <p:spPr>
           <a:xfrm>
-            <a:off x="11662920" y="5121360"/>
-            <a:ext cx="9539280" cy="6908040"/>
+            <a:off x="11662560" y="5135040"/>
+            <a:ext cx="9539280" cy="6071040"/>
           </a:xfrm>
           <a:prstGeom prst="rect">
             <a:avLst/>
@@ -833,23 +768,15 @@
             <a:normAutofit/>
           </a:bodyPr>
           <a:p>
-            <a:pPr algn="ctr">
-              <a:spcBef>
-                <a:spcPts val="1417"/>
-              </a:spcBef>
-            </a:pPr>
-            <a:endParaRPr b="0" lang="en-US" sz="8600" spc="-1" strike="noStrike">
-              <a:solidFill>
-                <a:srgbClr val="000000"/>
-              </a:solidFill>
-              <a:latin typeface="Gill Sans"/>
-            </a:endParaRPr>
-          </a:p>
-        </p:txBody>
-      </p:sp>
-      <p:sp>
-        <p:nvSpPr>
-          <p:cNvPr id="34" name="PlaceHolder 4"/>
+            <a:endParaRPr b="0" lang="en-US" sz="3200" spc="-1" strike="noStrike">
+              <a:latin typeface="Arial"/>
+            </a:endParaRPr>
+          </a:p>
+        </p:txBody>
+      </p:sp>
+      <p:sp>
+        <p:nvSpPr>
+          <p:cNvPr id="32" name="PlaceHolder 4"/>
           <p:cNvSpPr>
             <a:spLocks noGrp="1"/>
           </p:cNvSpPr>
@@ -859,8 +786,8 @@
         </p:nvSpPr>
         <p:spPr>
           <a:xfrm>
-            <a:off x="21679560" y="5121360"/>
-            <a:ext cx="9539280" cy="6908040"/>
+            <a:off x="21679200" y="5135040"/>
+            <a:ext cx="9539280" cy="6071040"/>
           </a:xfrm>
           <a:prstGeom prst="rect">
             <a:avLst/>
@@ -871,23 +798,15 @@
             <a:normAutofit/>
           </a:bodyPr>
           <a:p>
-            <a:pPr algn="ctr">
-              <a:spcBef>
-                <a:spcPts val="1417"/>
-              </a:spcBef>
-            </a:pPr>
-            <a:endParaRPr b="0" lang="en-US" sz="8600" spc="-1" strike="noStrike">
-              <a:solidFill>
-                <a:srgbClr val="000000"/>
-              </a:solidFill>
-              <a:latin typeface="Gill Sans"/>
-            </a:endParaRPr>
-          </a:p>
-        </p:txBody>
-      </p:sp>
-      <p:sp>
-        <p:nvSpPr>
-          <p:cNvPr id="35" name="PlaceHolder 5"/>
+            <a:endParaRPr b="0" lang="en-US" sz="3200" spc="-1" strike="noStrike">
+              <a:latin typeface="Arial"/>
+            </a:endParaRPr>
+          </a:p>
+        </p:txBody>
+      </p:sp>
+      <p:sp>
+        <p:nvSpPr>
+          <p:cNvPr id="33" name="PlaceHolder 5"/>
           <p:cNvSpPr>
             <a:spLocks noGrp="1"/>
           </p:cNvSpPr>
@@ -897,8 +816,8 @@
         </p:nvSpPr>
         <p:spPr>
           <a:xfrm>
-            <a:off x="1646280" y="12686040"/>
-            <a:ext cx="9539280" cy="6908040"/>
+            <a:off x="1645920" y="11783160"/>
+            <a:ext cx="9539280" cy="6071040"/>
           </a:xfrm>
           <a:prstGeom prst="rect">
             <a:avLst/>
@@ -909,23 +828,15 @@
             <a:normAutofit/>
           </a:bodyPr>
           <a:p>
-            <a:pPr algn="ctr">
-              <a:spcBef>
-                <a:spcPts val="1417"/>
-              </a:spcBef>
-            </a:pPr>
-            <a:endParaRPr b="0" lang="en-US" sz="8600" spc="-1" strike="noStrike">
-              <a:solidFill>
-                <a:srgbClr val="000000"/>
-              </a:solidFill>
-              <a:latin typeface="Gill Sans"/>
-            </a:endParaRPr>
-          </a:p>
-        </p:txBody>
-      </p:sp>
-      <p:sp>
-        <p:nvSpPr>
-          <p:cNvPr id="36" name="PlaceHolder 6"/>
+            <a:endParaRPr b="0" lang="en-US" sz="3200" spc="-1" strike="noStrike">
+              <a:latin typeface="Arial"/>
+            </a:endParaRPr>
+          </a:p>
+        </p:txBody>
+      </p:sp>
+      <p:sp>
+        <p:nvSpPr>
+          <p:cNvPr id="34" name="PlaceHolder 6"/>
           <p:cNvSpPr>
             <a:spLocks noGrp="1"/>
           </p:cNvSpPr>
@@ -935,8 +846,8 @@
         </p:nvSpPr>
         <p:spPr>
           <a:xfrm>
-            <a:off x="11662920" y="12686040"/>
-            <a:ext cx="9539280" cy="6908040"/>
+            <a:off x="11662560" y="11783160"/>
+            <a:ext cx="9539280" cy="6071040"/>
           </a:xfrm>
           <a:prstGeom prst="rect">
             <a:avLst/>
@@ -947,23 +858,15 @@
             <a:normAutofit/>
           </a:bodyPr>
           <a:p>
-            <a:pPr algn="ctr">
-              <a:spcBef>
-                <a:spcPts val="1417"/>
-              </a:spcBef>
-            </a:pPr>
-            <a:endParaRPr b="0" lang="en-US" sz="8600" spc="-1" strike="noStrike">
-              <a:solidFill>
-                <a:srgbClr val="000000"/>
-              </a:solidFill>
-              <a:latin typeface="Gill Sans"/>
-            </a:endParaRPr>
-          </a:p>
-        </p:txBody>
-      </p:sp>
-      <p:sp>
-        <p:nvSpPr>
-          <p:cNvPr id="37" name="PlaceHolder 7"/>
+            <a:endParaRPr b="0" lang="en-US" sz="3200" spc="-1" strike="noStrike">
+              <a:latin typeface="Arial"/>
+            </a:endParaRPr>
+          </a:p>
+        </p:txBody>
+      </p:sp>
+      <p:sp>
+        <p:nvSpPr>
+          <p:cNvPr id="35" name="PlaceHolder 7"/>
           <p:cNvSpPr>
             <a:spLocks noGrp="1"/>
           </p:cNvSpPr>
@@ -973,8 +876,8 @@
         </p:nvSpPr>
         <p:spPr>
           <a:xfrm>
-            <a:off x="21679560" y="12686040"/>
-            <a:ext cx="9539280" cy="6908040"/>
+            <a:off x="21679200" y="11783160"/>
+            <a:ext cx="9539280" cy="6071040"/>
           </a:xfrm>
           <a:prstGeom prst="rect">
             <a:avLst/>
@@ -985,16 +888,8 @@
             <a:normAutofit/>
           </a:bodyPr>
           <a:p>
-            <a:pPr algn="ctr">
-              <a:spcBef>
-                <a:spcPts val="1417"/>
-              </a:spcBef>
-            </a:pPr>
-            <a:endParaRPr b="0" lang="en-US" sz="8600" spc="-1" strike="noStrike">
-              <a:solidFill>
-                <a:srgbClr val="000000"/>
-              </a:solidFill>
-              <a:latin typeface="Gill Sans"/>
+            <a:endParaRPr b="0" lang="en-US" sz="3200" spc="-1" strike="noStrike">
+              <a:latin typeface="Arial"/>
             </a:endParaRPr>
           </a:p>
         </p:txBody>
@@ -1023,7 +918,7 @@
       </p:grpSpPr>
       <p:sp>
         <p:nvSpPr>
-          <p:cNvPr id="2" name="PlaceHolder 1"/>
+          <p:cNvPr id="0" name="PlaceHolder 1"/>
           <p:cNvSpPr>
             <a:spLocks noGrp="1"/>
           </p:cNvSpPr>
@@ -1033,8 +928,8 @@
         </p:nvSpPr>
         <p:spPr>
           <a:xfrm>
-            <a:off x="1646280" y="879480"/>
-            <a:ext cx="29625480" cy="3657240"/>
+            <a:off x="1645920" y="875520"/>
+            <a:ext cx="29626200" cy="3664440"/>
           </a:xfrm>
           <a:prstGeom prst="rect">
             <a:avLst/>
@@ -1044,18 +939,15 @@
           <a:bodyPr lIns="0" rIns="0" tIns="0" bIns="0" anchor="ctr"/>
           <a:p>
             <a:pPr algn="ctr"/>
-            <a:endParaRPr b="0" lang="en-US" sz="13800" spc="-1" strike="noStrike">
-              <a:solidFill>
-                <a:srgbClr val="000000"/>
-              </a:solidFill>
-              <a:latin typeface="Gill Sans"/>
-            </a:endParaRPr>
-          </a:p>
-        </p:txBody>
-      </p:sp>
-      <p:sp>
-        <p:nvSpPr>
-          <p:cNvPr id="3" name="PlaceHolder 2"/>
+            <a:endParaRPr b="0" lang="en-US" sz="4400" spc="-1" strike="noStrike">
+              <a:latin typeface="Arial"/>
+            </a:endParaRPr>
+          </a:p>
+        </p:txBody>
+      </p:sp>
+      <p:sp>
+        <p:nvSpPr>
+          <p:cNvPr id="1" name="PlaceHolder 2"/>
           <p:cNvSpPr>
             <a:spLocks noGrp="1"/>
           </p:cNvSpPr>
@@ -1065,8 +957,8 @@
         </p:nvSpPr>
         <p:spPr>
           <a:xfrm>
-            <a:off x="1646280" y="5121360"/>
-            <a:ext cx="29625480" cy="14482440"/>
+            <a:off x="1645920" y="5135040"/>
+            <a:ext cx="29626200" cy="12727800"/>
           </a:xfrm>
           <a:prstGeom prst="rect">
             <a:avLst/>
@@ -1106,7 +998,7 @@
       </p:grpSpPr>
       <p:sp>
         <p:nvSpPr>
-          <p:cNvPr id="4" name="PlaceHolder 1"/>
+          <p:cNvPr id="2" name="PlaceHolder 1"/>
           <p:cNvSpPr>
             <a:spLocks noGrp="1"/>
           </p:cNvSpPr>
@@ -1116,8 +1008,8 @@
         </p:nvSpPr>
         <p:spPr>
           <a:xfrm>
-            <a:off x="1646280" y="879480"/>
-            <a:ext cx="29625480" cy="3657240"/>
+            <a:off x="1645920" y="875520"/>
+            <a:ext cx="29626200" cy="3664440"/>
           </a:xfrm>
           <a:prstGeom prst="rect">
             <a:avLst/>
@@ -1127,18 +1019,15 @@
           <a:bodyPr lIns="0" rIns="0" tIns="0" bIns="0" anchor="ctr"/>
           <a:p>
             <a:pPr algn="ctr"/>
-            <a:endParaRPr b="0" lang="en-US" sz="13800" spc="-1" strike="noStrike">
-              <a:solidFill>
-                <a:srgbClr val="000000"/>
-              </a:solidFill>
-              <a:latin typeface="Gill Sans"/>
-            </a:endParaRPr>
-          </a:p>
-        </p:txBody>
-      </p:sp>
-      <p:sp>
-        <p:nvSpPr>
-          <p:cNvPr id="5" name="PlaceHolder 2"/>
+            <a:endParaRPr b="0" lang="en-US" sz="4400" spc="-1" strike="noStrike">
+              <a:latin typeface="Arial"/>
+            </a:endParaRPr>
+          </a:p>
+        </p:txBody>
+      </p:sp>
+      <p:sp>
+        <p:nvSpPr>
+          <p:cNvPr id="3" name="PlaceHolder 2"/>
           <p:cNvSpPr>
             <a:spLocks noGrp="1"/>
           </p:cNvSpPr>
@@ -1148,8 +1037,8 @@
         </p:nvSpPr>
         <p:spPr>
           <a:xfrm>
-            <a:off x="1646280" y="5121360"/>
-            <a:ext cx="29625480" cy="14482440"/>
+            <a:off x="1645920" y="5135040"/>
+            <a:ext cx="29626200" cy="12727800"/>
           </a:xfrm>
           <a:prstGeom prst="rect">
             <a:avLst/>
@@ -1160,16 +1049,8 @@
             <a:normAutofit/>
           </a:bodyPr>
           <a:p>
-            <a:pPr algn="ctr">
-              <a:spcBef>
-                <a:spcPts val="1417"/>
-              </a:spcBef>
-            </a:pPr>
-            <a:endParaRPr b="0" lang="en-US" sz="8600" spc="-1" strike="noStrike">
-              <a:solidFill>
-                <a:srgbClr val="000000"/>
-              </a:solidFill>
-              <a:latin typeface="Gill Sans"/>
+            <a:endParaRPr b="0" lang="en-US" sz="3200" spc="-1" strike="noStrike">
+              <a:latin typeface="Arial"/>
             </a:endParaRPr>
           </a:p>
         </p:txBody>
@@ -1198,7 +1079,7 @@
       </p:grpSpPr>
       <p:sp>
         <p:nvSpPr>
-          <p:cNvPr id="6" name="PlaceHolder 1"/>
+          <p:cNvPr id="4" name="PlaceHolder 1"/>
           <p:cNvSpPr>
             <a:spLocks noGrp="1"/>
           </p:cNvSpPr>
@@ -1208,8 +1089,8 @@
         </p:nvSpPr>
         <p:spPr>
           <a:xfrm>
-            <a:off x="1646280" y="879480"/>
-            <a:ext cx="29625480" cy="3657240"/>
+            <a:off x="1645920" y="875520"/>
+            <a:ext cx="29626200" cy="3664440"/>
           </a:xfrm>
           <a:prstGeom prst="rect">
             <a:avLst/>
@@ -1219,18 +1100,15 @@
           <a:bodyPr lIns="0" rIns="0" tIns="0" bIns="0" anchor="ctr"/>
           <a:p>
             <a:pPr algn="ctr"/>
-            <a:endParaRPr b="0" lang="en-US" sz="13800" spc="-1" strike="noStrike">
-              <a:solidFill>
-                <a:srgbClr val="000000"/>
-              </a:solidFill>
-              <a:latin typeface="Gill Sans"/>
-            </a:endParaRPr>
-          </a:p>
-        </p:txBody>
-      </p:sp>
-      <p:sp>
-        <p:nvSpPr>
-          <p:cNvPr id="7" name="PlaceHolder 2"/>
+            <a:endParaRPr b="0" lang="en-US" sz="4400" spc="-1" strike="noStrike">
+              <a:latin typeface="Arial"/>
+            </a:endParaRPr>
+          </a:p>
+        </p:txBody>
+      </p:sp>
+      <p:sp>
+        <p:nvSpPr>
+          <p:cNvPr id="5" name="PlaceHolder 2"/>
           <p:cNvSpPr>
             <a:spLocks noGrp="1"/>
           </p:cNvSpPr>
@@ -1240,8 +1118,8 @@
         </p:nvSpPr>
         <p:spPr>
           <a:xfrm>
-            <a:off x="1646280" y="5121360"/>
-            <a:ext cx="14456880" cy="14482440"/>
+            <a:off x="1645920" y="5135040"/>
+            <a:ext cx="14457240" cy="12727800"/>
           </a:xfrm>
           <a:prstGeom prst="rect">
             <a:avLst/>
@@ -1252,23 +1130,15 @@
             <a:normAutofit/>
           </a:bodyPr>
           <a:p>
-            <a:pPr algn="ctr">
-              <a:spcBef>
-                <a:spcPts val="1417"/>
-              </a:spcBef>
-            </a:pPr>
-            <a:endParaRPr b="0" lang="en-US" sz="8600" spc="-1" strike="noStrike">
-              <a:solidFill>
-                <a:srgbClr val="000000"/>
-              </a:solidFill>
-              <a:latin typeface="Gill Sans"/>
-            </a:endParaRPr>
-          </a:p>
-        </p:txBody>
-      </p:sp>
-      <p:sp>
-        <p:nvSpPr>
-          <p:cNvPr id="8" name="PlaceHolder 3"/>
+            <a:endParaRPr b="0" lang="en-US" sz="3200" spc="-1" strike="noStrike">
+              <a:latin typeface="Arial"/>
+            </a:endParaRPr>
+          </a:p>
+        </p:txBody>
+      </p:sp>
+      <p:sp>
+        <p:nvSpPr>
+          <p:cNvPr id="6" name="PlaceHolder 3"/>
           <p:cNvSpPr>
             <a:spLocks noGrp="1"/>
           </p:cNvSpPr>
@@ -1278,8 +1148,8 @@
         </p:nvSpPr>
         <p:spPr>
           <a:xfrm>
-            <a:off x="16826400" y="5121360"/>
-            <a:ext cx="14456880" cy="14482440"/>
+            <a:off x="16826400" y="5135040"/>
+            <a:ext cx="14457240" cy="12727800"/>
           </a:xfrm>
           <a:prstGeom prst="rect">
             <a:avLst/>
@@ -1290,16 +1160,8 @@
             <a:normAutofit/>
           </a:bodyPr>
           <a:p>
-            <a:pPr algn="ctr">
-              <a:spcBef>
-                <a:spcPts val="1417"/>
-              </a:spcBef>
-            </a:pPr>
-            <a:endParaRPr b="0" lang="en-US" sz="8600" spc="-1" strike="noStrike">
-              <a:solidFill>
-                <a:srgbClr val="000000"/>
-              </a:solidFill>
-              <a:latin typeface="Gill Sans"/>
+            <a:endParaRPr b="0" lang="en-US" sz="3200" spc="-1" strike="noStrike">
+              <a:latin typeface="Arial"/>
             </a:endParaRPr>
           </a:p>
         </p:txBody>
@@ -1328,7 +1190,7 @@
       </p:grpSpPr>
       <p:sp>
         <p:nvSpPr>
-          <p:cNvPr id="9" name="PlaceHolder 1"/>
+          <p:cNvPr id="7" name="PlaceHolder 1"/>
           <p:cNvSpPr>
             <a:spLocks noGrp="1"/>
           </p:cNvSpPr>
@@ -1338,8 +1200,8 @@
         </p:nvSpPr>
         <p:spPr>
           <a:xfrm>
-            <a:off x="1646280" y="879480"/>
-            <a:ext cx="29625480" cy="3657240"/>
+            <a:off x="1645920" y="875520"/>
+            <a:ext cx="29626200" cy="3664440"/>
           </a:xfrm>
           <a:prstGeom prst="rect">
             <a:avLst/>
@@ -1349,11 +1211,8 @@
           <a:bodyPr lIns="0" rIns="0" tIns="0" bIns="0" anchor="ctr"/>
           <a:p>
             <a:pPr algn="ctr"/>
-            <a:endParaRPr b="0" lang="en-US" sz="13800" spc="-1" strike="noStrike">
-              <a:solidFill>
-                <a:srgbClr val="000000"/>
-              </a:solidFill>
-              <a:latin typeface="Gill Sans"/>
+            <a:endParaRPr b="0" lang="en-US" sz="4400" spc="-1" strike="noStrike">
+              <a:latin typeface="Arial"/>
             </a:endParaRPr>
           </a:p>
         </p:txBody>
@@ -1382,7 +1241,7 @@
       </p:grpSpPr>
       <p:sp>
         <p:nvSpPr>
-          <p:cNvPr id="10" name="PlaceHolder 1"/>
+          <p:cNvPr id="8" name="PlaceHolder 1"/>
           <p:cNvSpPr>
             <a:spLocks noGrp="1"/>
           </p:cNvSpPr>
@@ -1392,8 +1251,8 @@
         </p:nvSpPr>
         <p:spPr>
           <a:xfrm>
-            <a:off x="1646280" y="879480"/>
-            <a:ext cx="29625480" cy="16954200"/>
+            <a:off x="1645920" y="875520"/>
+            <a:ext cx="29626200" cy="16987320"/>
           </a:xfrm>
           <a:prstGeom prst="rect">
             <a:avLst/>
@@ -1433,7 +1292,7 @@
       </p:grpSpPr>
       <p:sp>
         <p:nvSpPr>
-          <p:cNvPr id="11" name="PlaceHolder 1"/>
+          <p:cNvPr id="9" name="PlaceHolder 1"/>
           <p:cNvSpPr>
             <a:spLocks noGrp="1"/>
           </p:cNvSpPr>
@@ -1443,8 +1302,8 @@
         </p:nvSpPr>
         <p:spPr>
           <a:xfrm>
-            <a:off x="1646280" y="879480"/>
-            <a:ext cx="29625480" cy="3657240"/>
+            <a:off x="1645920" y="875520"/>
+            <a:ext cx="29626200" cy="3664440"/>
           </a:xfrm>
           <a:prstGeom prst="rect">
             <a:avLst/>
@@ -1454,18 +1313,15 @@
           <a:bodyPr lIns="0" rIns="0" tIns="0" bIns="0" anchor="ctr"/>
           <a:p>
             <a:pPr algn="ctr"/>
-            <a:endParaRPr b="0" lang="en-US" sz="13800" spc="-1" strike="noStrike">
-              <a:solidFill>
-                <a:srgbClr val="000000"/>
-              </a:solidFill>
-              <a:latin typeface="Gill Sans"/>
-            </a:endParaRPr>
-          </a:p>
-        </p:txBody>
-      </p:sp>
-      <p:sp>
-        <p:nvSpPr>
-          <p:cNvPr id="12" name="PlaceHolder 2"/>
+            <a:endParaRPr b="0" lang="en-US" sz="4400" spc="-1" strike="noStrike">
+              <a:latin typeface="Arial"/>
+            </a:endParaRPr>
+          </a:p>
+        </p:txBody>
+      </p:sp>
+      <p:sp>
+        <p:nvSpPr>
+          <p:cNvPr id="10" name="PlaceHolder 2"/>
           <p:cNvSpPr>
             <a:spLocks noGrp="1"/>
           </p:cNvSpPr>
@@ -1475,8 +1331,8 @@
         </p:nvSpPr>
         <p:spPr>
           <a:xfrm>
-            <a:off x="1646280" y="5121360"/>
-            <a:ext cx="14456880" cy="6908040"/>
+            <a:off x="1645920" y="5135040"/>
+            <a:ext cx="14457240" cy="6071040"/>
           </a:xfrm>
           <a:prstGeom prst="rect">
             <a:avLst/>
@@ -1487,23 +1343,15 @@
             <a:normAutofit/>
           </a:bodyPr>
           <a:p>
-            <a:pPr algn="ctr">
-              <a:spcBef>
-                <a:spcPts val="1417"/>
-              </a:spcBef>
-            </a:pPr>
-            <a:endParaRPr b="0" lang="en-US" sz="8600" spc="-1" strike="noStrike">
-              <a:solidFill>
-                <a:srgbClr val="000000"/>
-              </a:solidFill>
-              <a:latin typeface="Gill Sans"/>
-            </a:endParaRPr>
-          </a:p>
-        </p:txBody>
-      </p:sp>
-      <p:sp>
-        <p:nvSpPr>
-          <p:cNvPr id="13" name="PlaceHolder 3"/>
+            <a:endParaRPr b="0" lang="en-US" sz="3200" spc="-1" strike="noStrike">
+              <a:latin typeface="Arial"/>
+            </a:endParaRPr>
+          </a:p>
+        </p:txBody>
+      </p:sp>
+      <p:sp>
+        <p:nvSpPr>
+          <p:cNvPr id="11" name="PlaceHolder 3"/>
           <p:cNvSpPr>
             <a:spLocks noGrp="1"/>
           </p:cNvSpPr>
@@ -1513,8 +1361,8 @@
         </p:nvSpPr>
         <p:spPr>
           <a:xfrm>
-            <a:off x="16826400" y="5121360"/>
-            <a:ext cx="14456880" cy="14482440"/>
+            <a:off x="16826400" y="5135040"/>
+            <a:ext cx="14457240" cy="12727800"/>
           </a:xfrm>
           <a:prstGeom prst="rect">
             <a:avLst/>
@@ -1525,23 +1373,15 @@
             <a:normAutofit/>
           </a:bodyPr>
           <a:p>
-            <a:pPr algn="ctr">
-              <a:spcBef>
-                <a:spcPts val="1417"/>
-              </a:spcBef>
-            </a:pPr>
-            <a:endParaRPr b="0" lang="en-US" sz="8600" spc="-1" strike="noStrike">
-              <a:solidFill>
-                <a:srgbClr val="000000"/>
-              </a:solidFill>
-              <a:latin typeface="Gill Sans"/>
-            </a:endParaRPr>
-          </a:p>
-        </p:txBody>
-      </p:sp>
-      <p:sp>
-        <p:nvSpPr>
-          <p:cNvPr id="14" name="PlaceHolder 4"/>
+            <a:endParaRPr b="0" lang="en-US" sz="3200" spc="-1" strike="noStrike">
+              <a:latin typeface="Arial"/>
+            </a:endParaRPr>
+          </a:p>
+        </p:txBody>
+      </p:sp>
+      <p:sp>
+        <p:nvSpPr>
+          <p:cNvPr id="12" name="PlaceHolder 4"/>
           <p:cNvSpPr>
             <a:spLocks noGrp="1"/>
           </p:cNvSpPr>
@@ -1551,8 +1391,8 @@
         </p:nvSpPr>
         <p:spPr>
           <a:xfrm>
-            <a:off x="1646280" y="12686040"/>
-            <a:ext cx="14456880" cy="6908040"/>
+            <a:off x="1645920" y="11783160"/>
+            <a:ext cx="14457240" cy="6071040"/>
           </a:xfrm>
           <a:prstGeom prst="rect">
             <a:avLst/>
@@ -1563,16 +1403,8 @@
             <a:normAutofit/>
           </a:bodyPr>
           <a:p>
-            <a:pPr algn="ctr">
-              <a:spcBef>
-                <a:spcPts val="1417"/>
-              </a:spcBef>
-            </a:pPr>
-            <a:endParaRPr b="0" lang="en-US" sz="8600" spc="-1" strike="noStrike">
-              <a:solidFill>
-                <a:srgbClr val="000000"/>
-              </a:solidFill>
-              <a:latin typeface="Gill Sans"/>
+            <a:endParaRPr b="0" lang="en-US" sz="3200" spc="-1" strike="noStrike">
+              <a:latin typeface="Arial"/>
             </a:endParaRPr>
           </a:p>
         </p:txBody>
@@ -1601,7 +1433,7 @@
       </p:grpSpPr>
       <p:sp>
         <p:nvSpPr>
-          <p:cNvPr id="15" name="PlaceHolder 1"/>
+          <p:cNvPr id="13" name="PlaceHolder 1"/>
           <p:cNvSpPr>
             <a:spLocks noGrp="1"/>
           </p:cNvSpPr>
@@ -1611,8 +1443,8 @@
         </p:nvSpPr>
         <p:spPr>
           <a:xfrm>
-            <a:off x="1646280" y="879480"/>
-            <a:ext cx="29625480" cy="3657240"/>
+            <a:off x="1645920" y="875520"/>
+            <a:ext cx="29626200" cy="3664440"/>
           </a:xfrm>
           <a:prstGeom prst="rect">
             <a:avLst/>
@@ -1622,18 +1454,15 @@
           <a:bodyPr lIns="0" rIns="0" tIns="0" bIns="0" anchor="ctr"/>
           <a:p>
             <a:pPr algn="ctr"/>
-            <a:endParaRPr b="0" lang="en-US" sz="13800" spc="-1" strike="noStrike">
-              <a:solidFill>
-                <a:srgbClr val="000000"/>
-              </a:solidFill>
-              <a:latin typeface="Gill Sans"/>
-            </a:endParaRPr>
-          </a:p>
-        </p:txBody>
-      </p:sp>
-      <p:sp>
-        <p:nvSpPr>
-          <p:cNvPr id="16" name="PlaceHolder 2"/>
+            <a:endParaRPr b="0" lang="en-US" sz="4400" spc="-1" strike="noStrike">
+              <a:latin typeface="Arial"/>
+            </a:endParaRPr>
+          </a:p>
+        </p:txBody>
+      </p:sp>
+      <p:sp>
+        <p:nvSpPr>
+          <p:cNvPr id="14" name="PlaceHolder 2"/>
           <p:cNvSpPr>
             <a:spLocks noGrp="1"/>
           </p:cNvSpPr>
@@ -1643,8 +1472,8 @@
         </p:nvSpPr>
         <p:spPr>
           <a:xfrm>
-            <a:off x="1646280" y="5121360"/>
-            <a:ext cx="14456880" cy="14482440"/>
+            <a:off x="1645920" y="5135040"/>
+            <a:ext cx="14457240" cy="12727800"/>
           </a:xfrm>
           <a:prstGeom prst="rect">
             <a:avLst/>
@@ -1655,23 +1484,15 @@
             <a:normAutofit/>
           </a:bodyPr>
           <a:p>
-            <a:pPr algn="ctr">
-              <a:spcBef>
-                <a:spcPts val="1417"/>
-              </a:spcBef>
-            </a:pPr>
-            <a:endParaRPr b="0" lang="en-US" sz="8600" spc="-1" strike="noStrike">
-              <a:solidFill>
-                <a:srgbClr val="000000"/>
-              </a:solidFill>
-              <a:latin typeface="Gill Sans"/>
-            </a:endParaRPr>
-          </a:p>
-        </p:txBody>
-      </p:sp>
-      <p:sp>
-        <p:nvSpPr>
-          <p:cNvPr id="17" name="PlaceHolder 3"/>
+            <a:endParaRPr b="0" lang="en-US" sz="3200" spc="-1" strike="noStrike">
+              <a:latin typeface="Arial"/>
+            </a:endParaRPr>
+          </a:p>
+        </p:txBody>
+      </p:sp>
+      <p:sp>
+        <p:nvSpPr>
+          <p:cNvPr id="15" name="PlaceHolder 3"/>
           <p:cNvSpPr>
             <a:spLocks noGrp="1"/>
           </p:cNvSpPr>
@@ -1681,8 +1502,8 @@
         </p:nvSpPr>
         <p:spPr>
           <a:xfrm>
-            <a:off x="16826400" y="5121360"/>
-            <a:ext cx="14456880" cy="6908040"/>
+            <a:off x="16826400" y="5135040"/>
+            <a:ext cx="14457240" cy="6071040"/>
           </a:xfrm>
           <a:prstGeom prst="rect">
             <a:avLst/>
@@ -1693,23 +1514,15 @@
             <a:normAutofit/>
           </a:bodyPr>
           <a:p>
-            <a:pPr algn="ctr">
-              <a:spcBef>
-                <a:spcPts val="1417"/>
-              </a:spcBef>
-            </a:pPr>
-            <a:endParaRPr b="0" lang="en-US" sz="8600" spc="-1" strike="noStrike">
-              <a:solidFill>
-                <a:srgbClr val="000000"/>
-              </a:solidFill>
-              <a:latin typeface="Gill Sans"/>
-            </a:endParaRPr>
-          </a:p>
-        </p:txBody>
-      </p:sp>
-      <p:sp>
-        <p:nvSpPr>
-          <p:cNvPr id="18" name="PlaceHolder 4"/>
+            <a:endParaRPr b="0" lang="en-US" sz="3200" spc="-1" strike="noStrike">
+              <a:latin typeface="Arial"/>
+            </a:endParaRPr>
+          </a:p>
+        </p:txBody>
+      </p:sp>
+      <p:sp>
+        <p:nvSpPr>
+          <p:cNvPr id="16" name="PlaceHolder 4"/>
           <p:cNvSpPr>
             <a:spLocks noGrp="1"/>
           </p:cNvSpPr>
@@ -1719,8 +1532,8 @@
         </p:nvSpPr>
         <p:spPr>
           <a:xfrm>
-            <a:off x="16826400" y="12686040"/>
-            <a:ext cx="14456880" cy="6908040"/>
+            <a:off x="16826400" y="11783160"/>
+            <a:ext cx="14457240" cy="6071040"/>
           </a:xfrm>
           <a:prstGeom prst="rect">
             <a:avLst/>
@@ -1731,16 +1544,8 @@
             <a:normAutofit/>
           </a:bodyPr>
           <a:p>
-            <a:pPr algn="ctr">
-              <a:spcBef>
-                <a:spcPts val="1417"/>
-              </a:spcBef>
-            </a:pPr>
-            <a:endParaRPr b="0" lang="en-US" sz="8600" spc="-1" strike="noStrike">
-              <a:solidFill>
-                <a:srgbClr val="000000"/>
-              </a:solidFill>
-              <a:latin typeface="Gill Sans"/>
+            <a:endParaRPr b="0" lang="en-US" sz="3200" spc="-1" strike="noStrike">
+              <a:latin typeface="Arial"/>
             </a:endParaRPr>
           </a:p>
         </p:txBody>
@@ -1769,7 +1574,7 @@
       </p:grpSpPr>
       <p:sp>
         <p:nvSpPr>
-          <p:cNvPr id="19" name="PlaceHolder 1"/>
+          <p:cNvPr id="17" name="PlaceHolder 1"/>
           <p:cNvSpPr>
             <a:spLocks noGrp="1"/>
           </p:cNvSpPr>
@@ -1779,8 +1584,8 @@
         </p:nvSpPr>
         <p:spPr>
           <a:xfrm>
-            <a:off x="1646280" y="879480"/>
-            <a:ext cx="29625480" cy="3657240"/>
+            <a:off x="1645920" y="875520"/>
+            <a:ext cx="29626200" cy="3664440"/>
           </a:xfrm>
           <a:prstGeom prst="rect">
             <a:avLst/>
@@ -1790,18 +1595,15 @@
           <a:bodyPr lIns="0" rIns="0" tIns="0" bIns="0" anchor="ctr"/>
           <a:p>
             <a:pPr algn="ctr"/>
-            <a:endParaRPr b="0" lang="en-US" sz="13800" spc="-1" strike="noStrike">
-              <a:solidFill>
-                <a:srgbClr val="000000"/>
-              </a:solidFill>
-              <a:latin typeface="Gill Sans"/>
-            </a:endParaRPr>
-          </a:p>
-        </p:txBody>
-      </p:sp>
-      <p:sp>
-        <p:nvSpPr>
-          <p:cNvPr id="20" name="PlaceHolder 2"/>
+            <a:endParaRPr b="0" lang="en-US" sz="4400" spc="-1" strike="noStrike">
+              <a:latin typeface="Arial"/>
+            </a:endParaRPr>
+          </a:p>
+        </p:txBody>
+      </p:sp>
+      <p:sp>
+        <p:nvSpPr>
+          <p:cNvPr id="18" name="PlaceHolder 2"/>
           <p:cNvSpPr>
             <a:spLocks noGrp="1"/>
           </p:cNvSpPr>
@@ -1811,8 +1613,8 @@
         </p:nvSpPr>
         <p:spPr>
           <a:xfrm>
-            <a:off x="1646280" y="5121360"/>
-            <a:ext cx="14456880" cy="6908040"/>
+            <a:off x="1645920" y="5135040"/>
+            <a:ext cx="14457240" cy="6071040"/>
           </a:xfrm>
           <a:prstGeom prst="rect">
             <a:avLst/>
@@ -1823,23 +1625,15 @@
             <a:normAutofit/>
           </a:bodyPr>
           <a:p>
-            <a:pPr algn="ctr">
-              <a:spcBef>
-                <a:spcPts val="1417"/>
-              </a:spcBef>
-            </a:pPr>
-            <a:endParaRPr b="0" lang="en-US" sz="8600" spc="-1" strike="noStrike">
-              <a:solidFill>
-                <a:srgbClr val="000000"/>
-              </a:solidFill>
-              <a:latin typeface="Gill Sans"/>
-            </a:endParaRPr>
-          </a:p>
-        </p:txBody>
-      </p:sp>
-      <p:sp>
-        <p:nvSpPr>
-          <p:cNvPr id="21" name="PlaceHolder 3"/>
+            <a:endParaRPr b="0" lang="en-US" sz="3200" spc="-1" strike="noStrike">
+              <a:latin typeface="Arial"/>
+            </a:endParaRPr>
+          </a:p>
+        </p:txBody>
+      </p:sp>
+      <p:sp>
+        <p:nvSpPr>
+          <p:cNvPr id="19" name="PlaceHolder 3"/>
           <p:cNvSpPr>
             <a:spLocks noGrp="1"/>
           </p:cNvSpPr>
@@ -1849,8 +1643,8 @@
         </p:nvSpPr>
         <p:spPr>
           <a:xfrm>
-            <a:off x="16826400" y="5121360"/>
-            <a:ext cx="14456880" cy="6908040"/>
+            <a:off x="16826400" y="5135040"/>
+            <a:ext cx="14457240" cy="6071040"/>
           </a:xfrm>
           <a:prstGeom prst="rect">
             <a:avLst/>
@@ -1861,23 +1655,15 @@
             <a:normAutofit/>
           </a:bodyPr>
           <a:p>
-            <a:pPr algn="ctr">
-              <a:spcBef>
-                <a:spcPts val="1417"/>
-              </a:spcBef>
-            </a:pPr>
-            <a:endParaRPr b="0" lang="en-US" sz="8600" spc="-1" strike="noStrike">
-              <a:solidFill>
-                <a:srgbClr val="000000"/>
-              </a:solidFill>
-              <a:latin typeface="Gill Sans"/>
-            </a:endParaRPr>
-          </a:p>
-        </p:txBody>
-      </p:sp>
-      <p:sp>
-        <p:nvSpPr>
-          <p:cNvPr id="22" name="PlaceHolder 4"/>
+            <a:endParaRPr b="0" lang="en-US" sz="3200" spc="-1" strike="noStrike">
+              <a:latin typeface="Arial"/>
+            </a:endParaRPr>
+          </a:p>
+        </p:txBody>
+      </p:sp>
+      <p:sp>
+        <p:nvSpPr>
+          <p:cNvPr id="20" name="PlaceHolder 4"/>
           <p:cNvSpPr>
             <a:spLocks noGrp="1"/>
           </p:cNvSpPr>
@@ -1887,8 +1673,8 @@
         </p:nvSpPr>
         <p:spPr>
           <a:xfrm>
-            <a:off x="1646280" y="12686040"/>
-            <a:ext cx="29625480" cy="6908040"/>
+            <a:off x="1645920" y="11783160"/>
+            <a:ext cx="29626200" cy="6071040"/>
           </a:xfrm>
           <a:prstGeom prst="rect">
             <a:avLst/>
@@ -1899,16 +1685,8 @@
             <a:normAutofit/>
           </a:bodyPr>
           <a:p>
-            <a:pPr algn="ctr">
-              <a:spcBef>
-                <a:spcPts val="1417"/>
-              </a:spcBef>
-            </a:pPr>
-            <a:endParaRPr b="0" lang="en-US" sz="8600" spc="-1" strike="noStrike">
-              <a:solidFill>
-                <a:srgbClr val="000000"/>
-              </a:solidFill>
-              <a:latin typeface="Gill Sans"/>
+            <a:endParaRPr b="0" lang="en-US" sz="3200" spc="-1" strike="noStrike">
+              <a:latin typeface="Arial"/>
             </a:endParaRPr>
           </a:p>
         </p:txBody>
@@ -1942,190 +1720,6 @@
           <a:chExt cx="0" cy="0"/>
         </a:xfrm>
       </p:grpSpPr>
-      <p:sp>
-        <p:nvSpPr>
-          <p:cNvPr id="0" name="PlaceHolder 1"/>
-          <p:cNvSpPr>
-            <a:spLocks noGrp="1"/>
-          </p:cNvSpPr>
-          <p:nvPr>
-            <p:ph type="title"/>
-          </p:nvPr>
-        </p:nvSpPr>
-        <p:spPr>
-          <a:xfrm>
-            <a:off x="1646280" y="879480"/>
-            <a:ext cx="29625480" cy="3657240"/>
-          </a:xfrm>
-          <a:prstGeom prst="rect">
-            <a:avLst/>
-          </a:prstGeom>
-        </p:spPr>
-        <p:txBody>
-          <a:bodyPr lIns="90000" rIns="90000" tIns="45000" bIns="45000"/>
-          <a:p>
-            <a:pPr marL="17640" indent="-17280" algn="ctr">
-              <a:lnSpc>
-                <a:spcPct val="100000"/>
-              </a:lnSpc>
-            </a:pPr>
-            <a:r>
-              <a:rPr b="0" lang="en-US" sz="19700" spc="-1" strike="noStrike">
-                <a:solidFill>
-                  <a:srgbClr val="000000"/>
-                </a:solidFill>
-                <a:latin typeface="Gill Sans"/>
-                <a:ea typeface="ＭＳ Ｐゴシック"/>
-              </a:rPr>
-              <a:t>Click to edit Master title style</a:t>
-            </a:r>
-            <a:endParaRPr b="0" lang="en-US" sz="19700" spc="-1" strike="noStrike">
-              <a:solidFill>
-                <a:srgbClr val="000000"/>
-              </a:solidFill>
-              <a:latin typeface="Gill Sans"/>
-            </a:endParaRPr>
-          </a:p>
-        </p:txBody>
-      </p:sp>
-      <p:sp>
-        <p:nvSpPr>
-          <p:cNvPr id="1" name="PlaceHolder 2"/>
-          <p:cNvSpPr>
-            <a:spLocks noGrp="1"/>
-          </p:cNvSpPr>
-          <p:nvPr>
-            <p:ph type="body"/>
-          </p:nvPr>
-        </p:nvSpPr>
-        <p:spPr>
-          <a:xfrm>
-            <a:off x="1646280" y="5121360"/>
-            <a:ext cx="29625480" cy="14482440"/>
-          </a:xfrm>
-          <a:prstGeom prst="rect">
-            <a:avLst/>
-          </a:prstGeom>
-        </p:spPr>
-        <p:txBody>
-          <a:bodyPr lIns="90000" rIns="90000" tIns="45000" bIns="45000"/>
-          <a:p>
-            <a:pPr marL="343080" indent="-342720" algn="ctr">
-              <a:lnSpc>
-                <a:spcPct val="100000"/>
-              </a:lnSpc>
-            </a:pPr>
-            <a:r>
-              <a:rPr b="0" lang="en-US" sz="8600" spc="-1" strike="noStrike">
-                <a:solidFill>
-                  <a:srgbClr val="000000"/>
-                </a:solidFill>
-                <a:latin typeface="Gill Sans"/>
-                <a:ea typeface="ＭＳ Ｐゴシック"/>
-              </a:rPr>
-              <a:t>Click to edit Master text styles</a:t>
-            </a:r>
-            <a:endParaRPr b="0" lang="en-US" sz="8600" spc="-1" strike="noStrike">
-              <a:solidFill>
-                <a:srgbClr val="000000"/>
-              </a:solidFill>
-              <a:latin typeface="Gill Sans"/>
-            </a:endParaRPr>
-          </a:p>
-          <a:p>
-            <a:pPr marL="743040" indent="-285480" algn="ctr">
-              <a:lnSpc>
-                <a:spcPct val="100000"/>
-              </a:lnSpc>
-            </a:pPr>
-            <a:r>
-              <a:rPr b="0" lang="en-US" sz="8600" spc="-1" strike="noStrike">
-                <a:solidFill>
-                  <a:srgbClr val="000000"/>
-                </a:solidFill>
-                <a:latin typeface="Gill Sans"/>
-                <a:ea typeface="Gill Sans"/>
-              </a:rPr>
-              <a:t>Second level</a:t>
-            </a:r>
-            <a:endParaRPr b="0" lang="en-US" sz="8600" spc="-1" strike="noStrike">
-              <a:solidFill>
-                <a:srgbClr val="000000"/>
-              </a:solidFill>
-              <a:latin typeface="Gill Sans"/>
-            </a:endParaRPr>
-          </a:p>
-          <a:p>
-            <a:pPr marL="1143000" indent="-228240" algn="ctr">
-              <a:lnSpc>
-                <a:spcPct val="100000"/>
-              </a:lnSpc>
-            </a:pPr>
-            <a:r>
-              <a:rPr b="0" lang="en-US" sz="8600" spc="-1" strike="noStrike">
-                <a:solidFill>
-                  <a:srgbClr val="000000"/>
-                </a:solidFill>
-                <a:latin typeface="Gill Sans"/>
-                <a:ea typeface="Gill Sans"/>
-              </a:rPr>
-              <a:t>Third level</a:t>
-            </a:r>
-            <a:endParaRPr b="0" lang="en-US" sz="8600" spc="-1" strike="noStrike">
-              <a:solidFill>
-                <a:srgbClr val="000000"/>
-              </a:solidFill>
-              <a:latin typeface="Gill Sans"/>
-            </a:endParaRPr>
-          </a:p>
-          <a:p>
-            <a:pPr marL="1600200" indent="-228240" algn="ctr">
-              <a:lnSpc>
-                <a:spcPct val="100000"/>
-              </a:lnSpc>
-            </a:pPr>
-            <a:r>
-              <a:rPr b="0" lang="en-US" sz="8600" spc="-1" strike="noStrike">
-                <a:solidFill>
-                  <a:srgbClr val="000000"/>
-                </a:solidFill>
-                <a:latin typeface="Gill Sans"/>
-                <a:ea typeface="Gill Sans"/>
-              </a:rPr>
-              <a:t>Fourth level</a:t>
-            </a:r>
-            <a:endParaRPr b="0" lang="en-US" sz="8600" spc="-1" strike="noStrike">
-              <a:solidFill>
-                <a:srgbClr val="000000"/>
-              </a:solidFill>
-              <a:latin typeface="Gill Sans"/>
-            </a:endParaRPr>
-          </a:p>
-          <a:p>
-            <a:pPr marL="2057400" indent="-228240" algn="ctr">
-              <a:lnSpc>
-                <a:spcPct val="100000"/>
-              </a:lnSpc>
-            </a:pPr>
-            <a:r>
-              <a:rPr b="0" lang="en-US" sz="8600" spc="-1" strike="noStrike">
-                <a:solidFill>
-                  <a:srgbClr val="000000"/>
-                </a:solidFill>
-                <a:latin typeface="Gill Sans"/>
-                <a:ea typeface="Gill Sans"/>
-              </a:rPr>
-              <a:t>Fifth level</a:t>
-            </a:r>
-            <a:endParaRPr b="0" lang="en-US" sz="8600" spc="-1" strike="noStrike">
-              <a:solidFill>
-                <a:srgbClr val="000000"/>
-              </a:solidFill>
-              <a:latin typeface="Gill Sans"/>
-            </a:endParaRPr>
-          </a:p>
-        </p:txBody>
-      </p:sp>
     </p:spTree>
   </p:cSld>
   <p:clrMap bg1="lt1" bg2="lt2" tx1="dk1" tx2="dk2" accent1="accent1" accent2="accent2" accent3="accent3" accent4="accent4" accent5="accent5" accent6="accent6" hlink="hlink" folHlink="folHlink"/>
@@ -2165,14 +1759,14 @@
       </p:grpSpPr>
       <p:sp>
         <p:nvSpPr>
-          <p:cNvPr id="44" name="CustomShape 1"/>
+          <p:cNvPr id="42" name="CustomShape 1"/>
           <p:cNvSpPr/>
           <p:nvPr/>
         </p:nvSpPr>
         <p:spPr>
           <a:xfrm>
             <a:off x="0" y="380880"/>
-            <a:ext cx="32918040" cy="3123720"/>
+            <a:ext cx="32917680" cy="3123360"/>
           </a:xfrm>
           <a:prstGeom prst="rect">
             <a:avLst/>
@@ -2254,14 +1848,14 @@
       </p:sp>
       <p:sp>
         <p:nvSpPr>
-          <p:cNvPr id="45" name="CustomShape 2"/>
+          <p:cNvPr id="43" name="CustomShape 2"/>
           <p:cNvSpPr/>
           <p:nvPr/>
         </p:nvSpPr>
         <p:spPr>
           <a:xfrm>
             <a:off x="503280" y="3936960"/>
-            <a:ext cx="10067400" cy="5587560"/>
+            <a:ext cx="10067040" cy="5587200"/>
           </a:xfrm>
           <a:prstGeom prst="roundRect">
             <a:avLst>
@@ -2301,6 +1895,161 @@
                 <a:ea typeface="ＭＳ Ｐゴシック"/>
               </a:rPr>
               <a:t>Introduction</a:t>
+            </a:r>
+            <a:endParaRPr b="0" lang="en-US" sz="2900" spc="-1" strike="noStrike">
+              <a:latin typeface="Arial"/>
+            </a:endParaRPr>
+          </a:p>
+          <a:p>
+            <a:pPr marL="326880">
+              <a:lnSpc>
+                <a:spcPct val="100000"/>
+              </a:lnSpc>
+              <a:spcBef>
+                <a:spcPts val="862"/>
+              </a:spcBef>
+            </a:pPr>
+            <a:r>
+              <a:rPr b="0" lang="en-US" sz="2400" spc="-1" strike="noStrike">
+                <a:solidFill>
+                  <a:srgbClr val="000000"/>
+                </a:solidFill>
+                <a:latin typeface="Arial"/>
+                <a:ea typeface="ＭＳ Ｐゴシック"/>
+              </a:rPr>
+              <a:t>	</a:t>
+            </a:r>
+            <a:r>
+              <a:rPr b="0" lang="en-US" sz="1500" spc="-1" strike="noStrike">
+                <a:solidFill>
+                  <a:srgbClr val="000000"/>
+                </a:solidFill>
+                <a:latin typeface="Arial"/>
+                <a:ea typeface="ＭＳ Ｐゴシック"/>
+              </a:rPr>
+              <a:t>In the world of sports, predicting a game’s outcome has myriad benefits. It can help coaches and players learn what areas to focus on. It can help sportswriters write articles outlining the predictions for season-final standings. It can help oddsmakers set profitable betting lines. Unfortunately for these professionals, current best NHL game prediction accuracy is less than 70%. This is generally attributed to simple randomness in sports, the general perception of higher parity in the NHL as opposed to other sports (we all know the Patriots are going to be in the postseason, right?), and of course the randomness of ice condition. Bad bounces, breaks, millimetres in difference in skate angle, etc. Nonetheless, 70% isn’t bad, but naturally everyone wants these to be better.</a:t>
+            </a:r>
+            <a:endParaRPr b="0" lang="en-US" sz="1500" spc="-1" strike="noStrike">
+              <a:latin typeface="Arial"/>
+            </a:endParaRPr>
+          </a:p>
+          <a:p>
+            <a:pPr marL="326880">
+              <a:lnSpc>
+                <a:spcPct val="100000"/>
+              </a:lnSpc>
+              <a:spcBef>
+                <a:spcPts val="862"/>
+              </a:spcBef>
+            </a:pPr>
+            <a:r>
+              <a:rPr b="0" lang="en-US" sz="1500" spc="-1" strike="noStrike">
+                <a:solidFill>
+                  <a:srgbClr val="000000"/>
+                </a:solidFill>
+                <a:latin typeface="Arial"/>
+                <a:ea typeface="ＭＳ Ｐゴシック"/>
+              </a:rPr>
+              <a:t>	</a:t>
+            </a:r>
+            <a:r>
+              <a:rPr b="0" lang="en-US" sz="1500" spc="-1" strike="noStrike">
+                <a:solidFill>
+                  <a:srgbClr val="000000"/>
+                </a:solidFill>
+                <a:latin typeface="Arial"/>
+                <a:ea typeface="ＭＳ Ｐゴシック"/>
+              </a:rPr>
+              <a:t>Rather than retreaded an old problem space, which would simply amount to wondering if the science has improved in the past few years, or training algorithms have, we decided to look at a new problem: period prediction. An NHL game is divided into 3 periods of twenty minutes each. If the score is still tied after these three regulation periods, a 4th overtime period is played. Overtime rules have changed a few times in the past couple of decades, but the current standard is a single 5-minute period. We included these in our analyses as well. Despite the fact that statistics will be different between a full 20-minute period and a shorter 5-minute period, we are looking at predictors for each period individually, so our overall models will not be affected by this bundling.</a:t>
+            </a:r>
+            <a:endParaRPr b="0" lang="en-US" sz="1500" spc="-1" strike="noStrike">
+              <a:latin typeface="Arial"/>
+            </a:endParaRPr>
+          </a:p>
+          <a:p>
+            <a:pPr marL="326880">
+              <a:lnSpc>
+                <a:spcPct val="100000"/>
+              </a:lnSpc>
+              <a:spcBef>
+                <a:spcPts val="862"/>
+              </a:spcBef>
+            </a:pPr>
+            <a:r>
+              <a:rPr b="0" lang="en-US" sz="1500" spc="-1" strike="noStrike">
+                <a:solidFill>
+                  <a:srgbClr val="000000"/>
+                </a:solidFill>
+                <a:latin typeface="Arial"/>
+                <a:ea typeface="ＭＳ Ｐゴシック"/>
+              </a:rPr>
+              <a:t>	</a:t>
+            </a:r>
+            <a:r>
+              <a:rPr b="0" lang="en-US" sz="1500" spc="-1" strike="noStrike">
+                <a:solidFill>
+                  <a:srgbClr val="000000"/>
+                </a:solidFill>
+                <a:latin typeface="Arial"/>
+                <a:ea typeface="ＭＳ Ｐゴシック"/>
+              </a:rPr>
+              <a:t>The advantage to such a prediction might be immediately obvious to a coach, although probably not as useful for Vegas. If your team enters the second period trailing by 2, how do you overcome that lead? If hits have a high correlation with success, maybe play more aggressively. If blocked shots have a low correlation, don’t worry about taking too many bad shots at the risk of turning the puck over. Our goal is to see if we can find which statistics, taken from the standard metrics used in NHL statkeeping, can be beneficial in predicting the outcome of a period.</a:t>
+            </a:r>
+            <a:endParaRPr b="0" lang="en-US" sz="1500" spc="-1" strike="noStrike">
+              <a:latin typeface="Arial"/>
+            </a:endParaRPr>
+          </a:p>
+        </p:txBody>
+      </p:sp>
+      <p:sp>
+        <p:nvSpPr>
+          <p:cNvPr id="44" name="CustomShape 3"/>
+          <p:cNvSpPr/>
+          <p:nvPr/>
+        </p:nvSpPr>
+        <p:spPr>
+          <a:xfrm>
+            <a:off x="22345560" y="3936960"/>
+            <a:ext cx="10067040" cy="5587200"/>
+          </a:xfrm>
+          <a:prstGeom prst="roundRect">
+            <a:avLst>
+              <a:gd name="adj" fmla="val 2269"/>
+            </a:avLst>
+          </a:prstGeom>
+          <a:solidFill>
+            <a:srgbClr val="eef7f8"/>
+          </a:solidFill>
+          <a:ln w="76320">
+            <a:solidFill>
+              <a:schemeClr val="tx1"/>
+            </a:solidFill>
+            <a:round/>
+          </a:ln>
+        </p:spPr>
+        <p:style>
+          <a:lnRef idx="0"/>
+          <a:fillRef idx="0"/>
+          <a:effectRef idx="0"/>
+          <a:fontRef idx="minor"/>
+        </p:style>
+        <p:txBody>
+          <a:bodyPr lIns="0" rIns="0" tIns="0" bIns="0"/>
+          <a:p>
+            <a:pPr marL="326880" algn="ctr">
+              <a:lnSpc>
+                <a:spcPct val="100000"/>
+              </a:lnSpc>
+            </a:pPr>
+            <a:r>
+              <a:rPr b="1" lang="en-US" sz="2900" spc="-1" strike="noStrike">
+                <a:solidFill>
+                  <a:srgbClr val="000000"/>
+                </a:solidFill>
+                <a:latin typeface="Arial"/>
+                <a:ea typeface="ＭＳ Ｐゴシック"/>
+              </a:rPr>
+              <a:t>Results</a:t>
             </a:r>
             <a:endParaRPr b="0" lang="en-US" sz="2900" spc="-1" strike="noStrike">
               <a:latin typeface="Arial"/>
@@ -2356,14 +2105,426 @@
       </p:sp>
       <p:sp>
         <p:nvSpPr>
-          <p:cNvPr id="46" name="CustomShape 3"/>
+          <p:cNvPr id="45" name="CustomShape 4"/>
           <p:cNvSpPr/>
           <p:nvPr/>
         </p:nvSpPr>
         <p:spPr>
           <a:xfrm>
-            <a:off x="503280" y="10466280"/>
-            <a:ext cx="10067400" cy="11097720"/>
+            <a:off x="22345560" y="17221320"/>
+            <a:ext cx="10067040" cy="4266360"/>
+          </a:xfrm>
+          <a:prstGeom prst="roundRect">
+            <a:avLst>
+              <a:gd name="adj" fmla="val 2269"/>
+            </a:avLst>
+          </a:prstGeom>
+          <a:solidFill>
+            <a:srgbClr val="eef7f8"/>
+          </a:solidFill>
+          <a:ln w="76320">
+            <a:solidFill>
+              <a:schemeClr val="tx1"/>
+            </a:solidFill>
+            <a:round/>
+          </a:ln>
+        </p:spPr>
+        <p:style>
+          <a:lnRef idx="0"/>
+          <a:fillRef idx="0"/>
+          <a:effectRef idx="0"/>
+          <a:fontRef idx="minor"/>
+        </p:style>
+        <p:txBody>
+          <a:bodyPr lIns="0" rIns="0" tIns="0" bIns="0"/>
+          <a:p>
+            <a:pPr marL="976320" indent="-648720" algn="ctr">
+              <a:lnSpc>
+                <a:spcPct val="100000"/>
+              </a:lnSpc>
+            </a:pPr>
+            <a:r>
+              <a:rPr b="1" lang="en-US" sz="2600" spc="-1" strike="noStrike">
+                <a:solidFill>
+                  <a:srgbClr val="000000"/>
+                </a:solidFill>
+                <a:latin typeface="Arial"/>
+                <a:ea typeface="ＭＳ Ｐゴシック"/>
+              </a:rPr>
+              <a:t>References</a:t>
+            </a:r>
+            <a:endParaRPr b="0" lang="en-US" sz="2600" spc="-1" strike="noStrike">
+              <a:latin typeface="Arial"/>
+            </a:endParaRPr>
+          </a:p>
+          <a:p>
+            <a:pPr marL="976320" indent="-648720">
+              <a:lnSpc>
+                <a:spcPct val="100000"/>
+              </a:lnSpc>
+              <a:spcBef>
+                <a:spcPts val="862"/>
+              </a:spcBef>
+            </a:pPr>
+            <a:r>
+              <a:rPr b="0" lang="en-US" sz="1800" spc="-1" strike="noStrike">
+                <a:solidFill>
+                  <a:srgbClr val="000000"/>
+                </a:solidFill>
+                <a:latin typeface="Arial"/>
+                <a:ea typeface="ＭＳ Ｐゴシック"/>
+              </a:rPr>
+              <a:t>Lorem ipsum dolor sit amet, consectetuer adipiscing elit.</a:t>
+            </a:r>
+            <a:endParaRPr b="0" lang="en-US" sz="1800" spc="-1" strike="noStrike">
+              <a:latin typeface="Arial"/>
+            </a:endParaRPr>
+          </a:p>
+          <a:p>
+            <a:pPr marL="976320" indent="-648720">
+              <a:lnSpc>
+                <a:spcPct val="100000"/>
+              </a:lnSpc>
+              <a:spcBef>
+                <a:spcPts val="862"/>
+              </a:spcBef>
+            </a:pPr>
+            <a:r>
+              <a:rPr b="0" lang="en-US" sz="1800" spc="-1" strike="noStrike">
+                <a:solidFill>
+                  <a:srgbClr val="000000"/>
+                </a:solidFill>
+                <a:latin typeface="Arial"/>
+                <a:ea typeface="ＭＳ Ｐゴシック"/>
+              </a:rPr>
+              <a:t>Vivamus sagittis, risus et mattis convallis, leo metus molestie sapien, molestie facilisis mi tort</a:t>
+            </a:r>
+            <a:endParaRPr b="0" lang="en-US" sz="1800" spc="-1" strike="noStrike">
+              <a:latin typeface="Arial"/>
+            </a:endParaRPr>
+          </a:p>
+          <a:p>
+            <a:pPr marL="976320" indent="-648720">
+              <a:lnSpc>
+                <a:spcPct val="100000"/>
+              </a:lnSpc>
+              <a:spcBef>
+                <a:spcPts val="862"/>
+              </a:spcBef>
+            </a:pPr>
+            <a:r>
+              <a:rPr b="0" lang="en-US" sz="1800" spc="-1" strike="noStrike">
+                <a:solidFill>
+                  <a:srgbClr val="000000"/>
+                </a:solidFill>
+                <a:latin typeface="Arial"/>
+                <a:ea typeface="ＭＳ Ｐゴシック"/>
+              </a:rPr>
+              <a:t>or in arcu. Integer iaculis magna a arcu. Duis nibh. Donec tempus pede nec massa. Donec eget felis id ante consequat viverra.</a:t>
+            </a:r>
+            <a:endParaRPr b="0" lang="en-US" sz="1800" spc="-1" strike="noStrike">
+              <a:latin typeface="Arial"/>
+            </a:endParaRPr>
+          </a:p>
+          <a:p>
+            <a:pPr marL="976320" indent="-648720">
+              <a:lnSpc>
+                <a:spcPct val="100000"/>
+              </a:lnSpc>
+              <a:spcBef>
+                <a:spcPts val="862"/>
+              </a:spcBef>
+            </a:pPr>
+            <a:r>
+              <a:rPr b="0" lang="en-US" sz="1800" spc="-1" strike="noStrike">
+                <a:solidFill>
+                  <a:srgbClr val="000000"/>
+                </a:solidFill>
+                <a:latin typeface="Arial"/>
+                <a:ea typeface="ＭＳ Ｐゴシック"/>
+              </a:rPr>
+              <a:t>Proin adipiscing. Aliquam mattis magna a justo. </a:t>
+            </a:r>
+            <a:endParaRPr b="0" lang="en-US" sz="1800" spc="-1" strike="noStrike">
+              <a:latin typeface="Arial"/>
+            </a:endParaRPr>
+          </a:p>
+          <a:p>
+            <a:pPr marL="976320" indent="-648720">
+              <a:lnSpc>
+                <a:spcPct val="100000"/>
+              </a:lnSpc>
+              <a:spcBef>
+                <a:spcPts val="862"/>
+              </a:spcBef>
+            </a:pPr>
+            <a:r>
+              <a:rPr b="0" lang="en-US" sz="1800" spc="-1" strike="noStrike">
+                <a:solidFill>
+                  <a:srgbClr val="000000"/>
+                </a:solidFill>
+                <a:latin typeface="Arial"/>
+                <a:ea typeface="ＭＳ Ｐゴシック"/>
+              </a:rPr>
+              <a:t>Mauris nunc. Class aptent taciti sociosqu ad litora torquent per conubia nostra, per inceptos hymenaeos. Praesent at ante.</a:t>
+            </a:r>
+            <a:endParaRPr b="0" lang="en-US" sz="1800" spc="-1" strike="noStrike">
+              <a:latin typeface="Arial"/>
+            </a:endParaRPr>
+          </a:p>
+          <a:p>
+            <a:pPr marL="976320" indent="-648720">
+              <a:lnSpc>
+                <a:spcPct val="100000"/>
+              </a:lnSpc>
+              <a:spcBef>
+                <a:spcPts val="862"/>
+              </a:spcBef>
+            </a:pPr>
+            <a:r>
+              <a:rPr b="0" lang="en-US" sz="1800" spc="-1" strike="noStrike">
+                <a:solidFill>
+                  <a:srgbClr val="000000"/>
+                </a:solidFill>
+                <a:latin typeface="Arial"/>
+                <a:ea typeface="ＭＳ Ｐゴシック"/>
+              </a:rPr>
+              <a:t>Quisque elit pede, gravida in, congue vitae, consectetuer a, lectus. Aenean in massa. Sed diam. Class aptent taciti sociosqu ad litora torquent per conubia nostra, per inceptos hymenaeos.</a:t>
+            </a:r>
+            <a:endParaRPr b="0" lang="en-US" sz="1800" spc="-1" strike="noStrike">
+              <a:latin typeface="Arial"/>
+            </a:endParaRPr>
+          </a:p>
+        </p:txBody>
+      </p:sp>
+      <p:pic>
+        <p:nvPicPr>
+          <p:cNvPr id="46" name="Picture 1" descr=""/>
+          <p:cNvPicPr/>
+          <p:nvPr/>
+        </p:nvPicPr>
+        <p:blipFill>
+          <a:blip r:embed="rId1"/>
+          <a:stretch/>
+        </p:blipFill>
+        <p:spPr>
+          <a:xfrm>
+            <a:off x="2971800" y="507960"/>
+            <a:ext cx="4799880" cy="2463120"/>
+          </a:xfrm>
+          <a:prstGeom prst="rect">
+            <a:avLst/>
+          </a:prstGeom>
+          <a:ln>
+            <a:noFill/>
+          </a:ln>
+        </p:spPr>
+      </p:pic>
+      <p:pic>
+        <p:nvPicPr>
+          <p:cNvPr id="47" name="Picture 2" descr=""/>
+          <p:cNvPicPr/>
+          <p:nvPr/>
+        </p:nvPicPr>
+        <p:blipFill>
+          <a:blip r:embed="rId2"/>
+          <a:stretch/>
+        </p:blipFill>
+        <p:spPr>
+          <a:xfrm>
+            <a:off x="25526880" y="457200"/>
+            <a:ext cx="3961800" cy="2971080"/>
+          </a:xfrm>
+          <a:prstGeom prst="rect">
+            <a:avLst/>
+          </a:prstGeom>
+          <a:ln>
+            <a:noFill/>
+          </a:ln>
+        </p:spPr>
+      </p:pic>
+      <p:sp>
+        <p:nvSpPr>
+          <p:cNvPr id="48" name="TextShape 5"/>
+          <p:cNvSpPr txBox="1"/>
+          <p:nvPr/>
+        </p:nvSpPr>
+        <p:spPr>
+          <a:xfrm>
+            <a:off x="18786600" y="7936560"/>
+            <a:ext cx="1695960" cy="1573200"/>
+          </a:xfrm>
+          <a:prstGeom prst="rect">
+            <a:avLst/>
+          </a:prstGeom>
+          <a:noFill/>
+          <a:ln>
+            <a:noFill/>
+          </a:ln>
+        </p:spPr>
+      </p:sp>
+      <p:sp>
+        <p:nvSpPr>
+          <p:cNvPr id="49" name="TextShape 6"/>
+          <p:cNvSpPr txBox="1"/>
+          <p:nvPr/>
+        </p:nvSpPr>
+        <p:spPr>
+          <a:xfrm>
+            <a:off x="12893040" y="3383280"/>
+            <a:ext cx="6074280" cy="4785840"/>
+          </a:xfrm>
+          <a:prstGeom prst="rect">
+            <a:avLst/>
+          </a:prstGeom>
+          <a:noFill/>
+          <a:ln>
+            <a:noFill/>
+          </a:ln>
+        </p:spPr>
+      </p:sp>
+      <p:sp>
+        <p:nvSpPr>
+          <p:cNvPr id="50" name="TextShape 7"/>
+          <p:cNvSpPr txBox="1"/>
+          <p:nvPr/>
+        </p:nvSpPr>
+        <p:spPr>
+          <a:xfrm>
+            <a:off x="18786600" y="7936560"/>
+            <a:ext cx="180720" cy="232560"/>
+          </a:xfrm>
+          <a:prstGeom prst="rect">
+            <a:avLst/>
+          </a:prstGeom>
+          <a:noFill/>
+          <a:ln>
+            <a:noFill/>
+          </a:ln>
+        </p:spPr>
+      </p:sp>
+      <p:pic>
+        <p:nvPicPr>
+          <p:cNvPr id="51" name="" descr=""/>
+          <p:cNvPicPr/>
+          <p:nvPr/>
+        </p:nvPicPr>
+        <p:blipFill>
+          <a:blip r:embed="rId3"/>
+          <a:stretch/>
+        </p:blipFill>
+        <p:spPr>
+          <a:xfrm>
+            <a:off x="17388360" y="16733520"/>
+            <a:ext cx="4374360" cy="4389120"/>
+          </a:xfrm>
+          <a:prstGeom prst="rect">
+            <a:avLst/>
+          </a:prstGeom>
+          <a:ln>
+            <a:noFill/>
+          </a:ln>
+        </p:spPr>
+      </p:pic>
+      <p:pic>
+        <p:nvPicPr>
+          <p:cNvPr id="52" name="" descr=""/>
+          <p:cNvPicPr/>
+          <p:nvPr/>
+        </p:nvPicPr>
+        <p:blipFill>
+          <a:blip r:embed="rId4"/>
+          <a:stretch/>
+        </p:blipFill>
+        <p:spPr>
+          <a:xfrm>
+            <a:off x="11178000" y="3661560"/>
+            <a:ext cx="10241280" cy="7677000"/>
+          </a:xfrm>
+          <a:prstGeom prst="rect">
+            <a:avLst/>
+          </a:prstGeom>
+          <a:ln>
+            <a:noFill/>
+          </a:ln>
+        </p:spPr>
+      </p:pic>
+      <p:sp>
+        <p:nvSpPr>
+          <p:cNvPr id="53" name="TextShape 8"/>
+          <p:cNvSpPr txBox="1"/>
+          <p:nvPr/>
+        </p:nvSpPr>
+        <p:spPr>
+          <a:xfrm>
+            <a:off x="18786600" y="15145200"/>
+            <a:ext cx="180720" cy="232560"/>
+          </a:xfrm>
+          <a:prstGeom prst="rect">
+            <a:avLst/>
+          </a:prstGeom>
+          <a:noFill/>
+          <a:ln>
+            <a:noFill/>
+          </a:ln>
+        </p:spPr>
+      </p:sp>
+      <p:pic>
+        <p:nvPicPr>
+          <p:cNvPr id="54" name="" descr=""/>
+          <p:cNvPicPr/>
+          <p:nvPr/>
+        </p:nvPicPr>
+        <p:blipFill>
+          <a:blip r:embed="rId5"/>
+          <a:stretch/>
+        </p:blipFill>
+        <p:spPr>
+          <a:xfrm>
+            <a:off x="10623960" y="11405520"/>
+            <a:ext cx="6217560" cy="4663080"/>
+          </a:xfrm>
+          <a:prstGeom prst="rect">
+            <a:avLst/>
+          </a:prstGeom>
+          <a:ln>
+            <a:noFill/>
+          </a:ln>
+        </p:spPr>
+      </p:pic>
+      <p:pic>
+        <p:nvPicPr>
+          <p:cNvPr id="55" name="" descr=""/>
+          <p:cNvPicPr/>
+          <p:nvPr/>
+        </p:nvPicPr>
+        <p:blipFill>
+          <a:blip r:embed="rId6"/>
+          <a:stretch/>
+        </p:blipFill>
+        <p:spPr>
+          <a:xfrm>
+            <a:off x="16315200" y="11373480"/>
+            <a:ext cx="6217920" cy="4663440"/>
+          </a:xfrm>
+          <a:prstGeom prst="rect">
+            <a:avLst/>
+          </a:prstGeom>
+          <a:ln>
+            <a:noFill/>
+          </a:ln>
+        </p:spPr>
+      </p:pic>
+      <p:sp>
+        <p:nvSpPr>
+          <p:cNvPr id="56" name="CustomShape 9"/>
+          <p:cNvSpPr/>
+          <p:nvPr/>
+        </p:nvSpPr>
+        <p:spPr>
+          <a:xfrm>
+            <a:off x="22345560" y="10312560"/>
+            <a:ext cx="10067040" cy="6552360"/>
           </a:xfrm>
           <a:prstGeom prst="roundRect">
             <a:avLst>
@@ -2402,7 +2563,7 @@
                 <a:latin typeface="Arial"/>
                 <a:ea typeface="ＭＳ Ｐゴシック"/>
               </a:rPr>
-              <a:t>Methods</a:t>
+              <a:t>Discussion</a:t>
             </a:r>
             <a:endParaRPr b="0" lang="en-US" sz="2900" spc="-1" strike="noStrike">
               <a:latin typeface="Arial"/>
@@ -2458,14 +2619,14 @@
       </p:sp>
       <p:sp>
         <p:nvSpPr>
-          <p:cNvPr id="47" name="CustomShape 4"/>
+          <p:cNvPr id="57" name="CustomShape 10"/>
           <p:cNvSpPr/>
           <p:nvPr/>
         </p:nvSpPr>
         <p:spPr>
           <a:xfrm>
-            <a:off x="22345560" y="3936960"/>
-            <a:ext cx="10067400" cy="5587560"/>
+            <a:off x="503280" y="10466280"/>
+            <a:ext cx="10067040" cy="11097360"/>
           </a:xfrm>
           <a:prstGeom prst="roundRect">
             <a:avLst>
@@ -2504,7 +2665,7 @@
                 <a:latin typeface="Arial"/>
                 <a:ea typeface="ＭＳ Ｐゴシック"/>
               </a:rPr>
-              <a:t>Results</a:t>
+              <a:t>Methods</a:t>
             </a:r>
             <a:endParaRPr b="0" lang="en-US" sz="2900" spc="-1" strike="noStrike">
               <a:latin typeface="Arial"/>
@@ -2558,348 +2719,112 @@
           </a:p>
         </p:txBody>
       </p:sp>
-      <p:sp>
-        <p:nvSpPr>
-          <p:cNvPr id="48" name="CustomShape 5"/>
-          <p:cNvSpPr/>
+      <p:grpSp>
+        <p:nvGrpSpPr>
+          <p:cNvPr id="58" name="Group 11"/>
+          <p:cNvGrpSpPr/>
           <p:nvPr/>
-        </p:nvSpPr>
-        <p:spPr>
-          <a:xfrm>
-            <a:off x="22345560" y="10312560"/>
-            <a:ext cx="10067400" cy="6552720"/>
-          </a:xfrm>
-          <a:prstGeom prst="roundRect">
-            <a:avLst>
-              <a:gd name="adj" fmla="val 2269"/>
-            </a:avLst>
-          </a:prstGeom>
-          <a:solidFill>
-            <a:srgbClr val="eef7f8"/>
-          </a:solidFill>
-          <a:ln w="76320">
-            <a:solidFill>
-              <a:schemeClr val="tx1"/>
-            </a:solidFill>
-            <a:round/>
-          </a:ln>
-        </p:spPr>
-        <p:style>
-          <a:lnRef idx="0"/>
-          <a:fillRef idx="0"/>
-          <a:effectRef idx="0"/>
-          <a:fontRef idx="minor"/>
-        </p:style>
-        <p:txBody>
-          <a:bodyPr lIns="0" rIns="0" tIns="0" bIns="0"/>
-          <a:p>
-            <a:pPr marL="326880" algn="ctr">
-              <a:lnSpc>
-                <a:spcPct val="100000"/>
-              </a:lnSpc>
-            </a:pPr>
-            <a:r>
-              <a:rPr b="1" lang="en-US" sz="2900" spc="-1" strike="noStrike">
-                <a:solidFill>
-                  <a:srgbClr val="000000"/>
-                </a:solidFill>
+        </p:nvGrpSpPr>
+        <p:grpSpPr>
+          <a:xfrm>
+            <a:off x="11053440" y="16714080"/>
+            <a:ext cx="5802840" cy="4572000"/>
+            <a:chOff x="11053440" y="16714080"/>
+            <a:chExt cx="5802840" cy="4572000"/>
+          </a:xfrm>
+        </p:grpSpPr>
+        <p:pic>
+          <p:nvPicPr>
+            <p:cNvPr id="59" name="" descr=""/>
+            <p:cNvPicPr/>
+            <p:nvPr/>
+          </p:nvPicPr>
+          <p:blipFill>
+            <a:blip r:embed="rId7"/>
+            <a:stretch/>
+          </p:blipFill>
+          <p:spPr>
+            <a:xfrm>
+              <a:off x="11053440" y="17102160"/>
+              <a:ext cx="5802840" cy="3837600"/>
+            </a:xfrm>
+            <a:prstGeom prst="rect">
+              <a:avLst/>
+            </a:prstGeom>
+            <a:ln>
+              <a:noFill/>
+            </a:ln>
+          </p:spPr>
+        </p:pic>
+        <p:sp>
+          <p:nvSpPr>
+            <p:cNvPr id="60" name="TextShape 12"/>
+            <p:cNvSpPr txBox="1"/>
+            <p:nvPr/>
+          </p:nvSpPr>
+          <p:spPr>
+            <a:xfrm>
+              <a:off x="11704320" y="16714080"/>
+              <a:ext cx="4982760" cy="346320"/>
+            </a:xfrm>
+            <a:prstGeom prst="rect">
+              <a:avLst/>
+            </a:prstGeom>
+            <a:noFill/>
+            <a:ln>
+              <a:noFill/>
+            </a:ln>
+          </p:spPr>
+          <p:txBody>
+            <a:bodyPr lIns="90000" rIns="90000" tIns="45000" bIns="45000"/>
+            <a:p>
+              <a:r>
+                <a:rPr b="0" lang="en-US" sz="1800" spc="-1" strike="noStrike">
+                  <a:latin typeface="Arial"/>
+                </a:rPr>
+                <a:t>Overtime Goal Differential Prediction Histogram</a:t>
+              </a:r>
+              <a:endParaRPr b="0" lang="en-US" sz="1800" spc="-1" strike="noStrike">
                 <a:latin typeface="Arial"/>
-                <a:ea typeface="ＭＳ Ｐゴシック"/>
-              </a:rPr>
-              <a:t>Discussion</a:t>
-            </a:r>
-            <a:endParaRPr b="0" lang="en-US" sz="2900" spc="-1" strike="noStrike">
-              <a:latin typeface="Arial"/>
-            </a:endParaRPr>
-          </a:p>
-          <a:p>
-            <a:pPr marL="326880">
-              <a:lnSpc>
-                <a:spcPct val="100000"/>
-              </a:lnSpc>
-              <a:spcBef>
-                <a:spcPts val="862"/>
-              </a:spcBef>
-            </a:pPr>
-            <a:r>
-              <a:rPr b="0" lang="en-US" sz="2400" spc="-1" strike="noStrike">
-                <a:solidFill>
-                  <a:srgbClr val="000000"/>
-                </a:solidFill>
+              </a:endParaRPr>
+            </a:p>
+          </p:txBody>
+        </p:sp>
+        <p:sp>
+          <p:nvSpPr>
+            <p:cNvPr id="61" name="TextShape 13"/>
+            <p:cNvSpPr txBox="1"/>
+            <p:nvPr/>
+          </p:nvSpPr>
+          <p:spPr>
+            <a:xfrm>
+              <a:off x="13367520" y="20939760"/>
+              <a:ext cx="1811520" cy="346320"/>
+            </a:xfrm>
+            <a:prstGeom prst="rect">
+              <a:avLst/>
+            </a:prstGeom>
+            <a:noFill/>
+            <a:ln>
+              <a:noFill/>
+            </a:ln>
+          </p:spPr>
+          <p:txBody>
+            <a:bodyPr lIns="90000" rIns="90000" tIns="45000" bIns="45000"/>
+            <a:p>
+              <a:r>
+                <a:rPr b="0" lang="en-US" sz="1800" spc="-1" strike="noStrike">
+                  <a:latin typeface="Arial"/>
+                </a:rPr>
+                <a:t>Goal Differential</a:t>
+              </a:r>
+              <a:endParaRPr b="0" lang="en-US" sz="1800" spc="-1" strike="noStrike">
                 <a:latin typeface="Arial"/>
-                <a:ea typeface="ＭＳ Ｐゴシック"/>
-              </a:rPr>
-              <a:t>Lorem ipsum dolor sit amet, consectetuer adipiscing elit. Vivamus sagittis, risus et mattis convallis, leo metus molestie sapien, molestie facilisis mi tortor in arcu. Integer iaculis magna a arcu. Duis nibh. Donec tempus pede nec massa. Donec eget felis id ante consequat viverra. Proin adipiscing. Aliquam mattis magna a justo. </a:t>
-            </a:r>
-            <a:endParaRPr b="0" lang="en-US" sz="2400" spc="-1" strike="noStrike">
-              <a:latin typeface="Arial"/>
-            </a:endParaRPr>
-          </a:p>
-          <a:p>
-            <a:pPr marL="326880">
-              <a:lnSpc>
-                <a:spcPct val="100000"/>
-              </a:lnSpc>
-              <a:spcBef>
-                <a:spcPts val="862"/>
-              </a:spcBef>
-            </a:pPr>
-            <a:r>
-              <a:rPr b="0" lang="en-US" sz="2400" spc="-1" strike="noStrike">
-                <a:solidFill>
-                  <a:srgbClr val="000000"/>
-                </a:solidFill>
-                <a:latin typeface="Arial"/>
-                <a:ea typeface="ＭＳ Ｐゴシック"/>
-              </a:rPr>
-              <a:t>Mauris nunc. Class aptent taciti sociosqu ad litora torquent per conubia nostra, per inceptos hymenaeos. Praesent at ante. Quisque elit pede, gravida in, congue vitae, consectetuer a, lectus. Aenean in massa. Sed diam. Class aptent taciti sociosqu ad litora torquent per conubia nostra, per inceptos hymenaeos.</a:t>
-            </a:r>
-            <a:endParaRPr b="0" lang="en-US" sz="2400" spc="-1" strike="noStrike">
-              <a:latin typeface="Arial"/>
-            </a:endParaRPr>
-          </a:p>
-        </p:txBody>
-      </p:sp>
-      <p:sp>
-        <p:nvSpPr>
-          <p:cNvPr id="49" name="CustomShape 6"/>
-          <p:cNvSpPr/>
-          <p:nvPr/>
-        </p:nvSpPr>
-        <p:spPr>
-          <a:xfrm>
-            <a:off x="22345560" y="17221320"/>
-            <a:ext cx="10067400" cy="4266720"/>
-          </a:xfrm>
-          <a:prstGeom prst="roundRect">
-            <a:avLst>
-              <a:gd name="adj" fmla="val 2269"/>
-            </a:avLst>
-          </a:prstGeom>
-          <a:solidFill>
-            <a:srgbClr val="eef7f8"/>
-          </a:solidFill>
-          <a:ln w="76320">
-            <a:solidFill>
-              <a:schemeClr val="tx1"/>
-            </a:solidFill>
-            <a:round/>
-          </a:ln>
-        </p:spPr>
-        <p:style>
-          <a:lnRef idx="0"/>
-          <a:fillRef idx="0"/>
-          <a:effectRef idx="0"/>
-          <a:fontRef idx="minor"/>
-        </p:style>
-        <p:txBody>
-          <a:bodyPr lIns="0" rIns="0" tIns="0" bIns="0"/>
-          <a:p>
-            <a:pPr marL="976320" indent="-649080" algn="ctr">
-              <a:lnSpc>
-                <a:spcPct val="100000"/>
-              </a:lnSpc>
-            </a:pPr>
-            <a:r>
-              <a:rPr b="1" lang="en-US" sz="2600" spc="-1" strike="noStrike">
-                <a:solidFill>
-                  <a:srgbClr val="000000"/>
-                </a:solidFill>
-                <a:latin typeface="Arial"/>
-                <a:ea typeface="ＭＳ Ｐゴシック"/>
-              </a:rPr>
-              <a:t>References</a:t>
-            </a:r>
-            <a:endParaRPr b="0" lang="en-US" sz="2600" spc="-1" strike="noStrike">
-              <a:latin typeface="Arial"/>
-            </a:endParaRPr>
-          </a:p>
-          <a:p>
-            <a:pPr marL="976320" indent="-649080">
-              <a:lnSpc>
-                <a:spcPct val="100000"/>
-              </a:lnSpc>
-              <a:spcBef>
-                <a:spcPts val="862"/>
-              </a:spcBef>
-            </a:pPr>
-            <a:r>
-              <a:rPr b="0" lang="en-US" sz="1800" spc="-1" strike="noStrike">
-                <a:solidFill>
-                  <a:srgbClr val="000000"/>
-                </a:solidFill>
-                <a:latin typeface="Arial"/>
-                <a:ea typeface="ＭＳ Ｐゴシック"/>
-              </a:rPr>
-              <a:t>Lorem ipsum dolor sit amet, consectetuer adipiscing elit.</a:t>
-            </a:r>
-            <a:endParaRPr b="0" lang="en-US" sz="1800" spc="-1" strike="noStrike">
-              <a:latin typeface="Arial"/>
-            </a:endParaRPr>
-          </a:p>
-          <a:p>
-            <a:pPr marL="976320" indent="-649080">
-              <a:lnSpc>
-                <a:spcPct val="100000"/>
-              </a:lnSpc>
-              <a:spcBef>
-                <a:spcPts val="862"/>
-              </a:spcBef>
-            </a:pPr>
-            <a:r>
-              <a:rPr b="0" lang="en-US" sz="1800" spc="-1" strike="noStrike">
-                <a:solidFill>
-                  <a:srgbClr val="000000"/>
-                </a:solidFill>
-                <a:latin typeface="Arial"/>
-                <a:ea typeface="ＭＳ Ｐゴシック"/>
-              </a:rPr>
-              <a:t>Vivamus sagittis, risus et mattis convallis, leo metus molestie sapien, molestie facilisis mi tort</a:t>
-            </a:r>
-            <a:endParaRPr b="0" lang="en-US" sz="1800" spc="-1" strike="noStrike">
-              <a:latin typeface="Arial"/>
-            </a:endParaRPr>
-          </a:p>
-          <a:p>
-            <a:pPr marL="976320" indent="-649080">
-              <a:lnSpc>
-                <a:spcPct val="100000"/>
-              </a:lnSpc>
-              <a:spcBef>
-                <a:spcPts val="862"/>
-              </a:spcBef>
-            </a:pPr>
-            <a:r>
-              <a:rPr b="0" lang="en-US" sz="1800" spc="-1" strike="noStrike">
-                <a:solidFill>
-                  <a:srgbClr val="000000"/>
-                </a:solidFill>
-                <a:latin typeface="Arial"/>
-                <a:ea typeface="ＭＳ Ｐゴシック"/>
-              </a:rPr>
-              <a:t>or in arcu. Integer iaculis magna a arcu. Duis nibh. Donec tempus pede nec massa. Donec eget felis id ante consequat viverra.</a:t>
-            </a:r>
-            <a:endParaRPr b="0" lang="en-US" sz="1800" spc="-1" strike="noStrike">
-              <a:latin typeface="Arial"/>
-            </a:endParaRPr>
-          </a:p>
-          <a:p>
-            <a:pPr marL="976320" indent="-649080">
-              <a:lnSpc>
-                <a:spcPct val="100000"/>
-              </a:lnSpc>
-              <a:spcBef>
-                <a:spcPts val="862"/>
-              </a:spcBef>
-            </a:pPr>
-            <a:r>
-              <a:rPr b="0" lang="en-US" sz="1800" spc="-1" strike="noStrike">
-                <a:solidFill>
-                  <a:srgbClr val="000000"/>
-                </a:solidFill>
-                <a:latin typeface="Arial"/>
-                <a:ea typeface="ＭＳ Ｐゴシック"/>
-              </a:rPr>
-              <a:t>Proin adipiscing. Aliquam mattis magna a justo. </a:t>
-            </a:r>
-            <a:endParaRPr b="0" lang="en-US" sz="1800" spc="-1" strike="noStrike">
-              <a:latin typeface="Arial"/>
-            </a:endParaRPr>
-          </a:p>
-          <a:p>
-            <a:pPr marL="976320" indent="-649080">
-              <a:lnSpc>
-                <a:spcPct val="100000"/>
-              </a:lnSpc>
-              <a:spcBef>
-                <a:spcPts val="862"/>
-              </a:spcBef>
-            </a:pPr>
-            <a:r>
-              <a:rPr b="0" lang="en-US" sz="1800" spc="-1" strike="noStrike">
-                <a:solidFill>
-                  <a:srgbClr val="000000"/>
-                </a:solidFill>
-                <a:latin typeface="Arial"/>
-                <a:ea typeface="ＭＳ Ｐゴシック"/>
-              </a:rPr>
-              <a:t>Mauris nunc. Class aptent taciti sociosqu ad litora torquent per conubia nostra, per inceptos hymenaeos. Praesent at ante.</a:t>
-            </a:r>
-            <a:endParaRPr b="0" lang="en-US" sz="1800" spc="-1" strike="noStrike">
-              <a:latin typeface="Arial"/>
-            </a:endParaRPr>
-          </a:p>
-          <a:p>
-            <a:pPr marL="976320" indent="-649080">
-              <a:lnSpc>
-                <a:spcPct val="100000"/>
-              </a:lnSpc>
-              <a:spcBef>
-                <a:spcPts val="862"/>
-              </a:spcBef>
-            </a:pPr>
-            <a:r>
-              <a:rPr b="0" lang="en-US" sz="1800" spc="-1" strike="noStrike">
-                <a:solidFill>
-                  <a:srgbClr val="000000"/>
-                </a:solidFill>
-                <a:latin typeface="Arial"/>
-                <a:ea typeface="ＭＳ Ｐゴシック"/>
-              </a:rPr>
-              <a:t>Quisque elit pede, gravida in, congue vitae, consectetuer a, lectus. Aenean in massa. Sed diam. Class aptent taciti sociosqu ad litora torquent per conubia nostra, per inceptos hymenaeos.</a:t>
-            </a:r>
-            <a:endParaRPr b="0" lang="en-US" sz="1800" spc="-1" strike="noStrike">
-              <a:latin typeface="Arial"/>
-            </a:endParaRPr>
-          </a:p>
-        </p:txBody>
-      </p:sp>
-      <p:pic>
-        <p:nvPicPr>
-          <p:cNvPr id="50" name="Picture 1" descr=""/>
-          <p:cNvPicPr/>
-          <p:nvPr/>
-        </p:nvPicPr>
-        <p:blipFill>
-          <a:blip r:embed="rId1"/>
-          <a:stretch/>
-        </p:blipFill>
-        <p:spPr>
-          <a:xfrm>
-            <a:off x="2971800" y="507960"/>
-            <a:ext cx="4800240" cy="2463480"/>
-          </a:xfrm>
-          <a:prstGeom prst="rect">
-            <a:avLst/>
-          </a:prstGeom>
-          <a:ln>
-            <a:noFill/>
-          </a:ln>
-        </p:spPr>
-      </p:pic>
-      <p:pic>
-        <p:nvPicPr>
-          <p:cNvPr id="51" name="Picture 2" descr=""/>
-          <p:cNvPicPr/>
-          <p:nvPr/>
-        </p:nvPicPr>
-        <p:blipFill>
-          <a:blip r:embed="rId2"/>
-          <a:stretch/>
-        </p:blipFill>
-        <p:spPr>
-          <a:xfrm>
-            <a:off x="25526880" y="457200"/>
-            <a:ext cx="3962160" cy="2971440"/>
-          </a:xfrm>
-          <a:prstGeom prst="rect">
-            <a:avLst/>
-          </a:prstGeom>
-          <a:ln>
-            <a:noFill/>
-          </a:ln>
-        </p:spPr>
-      </p:pic>
+              </a:endParaRPr>
+            </a:p>
+          </p:txBody>
+        </p:sp>
+      </p:grpSp>
     </p:spTree>
   </p:cSld>
   <p:timing>

</xml_diff>

<commit_message>
Merged write-up text into poster
</commit_message>
<xml_diff>
--- a/Lord_Stanley_Seekers_Final_Poster.pptx
+++ b/Lord_Stanley_Seekers_Final_Poster.pptx
@@ -34,7 +34,7 @@
       </p:grpSpPr>
       <p:sp>
         <p:nvSpPr>
-          <p:cNvPr id="36" name="PlaceHolder 1"/>
+          <p:cNvPr id="38" name="PlaceHolder 1"/>
           <p:cNvSpPr>
             <a:spLocks noGrp="1"/>
           </p:cNvSpPr>
@@ -69,7 +69,7 @@
       </p:sp>
       <p:sp>
         <p:nvSpPr>
-          <p:cNvPr id="37" name="PlaceHolder 2"/>
+          <p:cNvPr id="39" name="PlaceHolder 2"/>
           <p:cNvSpPr>
             <a:spLocks noGrp="1"/>
           </p:cNvSpPr>
@@ -103,7 +103,7 @@
       </p:sp>
       <p:sp>
         <p:nvSpPr>
-          <p:cNvPr id="38" name="PlaceHolder 3"/>
+          <p:cNvPr id="40" name="PlaceHolder 3"/>
           <p:cNvSpPr>
             <a:spLocks noGrp="1"/>
           </p:cNvSpPr>
@@ -127,7 +127,7 @@
               <a:rPr b="0" lang="en-US" sz="1400" spc="-1" strike="noStrike">
                 <a:latin typeface="Times New Roman"/>
               </a:rPr>
-              <a:t>&lt;header&gt;</a:t>
+              <a:t> </a:t>
             </a:r>
             <a:endParaRPr b="0" lang="en-US" sz="1400" spc="-1" strike="noStrike">
               <a:latin typeface="Times New Roman"/>
@@ -137,7 +137,7 @@
       </p:sp>
       <p:sp>
         <p:nvSpPr>
-          <p:cNvPr id="39" name="PlaceHolder 4"/>
+          <p:cNvPr id="41" name="PlaceHolder 4"/>
           <p:cNvSpPr>
             <a:spLocks noGrp="1"/>
           </p:cNvSpPr>
@@ -162,7 +162,7 @@
               <a:rPr b="0" lang="en-US" sz="1400" spc="-1" strike="noStrike">
                 <a:latin typeface="Times New Roman"/>
               </a:rPr>
-              <a:t>&lt;date/time&gt;</a:t>
+              <a:t> </a:t>
             </a:r>
             <a:endParaRPr b="0" lang="en-US" sz="1400" spc="-1" strike="noStrike">
               <a:latin typeface="Times New Roman"/>
@@ -172,7 +172,7 @@
       </p:sp>
       <p:sp>
         <p:nvSpPr>
-          <p:cNvPr id="40" name="PlaceHolder 5"/>
+          <p:cNvPr id="42" name="PlaceHolder 5"/>
           <p:cNvSpPr>
             <a:spLocks noGrp="1"/>
           </p:cNvSpPr>
@@ -196,7 +196,7 @@
               <a:rPr b="0" lang="en-US" sz="1400" spc="-1" strike="noStrike">
                 <a:latin typeface="Times New Roman"/>
               </a:rPr>
-              <a:t>&lt;footer&gt;</a:t>
+              <a:t> </a:t>
             </a:r>
             <a:endParaRPr b="0" lang="en-US" sz="1400" spc="-1" strike="noStrike">
               <a:latin typeface="Times New Roman"/>
@@ -206,7 +206,7 @@
       </p:sp>
       <p:sp>
         <p:nvSpPr>
-          <p:cNvPr id="41" name="PlaceHolder 6"/>
+          <p:cNvPr id="43" name="PlaceHolder 6"/>
           <p:cNvSpPr>
             <a:spLocks noGrp="1"/>
           </p:cNvSpPr>
@@ -227,11 +227,11 @@
           <a:bodyPr lIns="0" rIns="0" tIns="0" bIns="0" anchor="b"/>
           <a:p>
             <a:pPr algn="r"/>
-            <a:fld id="{8CB2FF65-EDB2-4EA6-841F-C07727382AE9}" type="slidenum">
+            <a:fld id="{D8639F26-D289-4708-90A9-27BC4774C662}" type="slidenum">
               <a:rPr b="0" lang="en-US" sz="1400" spc="-1" strike="noStrike">
                 <a:latin typeface="Times New Roman"/>
               </a:rPr>
-              <a:t>&lt;number&gt;</a:t>
+              <a:t>1</a:t>
             </a:fld>
             <a:endParaRPr b="0" lang="en-US" sz="1400" spc="-1" strike="noStrike">
               <a:latin typeface="Times New Roman"/>
@@ -264,14 +264,14 @@
       </p:grpSpPr>
       <p:sp>
         <p:nvSpPr>
-          <p:cNvPr id="62" name="CustomShape 1"/>
+          <p:cNvPr id="63" name="CustomShape 1"/>
           <p:cNvSpPr/>
           <p:nvPr/>
         </p:nvSpPr>
         <p:spPr>
           <a:xfrm>
             <a:off x="3886200" y="8686800"/>
-            <a:ext cx="2971080" cy="456480"/>
+            <a:ext cx="2970720" cy="456120"/>
           </a:xfrm>
           <a:prstGeom prst="rect">
             <a:avLst/>
@@ -295,7 +295,7 @@
                 <a:spcPct val="100000"/>
               </a:lnSpc>
             </a:pPr>
-            <a:fld id="{7CDA9381-5CC0-4896-BE00-CA2686E80317}" type="slidenum">
+            <a:fld id="{B9C0B6DB-DCD8-4B44-92D1-740ECA8393AA}" type="slidenum">
               <a:rPr b="0" lang="en-US" sz="1200" spc="-1" strike="noStrike">
                 <a:solidFill>
                   <a:srgbClr val="000000"/>
@@ -303,7 +303,7 @@
                 <a:latin typeface="Gill Sans"/>
                 <a:ea typeface="ＭＳ Ｐゴシック"/>
               </a:rPr>
-              <a:t>&lt;number&gt;</a:t>
+              <a:t>1</a:t>
             </a:fld>
             <a:endParaRPr b="0" lang="en-US" sz="1200" spc="-1" strike="noStrike">
               <a:latin typeface="Arial"/>
@@ -313,7 +313,7 @@
       </p:sp>
       <p:sp>
         <p:nvSpPr>
-          <p:cNvPr id="63" name="PlaceHolder 2"/>
+          <p:cNvPr id="64" name="PlaceHolder 2"/>
           <p:cNvSpPr>
             <a:spLocks noGrp="1"/>
           </p:cNvSpPr>
@@ -324,16 +324,16 @@
         <p:spPr>
           <a:xfrm>
             <a:off x="857160" y="685800"/>
-            <a:ext cx="5142960" cy="3428280"/>
-          </a:xfrm>
-          <a:prstGeom prst="rect">
-            <a:avLst/>
-          </a:prstGeom>
-        </p:spPr>
-      </p:sp>
-      <p:sp>
-        <p:nvSpPr>
-          <p:cNvPr id="64" name="PlaceHolder 3"/>
+            <a:ext cx="5142600" cy="3427920"/>
+          </a:xfrm>
+          <a:prstGeom prst="rect">
+            <a:avLst/>
+          </a:prstGeom>
+        </p:spPr>
+      </p:sp>
+      <p:sp>
+        <p:nvSpPr>
+          <p:cNvPr id="65" name="PlaceHolder 3"/>
           <p:cNvSpPr>
             <a:spLocks noGrp="1"/>
           </p:cNvSpPr>
@@ -344,7 +344,7 @@
         <p:spPr>
           <a:xfrm>
             <a:off x="914400" y="4343400"/>
-            <a:ext cx="5028480" cy="4114080"/>
+            <a:ext cx="5028120" cy="4113720"/>
           </a:xfrm>
           <a:prstGeom prst="rect">
             <a:avLst/>
@@ -405,7 +405,7 @@
       </p:grpSpPr>
       <p:sp>
         <p:nvSpPr>
-          <p:cNvPr id="21" name="PlaceHolder 1"/>
+          <p:cNvPr id="23" name="PlaceHolder 1"/>
           <p:cNvSpPr>
             <a:spLocks noGrp="1"/>
           </p:cNvSpPr>
@@ -434,7 +434,7 @@
       </p:sp>
       <p:sp>
         <p:nvSpPr>
-          <p:cNvPr id="22" name="PlaceHolder 2"/>
+          <p:cNvPr id="24" name="PlaceHolder 2"/>
           <p:cNvSpPr>
             <a:spLocks noGrp="1"/>
           </p:cNvSpPr>
@@ -464,7 +464,7 @@
       </p:sp>
       <p:sp>
         <p:nvSpPr>
-          <p:cNvPr id="23" name="PlaceHolder 3"/>
+          <p:cNvPr id="25" name="PlaceHolder 3"/>
           <p:cNvSpPr>
             <a:spLocks noGrp="1"/>
           </p:cNvSpPr>
@@ -516,7 +516,7 @@
       </p:grpSpPr>
       <p:sp>
         <p:nvSpPr>
-          <p:cNvPr id="24" name="PlaceHolder 1"/>
+          <p:cNvPr id="26" name="PlaceHolder 1"/>
           <p:cNvSpPr>
             <a:spLocks noGrp="1"/>
           </p:cNvSpPr>
@@ -545,7 +545,7 @@
       </p:sp>
       <p:sp>
         <p:nvSpPr>
-          <p:cNvPr id="25" name="PlaceHolder 2"/>
+          <p:cNvPr id="27" name="PlaceHolder 2"/>
           <p:cNvSpPr>
             <a:spLocks noGrp="1"/>
           </p:cNvSpPr>
@@ -575,7 +575,7 @@
       </p:sp>
       <p:sp>
         <p:nvSpPr>
-          <p:cNvPr id="26" name="PlaceHolder 3"/>
+          <p:cNvPr id="28" name="PlaceHolder 3"/>
           <p:cNvSpPr>
             <a:spLocks noGrp="1"/>
           </p:cNvSpPr>
@@ -605,7 +605,7 @@
       </p:sp>
       <p:sp>
         <p:nvSpPr>
-          <p:cNvPr id="27" name="PlaceHolder 4"/>
+          <p:cNvPr id="29" name="PlaceHolder 4"/>
           <p:cNvSpPr>
             <a:spLocks noGrp="1"/>
           </p:cNvSpPr>
@@ -635,7 +635,7 @@
       </p:sp>
       <p:sp>
         <p:nvSpPr>
-          <p:cNvPr id="28" name="PlaceHolder 5"/>
+          <p:cNvPr id="30" name="PlaceHolder 5"/>
           <p:cNvSpPr>
             <a:spLocks noGrp="1"/>
           </p:cNvSpPr>
@@ -687,7 +687,7 @@
       </p:grpSpPr>
       <p:sp>
         <p:nvSpPr>
-          <p:cNvPr id="29" name="PlaceHolder 1"/>
+          <p:cNvPr id="31" name="PlaceHolder 1"/>
           <p:cNvSpPr>
             <a:spLocks noGrp="1"/>
           </p:cNvSpPr>
@@ -716,7 +716,7 @@
       </p:sp>
       <p:sp>
         <p:nvSpPr>
-          <p:cNvPr id="30" name="PlaceHolder 2"/>
+          <p:cNvPr id="32" name="PlaceHolder 2"/>
           <p:cNvSpPr>
             <a:spLocks noGrp="1"/>
           </p:cNvSpPr>
@@ -746,7 +746,7 @@
       </p:sp>
       <p:sp>
         <p:nvSpPr>
-          <p:cNvPr id="31" name="PlaceHolder 3"/>
+          <p:cNvPr id="33" name="PlaceHolder 3"/>
           <p:cNvSpPr>
             <a:spLocks noGrp="1"/>
           </p:cNvSpPr>
@@ -776,7 +776,7 @@
       </p:sp>
       <p:sp>
         <p:nvSpPr>
-          <p:cNvPr id="32" name="PlaceHolder 4"/>
+          <p:cNvPr id="34" name="PlaceHolder 4"/>
           <p:cNvSpPr>
             <a:spLocks noGrp="1"/>
           </p:cNvSpPr>
@@ -806,7 +806,7 @@
       </p:sp>
       <p:sp>
         <p:nvSpPr>
-          <p:cNvPr id="33" name="PlaceHolder 5"/>
+          <p:cNvPr id="35" name="PlaceHolder 5"/>
           <p:cNvSpPr>
             <a:spLocks noGrp="1"/>
           </p:cNvSpPr>
@@ -836,7 +836,7 @@
       </p:sp>
       <p:sp>
         <p:nvSpPr>
-          <p:cNvPr id="34" name="PlaceHolder 6"/>
+          <p:cNvPr id="36" name="PlaceHolder 6"/>
           <p:cNvSpPr>
             <a:spLocks noGrp="1"/>
           </p:cNvSpPr>
@@ -866,7 +866,7 @@
       </p:sp>
       <p:sp>
         <p:nvSpPr>
-          <p:cNvPr id="35" name="PlaceHolder 7"/>
+          <p:cNvPr id="37" name="PlaceHolder 7"/>
           <p:cNvSpPr>
             <a:spLocks noGrp="1"/>
           </p:cNvSpPr>
@@ -918,7 +918,7 @@
       </p:grpSpPr>
       <p:sp>
         <p:nvSpPr>
-          <p:cNvPr id="0" name="PlaceHolder 1"/>
+          <p:cNvPr id="2" name="PlaceHolder 1"/>
           <p:cNvSpPr>
             <a:spLocks noGrp="1"/>
           </p:cNvSpPr>
@@ -947,7 +947,7 @@
       </p:sp>
       <p:sp>
         <p:nvSpPr>
-          <p:cNvPr id="1" name="PlaceHolder 2"/>
+          <p:cNvPr id="3" name="PlaceHolder 2"/>
           <p:cNvSpPr>
             <a:spLocks noGrp="1"/>
           </p:cNvSpPr>
@@ -998,7 +998,7 @@
       </p:grpSpPr>
       <p:sp>
         <p:nvSpPr>
-          <p:cNvPr id="2" name="PlaceHolder 1"/>
+          <p:cNvPr id="4" name="PlaceHolder 1"/>
           <p:cNvSpPr>
             <a:spLocks noGrp="1"/>
           </p:cNvSpPr>
@@ -1027,7 +1027,7 @@
       </p:sp>
       <p:sp>
         <p:nvSpPr>
-          <p:cNvPr id="3" name="PlaceHolder 2"/>
+          <p:cNvPr id="5" name="PlaceHolder 2"/>
           <p:cNvSpPr>
             <a:spLocks noGrp="1"/>
           </p:cNvSpPr>
@@ -1079,7 +1079,7 @@
       </p:grpSpPr>
       <p:sp>
         <p:nvSpPr>
-          <p:cNvPr id="4" name="PlaceHolder 1"/>
+          <p:cNvPr id="6" name="PlaceHolder 1"/>
           <p:cNvSpPr>
             <a:spLocks noGrp="1"/>
           </p:cNvSpPr>
@@ -1108,7 +1108,7 @@
       </p:sp>
       <p:sp>
         <p:nvSpPr>
-          <p:cNvPr id="5" name="PlaceHolder 2"/>
+          <p:cNvPr id="7" name="PlaceHolder 2"/>
           <p:cNvSpPr>
             <a:spLocks noGrp="1"/>
           </p:cNvSpPr>
@@ -1138,7 +1138,7 @@
       </p:sp>
       <p:sp>
         <p:nvSpPr>
-          <p:cNvPr id="6" name="PlaceHolder 3"/>
+          <p:cNvPr id="8" name="PlaceHolder 3"/>
           <p:cNvSpPr>
             <a:spLocks noGrp="1"/>
           </p:cNvSpPr>
@@ -1190,7 +1190,7 @@
       </p:grpSpPr>
       <p:sp>
         <p:nvSpPr>
-          <p:cNvPr id="7" name="PlaceHolder 1"/>
+          <p:cNvPr id="9" name="PlaceHolder 1"/>
           <p:cNvSpPr>
             <a:spLocks noGrp="1"/>
           </p:cNvSpPr>
@@ -1241,7 +1241,7 @@
       </p:grpSpPr>
       <p:sp>
         <p:nvSpPr>
-          <p:cNvPr id="8" name="PlaceHolder 1"/>
+          <p:cNvPr id="10" name="PlaceHolder 1"/>
           <p:cNvSpPr>
             <a:spLocks noGrp="1"/>
           </p:cNvSpPr>
@@ -1292,7 +1292,7 @@
       </p:grpSpPr>
       <p:sp>
         <p:nvSpPr>
-          <p:cNvPr id="9" name="PlaceHolder 1"/>
+          <p:cNvPr id="11" name="PlaceHolder 1"/>
           <p:cNvSpPr>
             <a:spLocks noGrp="1"/>
           </p:cNvSpPr>
@@ -1321,7 +1321,7 @@
       </p:sp>
       <p:sp>
         <p:nvSpPr>
-          <p:cNvPr id="10" name="PlaceHolder 2"/>
+          <p:cNvPr id="12" name="PlaceHolder 2"/>
           <p:cNvSpPr>
             <a:spLocks noGrp="1"/>
           </p:cNvSpPr>
@@ -1351,7 +1351,7 @@
       </p:sp>
       <p:sp>
         <p:nvSpPr>
-          <p:cNvPr id="11" name="PlaceHolder 3"/>
+          <p:cNvPr id="13" name="PlaceHolder 3"/>
           <p:cNvSpPr>
             <a:spLocks noGrp="1"/>
           </p:cNvSpPr>
@@ -1381,7 +1381,7 @@
       </p:sp>
       <p:sp>
         <p:nvSpPr>
-          <p:cNvPr id="12" name="PlaceHolder 4"/>
+          <p:cNvPr id="14" name="PlaceHolder 4"/>
           <p:cNvSpPr>
             <a:spLocks noGrp="1"/>
           </p:cNvSpPr>
@@ -1433,7 +1433,7 @@
       </p:grpSpPr>
       <p:sp>
         <p:nvSpPr>
-          <p:cNvPr id="13" name="PlaceHolder 1"/>
+          <p:cNvPr id="15" name="PlaceHolder 1"/>
           <p:cNvSpPr>
             <a:spLocks noGrp="1"/>
           </p:cNvSpPr>
@@ -1462,7 +1462,7 @@
       </p:sp>
       <p:sp>
         <p:nvSpPr>
-          <p:cNvPr id="14" name="PlaceHolder 2"/>
+          <p:cNvPr id="16" name="PlaceHolder 2"/>
           <p:cNvSpPr>
             <a:spLocks noGrp="1"/>
           </p:cNvSpPr>
@@ -1492,7 +1492,7 @@
       </p:sp>
       <p:sp>
         <p:nvSpPr>
-          <p:cNvPr id="15" name="PlaceHolder 3"/>
+          <p:cNvPr id="17" name="PlaceHolder 3"/>
           <p:cNvSpPr>
             <a:spLocks noGrp="1"/>
           </p:cNvSpPr>
@@ -1522,7 +1522,7 @@
       </p:sp>
       <p:sp>
         <p:nvSpPr>
-          <p:cNvPr id="16" name="PlaceHolder 4"/>
+          <p:cNvPr id="18" name="PlaceHolder 4"/>
           <p:cNvSpPr>
             <a:spLocks noGrp="1"/>
           </p:cNvSpPr>
@@ -1574,7 +1574,7 @@
       </p:grpSpPr>
       <p:sp>
         <p:nvSpPr>
-          <p:cNvPr id="17" name="PlaceHolder 1"/>
+          <p:cNvPr id="19" name="PlaceHolder 1"/>
           <p:cNvSpPr>
             <a:spLocks noGrp="1"/>
           </p:cNvSpPr>
@@ -1603,7 +1603,7 @@
       </p:sp>
       <p:sp>
         <p:nvSpPr>
-          <p:cNvPr id="18" name="PlaceHolder 2"/>
+          <p:cNvPr id="20" name="PlaceHolder 2"/>
           <p:cNvSpPr>
             <a:spLocks noGrp="1"/>
           </p:cNvSpPr>
@@ -1633,7 +1633,7 @@
       </p:sp>
       <p:sp>
         <p:nvSpPr>
-          <p:cNvPr id="19" name="PlaceHolder 3"/>
+          <p:cNvPr id="21" name="PlaceHolder 3"/>
           <p:cNvSpPr>
             <a:spLocks noGrp="1"/>
           </p:cNvSpPr>
@@ -1663,7 +1663,7 @@
       </p:sp>
       <p:sp>
         <p:nvSpPr>
-          <p:cNvPr id="20" name="PlaceHolder 4"/>
+          <p:cNvPr id="22" name="PlaceHolder 4"/>
           <p:cNvSpPr>
             <a:spLocks noGrp="1"/>
           </p:cNvSpPr>
@@ -1720,6 +1720,424 @@
           <a:chExt cx="0" cy="0"/>
         </a:xfrm>
       </p:grpSpPr>
+      <p:sp>
+        <p:nvSpPr>
+          <p:cNvPr id="0" name="PlaceHolder 1"/>
+          <p:cNvSpPr>
+            <a:spLocks noGrp="1"/>
+          </p:cNvSpPr>
+          <p:nvPr>
+            <p:ph type="title"/>
+          </p:nvPr>
+        </p:nvSpPr>
+        <p:spPr>
+          <a:xfrm>
+            <a:off x="1645920" y="875520"/>
+            <a:ext cx="29626200" cy="3664440"/>
+          </a:xfrm>
+          <a:prstGeom prst="rect">
+            <a:avLst/>
+          </a:prstGeom>
+        </p:spPr>
+        <p:txBody>
+          <a:bodyPr lIns="0" rIns="0" tIns="0" bIns="0" anchor="ctr"/>
+          <a:p>
+            <a:pPr algn="ctr"/>
+            <a:r>
+              <a:rPr b="0" lang="en-US" sz="4400" spc="-1" strike="noStrike">
+                <a:latin typeface="Arial"/>
+              </a:rPr>
+              <a:t>C</a:t>
+            </a:r>
+            <a:r>
+              <a:rPr b="0" lang="en-US" sz="4400" spc="-1" strike="noStrike">
+                <a:latin typeface="Arial"/>
+              </a:rPr>
+              <a:t>l</a:t>
+            </a:r>
+            <a:r>
+              <a:rPr b="0" lang="en-US" sz="4400" spc="-1" strike="noStrike">
+                <a:latin typeface="Arial"/>
+              </a:rPr>
+              <a:t>i</a:t>
+            </a:r>
+            <a:r>
+              <a:rPr b="0" lang="en-US" sz="4400" spc="-1" strike="noStrike">
+                <a:latin typeface="Arial"/>
+              </a:rPr>
+              <a:t>c</a:t>
+            </a:r>
+            <a:r>
+              <a:rPr b="0" lang="en-US" sz="4400" spc="-1" strike="noStrike">
+                <a:latin typeface="Arial"/>
+              </a:rPr>
+              <a:t>k</a:t>
+            </a:r>
+            <a:r>
+              <a:rPr b="0" lang="en-US" sz="4400" spc="-1" strike="noStrike">
+                <a:latin typeface="Arial"/>
+              </a:rPr>
+              <a:t> </a:t>
+            </a:r>
+            <a:r>
+              <a:rPr b="0" lang="en-US" sz="4400" spc="-1" strike="noStrike">
+                <a:latin typeface="Arial"/>
+              </a:rPr>
+              <a:t>t</a:t>
+            </a:r>
+            <a:r>
+              <a:rPr b="0" lang="en-US" sz="4400" spc="-1" strike="noStrike">
+                <a:latin typeface="Arial"/>
+              </a:rPr>
+              <a:t>o</a:t>
+            </a:r>
+            <a:r>
+              <a:rPr b="0" lang="en-US" sz="4400" spc="-1" strike="noStrike">
+                <a:latin typeface="Arial"/>
+              </a:rPr>
+              <a:t> </a:t>
+            </a:r>
+            <a:r>
+              <a:rPr b="0" lang="en-US" sz="4400" spc="-1" strike="noStrike">
+                <a:latin typeface="Arial"/>
+              </a:rPr>
+              <a:t>e</a:t>
+            </a:r>
+            <a:r>
+              <a:rPr b="0" lang="en-US" sz="4400" spc="-1" strike="noStrike">
+                <a:latin typeface="Arial"/>
+              </a:rPr>
+              <a:t>d</a:t>
+            </a:r>
+            <a:r>
+              <a:rPr b="0" lang="en-US" sz="4400" spc="-1" strike="noStrike">
+                <a:latin typeface="Arial"/>
+              </a:rPr>
+              <a:t>i</a:t>
+            </a:r>
+            <a:r>
+              <a:rPr b="0" lang="en-US" sz="4400" spc="-1" strike="noStrike">
+                <a:latin typeface="Arial"/>
+              </a:rPr>
+              <a:t>t</a:t>
+            </a:r>
+            <a:r>
+              <a:rPr b="0" lang="en-US" sz="4400" spc="-1" strike="noStrike">
+                <a:latin typeface="Arial"/>
+              </a:rPr>
+              <a:t> </a:t>
+            </a:r>
+            <a:r>
+              <a:rPr b="0" lang="en-US" sz="4400" spc="-1" strike="noStrike">
+                <a:latin typeface="Arial"/>
+              </a:rPr>
+              <a:t>t</a:t>
+            </a:r>
+            <a:r>
+              <a:rPr b="0" lang="en-US" sz="4400" spc="-1" strike="noStrike">
+                <a:latin typeface="Arial"/>
+              </a:rPr>
+              <a:t>h</a:t>
+            </a:r>
+            <a:r>
+              <a:rPr b="0" lang="en-US" sz="4400" spc="-1" strike="noStrike">
+                <a:latin typeface="Arial"/>
+              </a:rPr>
+              <a:t>e</a:t>
+            </a:r>
+            <a:r>
+              <a:rPr b="0" lang="en-US" sz="4400" spc="-1" strike="noStrike">
+                <a:latin typeface="Arial"/>
+              </a:rPr>
+              <a:t> </a:t>
+            </a:r>
+            <a:r>
+              <a:rPr b="0" lang="en-US" sz="4400" spc="-1" strike="noStrike">
+                <a:latin typeface="Arial"/>
+              </a:rPr>
+              <a:t>t</a:t>
+            </a:r>
+            <a:r>
+              <a:rPr b="0" lang="en-US" sz="4400" spc="-1" strike="noStrike">
+                <a:latin typeface="Arial"/>
+              </a:rPr>
+              <a:t>i</a:t>
+            </a:r>
+            <a:r>
+              <a:rPr b="0" lang="en-US" sz="4400" spc="-1" strike="noStrike">
+                <a:latin typeface="Arial"/>
+              </a:rPr>
+              <a:t>t</a:t>
+            </a:r>
+            <a:r>
+              <a:rPr b="0" lang="en-US" sz="4400" spc="-1" strike="noStrike">
+                <a:latin typeface="Arial"/>
+              </a:rPr>
+              <a:t>l</a:t>
+            </a:r>
+            <a:r>
+              <a:rPr b="0" lang="en-US" sz="4400" spc="-1" strike="noStrike">
+                <a:latin typeface="Arial"/>
+              </a:rPr>
+              <a:t>e</a:t>
+            </a:r>
+            <a:r>
+              <a:rPr b="0" lang="en-US" sz="4400" spc="-1" strike="noStrike">
+                <a:latin typeface="Arial"/>
+              </a:rPr>
+              <a:t> </a:t>
+            </a:r>
+            <a:r>
+              <a:rPr b="0" lang="en-US" sz="4400" spc="-1" strike="noStrike">
+                <a:latin typeface="Arial"/>
+              </a:rPr>
+              <a:t>t</a:t>
+            </a:r>
+            <a:r>
+              <a:rPr b="0" lang="en-US" sz="4400" spc="-1" strike="noStrike">
+                <a:latin typeface="Arial"/>
+              </a:rPr>
+              <a:t>e</a:t>
+            </a:r>
+            <a:r>
+              <a:rPr b="0" lang="en-US" sz="4400" spc="-1" strike="noStrike">
+                <a:latin typeface="Arial"/>
+              </a:rPr>
+              <a:t>x</a:t>
+            </a:r>
+            <a:r>
+              <a:rPr b="0" lang="en-US" sz="4400" spc="-1" strike="noStrike">
+                <a:latin typeface="Arial"/>
+              </a:rPr>
+              <a:t>t</a:t>
+            </a:r>
+            <a:r>
+              <a:rPr b="0" lang="en-US" sz="4400" spc="-1" strike="noStrike">
+                <a:latin typeface="Arial"/>
+              </a:rPr>
+              <a:t> </a:t>
+            </a:r>
+            <a:r>
+              <a:rPr b="0" lang="en-US" sz="4400" spc="-1" strike="noStrike">
+                <a:latin typeface="Arial"/>
+              </a:rPr>
+              <a:t>f</a:t>
+            </a:r>
+            <a:r>
+              <a:rPr b="0" lang="en-US" sz="4400" spc="-1" strike="noStrike">
+                <a:latin typeface="Arial"/>
+              </a:rPr>
+              <a:t>o</a:t>
+            </a:r>
+            <a:r>
+              <a:rPr b="0" lang="en-US" sz="4400" spc="-1" strike="noStrike">
+                <a:latin typeface="Arial"/>
+              </a:rPr>
+              <a:t>r</a:t>
+            </a:r>
+            <a:r>
+              <a:rPr b="0" lang="en-US" sz="4400" spc="-1" strike="noStrike">
+                <a:latin typeface="Arial"/>
+              </a:rPr>
+              <a:t>m</a:t>
+            </a:r>
+            <a:r>
+              <a:rPr b="0" lang="en-US" sz="4400" spc="-1" strike="noStrike">
+                <a:latin typeface="Arial"/>
+              </a:rPr>
+              <a:t>a</a:t>
+            </a:r>
+            <a:r>
+              <a:rPr b="0" lang="en-US" sz="4400" spc="-1" strike="noStrike">
+                <a:latin typeface="Arial"/>
+              </a:rPr>
+              <a:t>t</a:t>
+            </a:r>
+            <a:endParaRPr b="0" lang="en-US" sz="4400" spc="-1" strike="noStrike">
+              <a:latin typeface="Arial"/>
+            </a:endParaRPr>
+          </a:p>
+        </p:txBody>
+      </p:sp>
+      <p:sp>
+        <p:nvSpPr>
+          <p:cNvPr id="1" name="PlaceHolder 2"/>
+          <p:cNvSpPr>
+            <a:spLocks noGrp="1"/>
+          </p:cNvSpPr>
+          <p:nvPr>
+            <p:ph type="body"/>
+          </p:nvPr>
+        </p:nvSpPr>
+        <p:spPr>
+          <a:xfrm>
+            <a:off x="1645920" y="5135040"/>
+            <a:ext cx="29626200" cy="12727800"/>
+          </a:xfrm>
+          <a:prstGeom prst="rect">
+            <a:avLst/>
+          </a:prstGeom>
+        </p:spPr>
+        <p:txBody>
+          <a:bodyPr lIns="0" rIns="0" tIns="0" bIns="0">
+            <a:normAutofit/>
+          </a:bodyPr>
+          <a:p>
+            <a:pPr marL="432000" indent="-324000">
+              <a:spcBef>
+                <a:spcPts val="1417"/>
+              </a:spcBef>
+              <a:buClr>
+                <a:srgbClr val="000000"/>
+              </a:buClr>
+              <a:buSzPct val="45000"/>
+              <a:buFont typeface="Wingdings" charset="2"/>
+              <a:buChar char=""/>
+            </a:pPr>
+            <a:r>
+              <a:rPr b="0" lang="en-US" sz="3200" spc="-1" strike="noStrike">
+                <a:latin typeface="Arial"/>
+              </a:rPr>
+              <a:t>Click to edit the outline text format</a:t>
+            </a:r>
+            <a:endParaRPr b="0" lang="en-US" sz="3200" spc="-1" strike="noStrike">
+              <a:latin typeface="Arial"/>
+            </a:endParaRPr>
+          </a:p>
+          <a:p>
+            <a:pPr lvl="1" marL="864000" indent="-324000">
+              <a:spcBef>
+                <a:spcPts val="1134"/>
+              </a:spcBef>
+              <a:buClr>
+                <a:srgbClr val="000000"/>
+              </a:buClr>
+              <a:buSzPct val="75000"/>
+              <a:buFont typeface="Symbol" charset="2"/>
+              <a:buChar char=""/>
+            </a:pPr>
+            <a:r>
+              <a:rPr b="0" lang="en-US" sz="2800" spc="-1" strike="noStrike">
+                <a:latin typeface="Arial"/>
+              </a:rPr>
+              <a:t>Second Outline Level</a:t>
+            </a:r>
+            <a:endParaRPr b="0" lang="en-US" sz="2800" spc="-1" strike="noStrike">
+              <a:latin typeface="Arial"/>
+            </a:endParaRPr>
+          </a:p>
+          <a:p>
+            <a:pPr lvl="2" marL="1296000" indent="-288000">
+              <a:spcBef>
+                <a:spcPts val="850"/>
+              </a:spcBef>
+              <a:buClr>
+                <a:srgbClr val="000000"/>
+              </a:buClr>
+              <a:buSzPct val="45000"/>
+              <a:buFont typeface="Wingdings" charset="2"/>
+              <a:buChar char=""/>
+            </a:pPr>
+            <a:r>
+              <a:rPr b="0" lang="en-US" sz="2400" spc="-1" strike="noStrike">
+                <a:latin typeface="Arial"/>
+              </a:rPr>
+              <a:t>Third Outline Level</a:t>
+            </a:r>
+            <a:endParaRPr b="0" lang="en-US" sz="2400" spc="-1" strike="noStrike">
+              <a:latin typeface="Arial"/>
+            </a:endParaRPr>
+          </a:p>
+          <a:p>
+            <a:pPr lvl="3" marL="1728000" indent="-216000">
+              <a:spcBef>
+                <a:spcPts val="567"/>
+              </a:spcBef>
+              <a:buClr>
+                <a:srgbClr val="000000"/>
+              </a:buClr>
+              <a:buSzPct val="75000"/>
+              <a:buFont typeface="Symbol" charset="2"/>
+              <a:buChar char=""/>
+            </a:pPr>
+            <a:r>
+              <a:rPr b="0" lang="en-US" sz="2000" spc="-1" strike="noStrike">
+                <a:latin typeface="Arial"/>
+              </a:rPr>
+              <a:t>Fourth Outline Level</a:t>
+            </a:r>
+            <a:endParaRPr b="0" lang="en-US" sz="2000" spc="-1" strike="noStrike">
+              <a:latin typeface="Arial"/>
+            </a:endParaRPr>
+          </a:p>
+          <a:p>
+            <a:pPr lvl="4" marL="2160000" indent="-216000">
+              <a:spcBef>
+                <a:spcPts val="283"/>
+              </a:spcBef>
+              <a:buClr>
+                <a:srgbClr val="000000"/>
+              </a:buClr>
+              <a:buSzPct val="45000"/>
+              <a:buFont typeface="Wingdings" charset="2"/>
+              <a:buChar char=""/>
+            </a:pPr>
+            <a:r>
+              <a:rPr b="0" lang="en-US" sz="2000" spc="-1" strike="noStrike">
+                <a:latin typeface="Arial"/>
+              </a:rPr>
+              <a:t>Fifth Outline Level</a:t>
+            </a:r>
+            <a:endParaRPr b="0" lang="en-US" sz="2000" spc="-1" strike="noStrike">
+              <a:latin typeface="Arial"/>
+            </a:endParaRPr>
+          </a:p>
+          <a:p>
+            <a:pPr lvl="5" marL="2592000" indent="-216000">
+              <a:spcBef>
+                <a:spcPts val="283"/>
+              </a:spcBef>
+              <a:buClr>
+                <a:srgbClr val="000000"/>
+              </a:buClr>
+              <a:buSzPct val="45000"/>
+              <a:buFont typeface="Wingdings" charset="2"/>
+              <a:buChar char=""/>
+            </a:pPr>
+            <a:r>
+              <a:rPr b="0" lang="en-US" sz="2000" spc="-1" strike="noStrike">
+                <a:latin typeface="Arial"/>
+              </a:rPr>
+              <a:t>Sixth Outline Level</a:t>
+            </a:r>
+            <a:endParaRPr b="0" lang="en-US" sz="2000" spc="-1" strike="noStrike">
+              <a:latin typeface="Arial"/>
+            </a:endParaRPr>
+          </a:p>
+          <a:p>
+            <a:pPr lvl="6" marL="3024000" indent="-216000">
+              <a:spcBef>
+                <a:spcPts val="283"/>
+              </a:spcBef>
+              <a:buClr>
+                <a:srgbClr val="000000"/>
+              </a:buClr>
+              <a:buSzPct val="45000"/>
+              <a:buFont typeface="Wingdings" charset="2"/>
+              <a:buChar char=""/>
+            </a:pPr>
+            <a:r>
+              <a:rPr b="0" lang="en-US" sz="2000" spc="-1" strike="noStrike">
+                <a:latin typeface="Arial"/>
+              </a:rPr>
+              <a:t>Seventh Outline Level</a:t>
+            </a:r>
+            <a:endParaRPr b="0" lang="en-US" sz="2000" spc="-1" strike="noStrike">
+              <a:latin typeface="Arial"/>
+            </a:endParaRPr>
+          </a:p>
+        </p:txBody>
+      </p:sp>
     </p:spTree>
   </p:cSld>
   <p:clrMap bg1="lt1" bg2="lt2" tx1="dk1" tx2="dk2" accent1="accent1" accent2="accent2" accent3="accent3" accent4="accent4" accent5="accent5" accent6="accent6" hlink="hlink" folHlink="folHlink"/>
@@ -1759,14 +2177,14 @@
       </p:grpSpPr>
       <p:sp>
         <p:nvSpPr>
-          <p:cNvPr id="42" name="CustomShape 1"/>
+          <p:cNvPr id="44" name="CustomShape 1"/>
           <p:cNvSpPr/>
           <p:nvPr/>
         </p:nvSpPr>
         <p:spPr>
           <a:xfrm>
             <a:off x="0" y="380880"/>
-            <a:ext cx="32917680" cy="3123360"/>
+            <a:ext cx="32917320" cy="3123000"/>
           </a:xfrm>
           <a:prstGeom prst="rect">
             <a:avLst/>
@@ -1848,14 +2266,14 @@
       </p:sp>
       <p:sp>
         <p:nvSpPr>
-          <p:cNvPr id="43" name="CustomShape 2"/>
+          <p:cNvPr id="45" name="CustomShape 2"/>
           <p:cNvSpPr/>
           <p:nvPr/>
         </p:nvSpPr>
         <p:spPr>
           <a:xfrm>
             <a:off x="503280" y="3936960"/>
-            <a:ext cx="10067040" cy="5587200"/>
+            <a:ext cx="10066680" cy="5586840"/>
           </a:xfrm>
           <a:prstGeom prst="roundRect">
             <a:avLst>
@@ -1867,7 +2285,7 @@
           </a:solidFill>
           <a:ln w="76320">
             <a:solidFill>
-              <a:schemeClr val="tx1"/>
+              <a:srgbClr val="000000"/>
             </a:solidFill>
             <a:round/>
           </a:ln>
@@ -1879,9 +2297,9 @@
           <a:fontRef idx="minor"/>
         </p:style>
         <p:txBody>
-          <a:bodyPr lIns="0" rIns="0" tIns="0" bIns="0"/>
-          <a:p>
-            <a:pPr marL="326880" algn="ctr">
+          <a:bodyPr lIns="0" rIns="137160" tIns="0" bIns="0"/>
+          <a:p>
+            <a:pPr marL="326880" algn="just">
               <a:lnSpc>
                 <a:spcPct val="100000"/>
               </a:lnSpc>
@@ -1901,7 +2319,7 @@
             </a:endParaRPr>
           </a:p>
           <a:p>
-            <a:pPr marL="326880">
+            <a:pPr marL="326880" algn="just">
               <a:lnSpc>
                 <a:spcPct val="100000"/>
               </a:lnSpc>
@@ -1910,7 +2328,7 @@
               </a:spcBef>
             </a:pPr>
             <a:r>
-              <a:rPr b="0" lang="en-US" sz="2400" spc="-1" strike="noStrike">
+              <a:rPr b="0" lang="en-US" sz="1800" spc="-1" strike="noStrike">
                 <a:solidFill>
                   <a:srgbClr val="000000"/>
                 </a:solidFill>
@@ -1920,21 +2338,21 @@
               <a:t>	</a:t>
             </a:r>
             <a:r>
-              <a:rPr b="0" lang="en-US" sz="1500" spc="-1" strike="noStrike">
+              <a:rPr b="0" lang="en-US" sz="2000" spc="-1" strike="noStrike">
                 <a:solidFill>
                   <a:srgbClr val="000000"/>
                 </a:solidFill>
                 <a:latin typeface="Arial"/>
                 <a:ea typeface="ＭＳ Ｐゴシック"/>
               </a:rPr>
-              <a:t>In the world of sports, predicting a game’s outcome has myriad benefits. It can help coaches and players learn what areas to focus on. It can help sportswriters write articles outlining the predictions for season-final standings. It can help oddsmakers set profitable betting lines. Unfortunately for these professionals, current best NHL game prediction accuracy is less than 70%. This is generally attributed to simple randomness in sports, the general perception of higher parity in the NHL as opposed to other sports (we all know the Patriots are going to be in the postseason, right?), and of course the randomness of ice condition. Bad bounces, breaks, millimetres in difference in skate angle, etc. Nonetheless, 70% isn’t bad, but naturally everyone wants these to be better.</a:t>
-            </a:r>
-            <a:endParaRPr b="0" lang="en-US" sz="1500" spc="-1" strike="noStrike">
-              <a:latin typeface="Arial"/>
-            </a:endParaRPr>
-          </a:p>
-          <a:p>
-            <a:pPr marL="326880">
+              <a:t>Most of the existing research in using Machine learning to predict outcomes in hockey games was focused on predicting the win or loss outcome for a given team. Rather than retreaded an old problem space, which would simply amount to wondering if the science has improved in the past few years, or training algorithms have, we decided to look at a new problem: period prediction. An NHL game is divided into 3 periods of twenty minutes each. If the score is still tied after these three regulation periods, a 4th overtime period is played with the current standard being a single 5-minute period. We included these in our analyses as well. Despite the fact that statistics will be different between a full 20-minute period and a shorter 5-minute period, we are looking at predictors for each period individually, so our overall models will not be affected by this bundling.</a:t>
+            </a:r>
+            <a:endParaRPr b="0" lang="en-US" sz="2000" spc="-1" strike="noStrike">
+              <a:latin typeface="Arial"/>
+            </a:endParaRPr>
+          </a:p>
+          <a:p>
+            <a:pPr marL="326880" algn="just">
               <a:lnSpc>
                 <a:spcPct val="100000"/>
               </a:lnSpc>
@@ -1943,7 +2361,7 @@
               </a:spcBef>
             </a:pPr>
             <a:r>
-              <a:rPr b="0" lang="en-US" sz="1500" spc="-1" strike="noStrike">
+              <a:rPr b="0" lang="en-US" sz="2000" spc="-1" strike="noStrike">
                 <a:solidFill>
                   <a:srgbClr val="000000"/>
                 </a:solidFill>
@@ -1953,21 +2371,77 @@
               <a:t>	</a:t>
             </a:r>
             <a:r>
-              <a:rPr b="0" lang="en-US" sz="1500" spc="-1" strike="noStrike">
+              <a:rPr b="0" lang="en-US" sz="2000" spc="-1" strike="noStrike">
                 <a:solidFill>
                   <a:srgbClr val="000000"/>
                 </a:solidFill>
                 <a:latin typeface="Arial"/>
                 <a:ea typeface="ＭＳ Ｐゴシック"/>
               </a:rPr>
-              <a:t>Rather than retreaded an old problem space, which would simply amount to wondering if the science has improved in the past few years, or training algorithms have, we decided to look at a new problem: period prediction. An NHL game is divided into 3 periods of twenty minutes each. If the score is still tied after these three regulation periods, a 4th overtime period is played. Overtime rules have changed a few times in the past couple of decades, but the current standard is a single 5-minute period. We included these in our analyses as well. Despite the fact that statistics will be different between a full 20-minute period and a shorter 5-minute period, we are looking at predictors for each period individually, so our overall models will not be affected by this bundling.</a:t>
-            </a:r>
-            <a:endParaRPr b="0" lang="en-US" sz="1500" spc="-1" strike="noStrike">
-              <a:latin typeface="Arial"/>
-            </a:endParaRPr>
-          </a:p>
-          <a:p>
-            <a:pPr marL="326880">
+              <a:t>The advantage to such a prediction might be immediately obvious to a coach, although probably not as useful for Vegas. If your team enters the second period trailing by 2, how do you overcome that lead? Our goal is to see if we can find which statistics, taken from the standard metrics used in NHL statkeeping, can be beneficial in predicting the outcome of a period.</a:t>
+            </a:r>
+            <a:endParaRPr b="0" lang="en-US" sz="2000" spc="-1" strike="noStrike">
+              <a:latin typeface="Arial"/>
+            </a:endParaRPr>
+          </a:p>
+        </p:txBody>
+      </p:sp>
+      <p:sp>
+        <p:nvSpPr>
+          <p:cNvPr id="46" name="CustomShape 3"/>
+          <p:cNvSpPr/>
+          <p:nvPr/>
+        </p:nvSpPr>
+        <p:spPr>
+          <a:xfrm>
+            <a:off x="22345560" y="3936960"/>
+            <a:ext cx="10066680" cy="5586840"/>
+          </a:xfrm>
+          <a:prstGeom prst="roundRect">
+            <a:avLst>
+              <a:gd name="adj" fmla="val 2269"/>
+            </a:avLst>
+          </a:prstGeom>
+          <a:solidFill>
+            <a:srgbClr val="eef7f8"/>
+          </a:solidFill>
+          <a:ln w="76320">
+            <a:solidFill>
+              <a:srgbClr val="000000"/>
+            </a:solidFill>
+            <a:round/>
+          </a:ln>
+        </p:spPr>
+        <p:style>
+          <a:lnRef idx="0"/>
+          <a:fillRef idx="0"/>
+          <a:effectRef idx="0"/>
+          <a:fontRef idx="minor"/>
+        </p:style>
+        <p:txBody>
+          <a:bodyPr lIns="0" rIns="137160" tIns="0" bIns="0"/>
+          <a:p>
+            <a:pPr marL="326880" algn="ctr">
+              <a:lnSpc>
+                <a:spcPct val="100000"/>
+              </a:lnSpc>
+            </a:pPr>
+            <a:r>
+              <a:rPr b="1" lang="en-US" sz="2900" spc="-1" strike="noStrike">
+                <a:solidFill>
+                  <a:srgbClr val="000000"/>
+                </a:solidFill>
+                <a:latin typeface="Arial"/>
+                <a:ea typeface="ＭＳ Ｐゴシック"/>
+              </a:rPr>
+              <a:t>Results</a:t>
+            </a:r>
+            <a:endParaRPr b="0" lang="en-US" sz="2900" spc="-1" strike="noStrike">
+              <a:latin typeface="Arial"/>
+            </a:endParaRPr>
+          </a:p>
+          <a:p>
+            <a:pPr marL="326880" algn="just">
               <a:lnSpc>
                 <a:spcPct val="100000"/>
               </a:lnSpc>
@@ -1976,41 +2450,31 @@
               </a:spcBef>
             </a:pPr>
             <a:r>
-              <a:rPr b="0" lang="en-US" sz="1500" spc="-1" strike="noStrike">
+              <a:rPr b="0" lang="en-US" sz="2400" spc="-1" strike="noStrike">
                 <a:solidFill>
                   <a:srgbClr val="000000"/>
                 </a:solidFill>
                 <a:latin typeface="Arial"/>
                 <a:ea typeface="ＭＳ Ｐゴシック"/>
               </a:rPr>
-              <a:t>	</a:t>
-            </a:r>
-            <a:r>
-              <a:rPr b="0" lang="en-US" sz="1500" spc="-1" strike="noStrike">
-                <a:solidFill>
-                  <a:srgbClr val="000000"/>
-                </a:solidFill>
-                <a:latin typeface="Arial"/>
-                <a:ea typeface="ＭＳ Ｐゴシック"/>
-              </a:rPr>
-              <a:t>The advantage to such a prediction might be immediately obvious to a coach, although probably not as useful for Vegas. If your team enters the second period trailing by 2, how do you overcome that lead? If hits have a high correlation with success, maybe play more aggressively. If blocked shots have a low correlation, don’t worry about taking too many bad shots at the risk of turning the puck over. Our goal is to see if we can find which statistics, taken from the standard metrics used in NHL statkeeping, can be beneficial in predicting the outcome of a period.</a:t>
-            </a:r>
-            <a:endParaRPr b="0" lang="en-US" sz="1500" spc="-1" strike="noStrike">
-              <a:latin typeface="Arial"/>
-            </a:endParaRPr>
-          </a:p>
-        </p:txBody>
-      </p:sp>
-      <p:sp>
-        <p:nvSpPr>
-          <p:cNvPr id="44" name="CustomShape 3"/>
+              <a:t>Our Gradient Boost classifier performed the best of the models that we explored, however, it still did not fully reach our desired prediction accuracy of 60% per period. We were able to achieve accuracies between 35-45% for periods 1 – 3, with the models getting more accurate as the games progressed. Interestingly, the model was capable of predicting the goal differentials of overtime periods with a ~75% accuracy. To achieve these results, the outcomes were binned to fit in {-1,0,1} goal differential, and we used a grid search to optimize the parameters of the model. A forward step-wise feature selection was performed for each period to determine which features were most important in predicting the outcomes of the period. </a:t>
+            </a:r>
+            <a:endParaRPr b="0" lang="en-US" sz="2400" spc="-1" strike="noStrike">
+              <a:latin typeface="Arial"/>
+            </a:endParaRPr>
+          </a:p>
+        </p:txBody>
+      </p:sp>
+      <p:sp>
+        <p:nvSpPr>
+          <p:cNvPr id="47" name="CustomShape 4"/>
           <p:cNvSpPr/>
           <p:nvPr/>
         </p:nvSpPr>
         <p:spPr>
           <a:xfrm>
-            <a:off x="22345560" y="3936960"/>
-            <a:ext cx="10067040" cy="5587200"/>
+            <a:off x="22345560" y="17221320"/>
+            <a:ext cx="10066680" cy="4266000"/>
           </a:xfrm>
           <a:prstGeom prst="roundRect">
             <a:avLst>
@@ -2022,7 +2486,7 @@
           </a:solidFill>
           <a:ln w="76320">
             <a:solidFill>
-              <a:schemeClr val="tx1"/>
+              <a:srgbClr val="000000"/>
             </a:solidFill>
             <a:round/>
           </a:ln>
@@ -2036,27 +2500,27 @@
         <p:txBody>
           <a:bodyPr lIns="0" rIns="0" tIns="0" bIns="0"/>
           <a:p>
-            <a:pPr marL="326880" algn="ctr">
+            <a:pPr marL="976320" indent="-648360" algn="ctr">
               <a:lnSpc>
                 <a:spcPct val="100000"/>
               </a:lnSpc>
             </a:pPr>
             <a:r>
-              <a:rPr b="1" lang="en-US" sz="2900" spc="-1" strike="noStrike">
+              <a:rPr b="1" lang="en-US" sz="2600" spc="-1" strike="noStrike">
                 <a:solidFill>
                   <a:srgbClr val="000000"/>
                 </a:solidFill>
                 <a:latin typeface="Arial"/>
                 <a:ea typeface="ＭＳ Ｐゴシック"/>
               </a:rPr>
-              <a:t>Results</a:t>
-            </a:r>
-            <a:endParaRPr b="0" lang="en-US" sz="2900" spc="-1" strike="noStrike">
-              <a:latin typeface="Arial"/>
-            </a:endParaRPr>
-          </a:p>
-          <a:p>
-            <a:pPr marL="326880">
+              <a:t>References</a:t>
+            </a:r>
+            <a:endParaRPr b="0" lang="en-US" sz="2600" spc="-1" strike="noStrike">
+              <a:latin typeface="Arial"/>
+            </a:endParaRPr>
+          </a:p>
+          <a:p>
+            <a:pPr marL="976320" indent="-648360">
               <a:lnSpc>
                 <a:spcPct val="100000"/>
               </a:lnSpc>
@@ -2065,21 +2529,21 @@
               </a:spcBef>
             </a:pPr>
             <a:r>
-              <a:rPr b="0" lang="en-US" sz="2400" spc="-1" strike="noStrike">
+              <a:rPr b="0" lang="en-US" sz="1800" spc="-1" strike="noStrike">
                 <a:solidFill>
                   <a:srgbClr val="000000"/>
                 </a:solidFill>
                 <a:latin typeface="Arial"/>
                 <a:ea typeface="ＭＳ Ｐゴシック"/>
               </a:rPr>
-              <a:t>Lorem ipsum dolor sit amet, consectetuer adipiscing elit. Vivamus sagittis, risus et mattis convallis, leo metus molestie sapien, molestie facilisis mi tortor in arcu. Integer iaculis magna a arcu. Duis nibh. Donec tempus pede nec massa. Donec eget felis id ante consequat viverra. Proin adipiscing. Aliquam mattis magna a justo. </a:t>
-            </a:r>
-            <a:endParaRPr b="0" lang="en-US" sz="2400" spc="-1" strike="noStrike">
-              <a:latin typeface="Arial"/>
-            </a:endParaRPr>
-          </a:p>
-          <a:p>
-            <a:pPr marL="326880">
+              <a:t>Weissbock, J., Viktor, H., Inkpen, D.: Use of performance metrics to forecast success in the national hockey league. European Conference on Machine Learning: Sports Analytics and Machine Learning Workshop (2013) http://ceur-ws.org/Vol-1969/paper-06.pdf </a:t>
+            </a:r>
+            <a:endParaRPr b="0" lang="en-US" sz="1800" spc="-1" strike="noStrike">
+              <a:latin typeface="Arial"/>
+            </a:endParaRPr>
+          </a:p>
+          <a:p>
+            <a:pPr marL="976320" indent="-648360">
               <a:lnSpc>
                 <a:spcPct val="100000"/>
               </a:lnSpc>
@@ -2088,77 +2552,21 @@
               </a:spcBef>
             </a:pPr>
             <a:r>
-              <a:rPr b="0" lang="en-US" sz="2400" spc="-1" strike="noStrike">
+              <a:rPr b="0" lang="en-US" sz="1800" spc="-1" strike="noStrike">
                 <a:solidFill>
                   <a:srgbClr val="000000"/>
                 </a:solidFill>
                 <a:latin typeface="Arial"/>
                 <a:ea typeface="ＭＳ Ｐゴシック"/>
               </a:rPr>
-              <a:t>Mauris nunc. Class aptent taciti sociosqu ad litora torquent per conubia nostra, per inceptos hymenaeos. Praesent at ante. Quisque elit pede, gravida in, congue vitae, consectetuer a, lectus. Aenean in massa. Sed diam. Class aptent taciti sociosqu ad litora torquent per conubia nostra, per inceptos hymenaeos.</a:t>
-            </a:r>
-            <a:endParaRPr b="0" lang="en-US" sz="2400" spc="-1" strike="noStrike">
-              <a:latin typeface="Arial"/>
-            </a:endParaRPr>
-          </a:p>
-        </p:txBody>
-      </p:sp>
-      <p:sp>
-        <p:nvSpPr>
-          <p:cNvPr id="45" name="CustomShape 4"/>
-          <p:cNvSpPr/>
-          <p:nvPr/>
-        </p:nvSpPr>
-        <p:spPr>
-          <a:xfrm>
-            <a:off x="22345560" y="17221320"/>
-            <a:ext cx="10067040" cy="4266360"/>
-          </a:xfrm>
-          <a:prstGeom prst="roundRect">
-            <a:avLst>
-              <a:gd name="adj" fmla="val 2269"/>
-            </a:avLst>
-          </a:prstGeom>
-          <a:solidFill>
-            <a:srgbClr val="eef7f8"/>
-          </a:solidFill>
-          <a:ln w="76320">
-            <a:solidFill>
-              <a:schemeClr val="tx1"/>
-            </a:solidFill>
-            <a:round/>
-          </a:ln>
-        </p:spPr>
-        <p:style>
-          <a:lnRef idx="0"/>
-          <a:fillRef idx="0"/>
-          <a:effectRef idx="0"/>
-          <a:fontRef idx="minor"/>
-        </p:style>
-        <p:txBody>
-          <a:bodyPr lIns="0" rIns="0" tIns="0" bIns="0"/>
-          <a:p>
-            <a:pPr marL="976320" indent="-648720" algn="ctr">
-              <a:lnSpc>
-                <a:spcPct val="100000"/>
-              </a:lnSpc>
-            </a:pPr>
-            <a:r>
-              <a:rPr b="1" lang="en-US" sz="2600" spc="-1" strike="noStrike">
-                <a:solidFill>
-                  <a:srgbClr val="000000"/>
-                </a:solidFill>
-                <a:latin typeface="Arial"/>
-                <a:ea typeface="ＭＳ Ｐゴシック"/>
-              </a:rPr>
-              <a:t>References</a:t>
-            </a:r>
-            <a:endParaRPr b="0" lang="en-US" sz="2600" spc="-1" strike="noStrike">
-              <a:latin typeface="Arial"/>
-            </a:endParaRPr>
-          </a:p>
-          <a:p>
-            <a:pPr marL="976320" indent="-648720">
+              <a:t>Pischedda, Gianni: Predicting NHL Match Outcomes with ML Models. In: International Journal of Computer Applications (0975 – 8887), Volume 101– No.9, September 2014. (2014) http://citeseerx.ist.psu.edu/viewdoc/download?doi=10.1.1.735.795&amp;rep=rep1&amp;type=pdf</a:t>
+            </a:r>
+            <a:endParaRPr b="0" lang="en-US" sz="1800" spc="-1" strike="noStrike">
+              <a:latin typeface="Arial"/>
+            </a:endParaRPr>
+          </a:p>
+          <a:p>
+            <a:pPr marL="976320" indent="-648360">
               <a:lnSpc>
                 <a:spcPct val="100000"/>
               </a:lnSpc>
@@ -2174,14 +2582,14 @@
                 <a:latin typeface="Arial"/>
                 <a:ea typeface="ＭＳ Ｐゴシック"/>
               </a:rPr>
-              <a:t>Lorem ipsum dolor sit amet, consectetuer adipiscing elit.</a:t>
+              <a:t>Weissbock, Josh; Inkpen, Diana: Combining Textual Pre-game Reports and Statistical Data for Predicting Success in the National Hockey League. In:  Advances in Artificial Intelligence 27th Canadian Conference on Artificial Intelligence, Canadian AI 2014, Montréal, QC, Canada, May 6-9, 2014. (2014) </a:t>
             </a:r>
             <a:endParaRPr b="0" lang="en-US" sz="1800" spc="-1" strike="noStrike">
               <a:latin typeface="Arial"/>
             </a:endParaRPr>
           </a:p>
           <a:p>
-            <a:pPr marL="976320" indent="-648720">
+            <a:pPr marL="976320" indent="-648360">
               <a:lnSpc>
                 <a:spcPct val="100000"/>
               </a:lnSpc>
@@ -2189,22 +2597,310 @@
                 <a:spcPts val="862"/>
               </a:spcBef>
             </a:pPr>
-            <a:r>
-              <a:rPr b="0" lang="en-US" sz="1800" spc="-1" strike="noStrike">
+            <a:endParaRPr b="0" lang="en-US" sz="1800" spc="-1" strike="noStrike">
+              <a:latin typeface="Arial"/>
+            </a:endParaRPr>
+          </a:p>
+        </p:txBody>
+      </p:sp>
+      <p:pic>
+        <p:nvPicPr>
+          <p:cNvPr id="48" name="Picture 1" descr=""/>
+          <p:cNvPicPr/>
+          <p:nvPr/>
+        </p:nvPicPr>
+        <p:blipFill>
+          <a:blip r:embed="rId1"/>
+          <a:stretch/>
+        </p:blipFill>
+        <p:spPr>
+          <a:xfrm>
+            <a:off x="2971800" y="507960"/>
+            <a:ext cx="4799520" cy="2462760"/>
+          </a:xfrm>
+          <a:prstGeom prst="rect">
+            <a:avLst/>
+          </a:prstGeom>
+          <a:ln>
+            <a:noFill/>
+          </a:ln>
+        </p:spPr>
+      </p:pic>
+      <p:pic>
+        <p:nvPicPr>
+          <p:cNvPr id="49" name="Picture 2" descr=""/>
+          <p:cNvPicPr/>
+          <p:nvPr/>
+        </p:nvPicPr>
+        <p:blipFill>
+          <a:blip r:embed="rId2"/>
+          <a:stretch/>
+        </p:blipFill>
+        <p:spPr>
+          <a:xfrm>
+            <a:off x="25526880" y="457200"/>
+            <a:ext cx="3961440" cy="2970720"/>
+          </a:xfrm>
+          <a:prstGeom prst="rect">
+            <a:avLst/>
+          </a:prstGeom>
+          <a:ln>
+            <a:noFill/>
+          </a:ln>
+        </p:spPr>
+      </p:pic>
+      <p:sp>
+        <p:nvSpPr>
+          <p:cNvPr id="50" name="CustomShape 5"/>
+          <p:cNvSpPr/>
+          <p:nvPr/>
+        </p:nvSpPr>
+        <p:spPr>
+          <a:xfrm>
+            <a:off x="18786600" y="7936560"/>
+            <a:ext cx="1695600" cy="1572840"/>
+          </a:xfrm>
+          <a:prstGeom prst="rect">
+            <a:avLst/>
+          </a:prstGeom>
+          <a:noFill/>
+          <a:ln>
+            <a:noFill/>
+          </a:ln>
+        </p:spPr>
+        <p:style>
+          <a:lnRef idx="0"/>
+          <a:fillRef idx="0"/>
+          <a:effectRef idx="0"/>
+          <a:fontRef idx="minor"/>
+        </p:style>
+      </p:sp>
+      <p:sp>
+        <p:nvSpPr>
+          <p:cNvPr id="51" name="CustomShape 6"/>
+          <p:cNvSpPr/>
+          <p:nvPr/>
+        </p:nvSpPr>
+        <p:spPr>
+          <a:xfrm>
+            <a:off x="12893040" y="3383280"/>
+            <a:ext cx="6073920" cy="4785480"/>
+          </a:xfrm>
+          <a:prstGeom prst="rect">
+            <a:avLst/>
+          </a:prstGeom>
+          <a:noFill/>
+          <a:ln>
+            <a:noFill/>
+          </a:ln>
+        </p:spPr>
+        <p:style>
+          <a:lnRef idx="0"/>
+          <a:fillRef idx="0"/>
+          <a:effectRef idx="0"/>
+          <a:fontRef idx="minor"/>
+        </p:style>
+      </p:sp>
+      <p:sp>
+        <p:nvSpPr>
+          <p:cNvPr id="52" name="CustomShape 7"/>
+          <p:cNvSpPr/>
+          <p:nvPr/>
+        </p:nvSpPr>
+        <p:spPr>
+          <a:xfrm>
+            <a:off x="18786600" y="7936560"/>
+            <a:ext cx="180360" cy="232200"/>
+          </a:xfrm>
+          <a:prstGeom prst="rect">
+            <a:avLst/>
+          </a:prstGeom>
+          <a:noFill/>
+          <a:ln>
+            <a:noFill/>
+          </a:ln>
+        </p:spPr>
+        <p:style>
+          <a:lnRef idx="0"/>
+          <a:fillRef idx="0"/>
+          <a:effectRef idx="0"/>
+          <a:fontRef idx="minor"/>
+        </p:style>
+      </p:sp>
+      <p:pic>
+        <p:nvPicPr>
+          <p:cNvPr id="53" name="" descr=""/>
+          <p:cNvPicPr/>
+          <p:nvPr/>
+        </p:nvPicPr>
+        <p:blipFill>
+          <a:blip r:embed="rId3"/>
+          <a:stretch/>
+        </p:blipFill>
+        <p:spPr>
+          <a:xfrm>
+            <a:off x="17388360" y="16733520"/>
+            <a:ext cx="4374000" cy="4388760"/>
+          </a:xfrm>
+          <a:prstGeom prst="rect">
+            <a:avLst/>
+          </a:prstGeom>
+          <a:ln>
+            <a:noFill/>
+          </a:ln>
+        </p:spPr>
+      </p:pic>
+      <p:pic>
+        <p:nvPicPr>
+          <p:cNvPr id="54" name="" descr=""/>
+          <p:cNvPicPr/>
+          <p:nvPr/>
+        </p:nvPicPr>
+        <p:blipFill>
+          <a:blip r:embed="rId4"/>
+          <a:stretch/>
+        </p:blipFill>
+        <p:spPr>
+          <a:xfrm>
+            <a:off x="11178000" y="3661560"/>
+            <a:ext cx="10240920" cy="7676640"/>
+          </a:xfrm>
+          <a:prstGeom prst="rect">
+            <a:avLst/>
+          </a:prstGeom>
+          <a:ln>
+            <a:noFill/>
+          </a:ln>
+        </p:spPr>
+      </p:pic>
+      <p:sp>
+        <p:nvSpPr>
+          <p:cNvPr id="55" name="CustomShape 8"/>
+          <p:cNvSpPr/>
+          <p:nvPr/>
+        </p:nvSpPr>
+        <p:spPr>
+          <a:xfrm>
+            <a:off x="18786600" y="15145200"/>
+            <a:ext cx="180360" cy="232200"/>
+          </a:xfrm>
+          <a:prstGeom prst="rect">
+            <a:avLst/>
+          </a:prstGeom>
+          <a:noFill/>
+          <a:ln>
+            <a:noFill/>
+          </a:ln>
+        </p:spPr>
+        <p:style>
+          <a:lnRef idx="0"/>
+          <a:fillRef idx="0"/>
+          <a:effectRef idx="0"/>
+          <a:fontRef idx="minor"/>
+        </p:style>
+      </p:sp>
+      <p:pic>
+        <p:nvPicPr>
+          <p:cNvPr id="56" name="" descr=""/>
+          <p:cNvPicPr/>
+          <p:nvPr/>
+        </p:nvPicPr>
+        <p:blipFill>
+          <a:blip r:embed="rId5"/>
+          <a:stretch/>
+        </p:blipFill>
+        <p:spPr>
+          <a:xfrm>
+            <a:off x="10623960" y="11405520"/>
+            <a:ext cx="6217200" cy="4662720"/>
+          </a:xfrm>
+          <a:prstGeom prst="rect">
+            <a:avLst/>
+          </a:prstGeom>
+          <a:ln>
+            <a:noFill/>
+          </a:ln>
+        </p:spPr>
+      </p:pic>
+      <p:pic>
+        <p:nvPicPr>
+          <p:cNvPr id="57" name="" descr=""/>
+          <p:cNvPicPr/>
+          <p:nvPr/>
+        </p:nvPicPr>
+        <p:blipFill>
+          <a:blip r:embed="rId6"/>
+          <a:stretch/>
+        </p:blipFill>
+        <p:spPr>
+          <a:xfrm>
+            <a:off x="16315200" y="11373480"/>
+            <a:ext cx="6217560" cy="4663080"/>
+          </a:xfrm>
+          <a:prstGeom prst="rect">
+            <a:avLst/>
+          </a:prstGeom>
+          <a:ln>
+            <a:noFill/>
+          </a:ln>
+        </p:spPr>
+      </p:pic>
+      <p:sp>
+        <p:nvSpPr>
+          <p:cNvPr id="58" name="CustomShape 9"/>
+          <p:cNvSpPr/>
+          <p:nvPr/>
+        </p:nvSpPr>
+        <p:spPr>
+          <a:xfrm>
+            <a:off x="22345560" y="10312560"/>
+            <a:ext cx="10066680" cy="6552000"/>
+          </a:xfrm>
+          <a:prstGeom prst="roundRect">
+            <a:avLst>
+              <a:gd name="adj" fmla="val 2269"/>
+            </a:avLst>
+          </a:prstGeom>
+          <a:solidFill>
+            <a:srgbClr val="eef7f8"/>
+          </a:solidFill>
+          <a:ln w="76320">
+            <a:solidFill>
+              <a:srgbClr val="000000"/>
+            </a:solidFill>
+            <a:round/>
+          </a:ln>
+        </p:spPr>
+        <p:style>
+          <a:lnRef idx="0"/>
+          <a:fillRef idx="0"/>
+          <a:effectRef idx="0"/>
+          <a:fontRef idx="minor"/>
+        </p:style>
+        <p:txBody>
+          <a:bodyPr lIns="0" rIns="137160" tIns="0" bIns="0"/>
+          <a:p>
+            <a:pPr marL="326880" algn="ctr">
+              <a:lnSpc>
+                <a:spcPct val="100000"/>
+              </a:lnSpc>
+            </a:pPr>
+            <a:r>
+              <a:rPr b="1" lang="en-US" sz="2900" spc="-1" strike="noStrike">
                 <a:solidFill>
                   <a:srgbClr val="000000"/>
                 </a:solidFill>
                 <a:latin typeface="Arial"/>
                 <a:ea typeface="ＭＳ Ｐゴシック"/>
               </a:rPr>
-              <a:t>Vivamus sagittis, risus et mattis convallis, leo metus molestie sapien, molestie facilisis mi tort</a:t>
-            </a:r>
-            <a:endParaRPr b="0" lang="en-US" sz="1800" spc="-1" strike="noStrike">
-              <a:latin typeface="Arial"/>
-            </a:endParaRPr>
-          </a:p>
-          <a:p>
-            <a:pPr marL="976320" indent="-648720">
+              <a:t>Discussion</a:t>
+            </a:r>
+            <a:endParaRPr b="0" lang="en-US" sz="2900" spc="-1" strike="noStrike">
+              <a:latin typeface="Arial"/>
+            </a:endParaRPr>
+          </a:p>
+          <a:p>
+            <a:pPr marL="326880" algn="just">
               <a:lnSpc>
                 <a:spcPct val="100000"/>
               </a:lnSpc>
@@ -2213,21 +2909,87 @@
               </a:spcBef>
             </a:pPr>
             <a:r>
-              <a:rPr b="0" lang="en-US" sz="1800" spc="-1" strike="noStrike">
+              <a:rPr b="0" lang="en-US" sz="2400" spc="-1" strike="noStrike">
                 <a:solidFill>
                   <a:srgbClr val="000000"/>
                 </a:solidFill>
                 <a:latin typeface="Arial"/>
                 <a:ea typeface="ＭＳ Ｐゴシック"/>
               </a:rPr>
-              <a:t>or in arcu. Integer iaculis magna a arcu. Duis nibh. Donec tempus pede nec massa. Donec eget felis id ante consequat viverra.</a:t>
-            </a:r>
-            <a:endParaRPr b="0" lang="en-US" sz="1800" spc="-1" strike="noStrike">
-              <a:latin typeface="Arial"/>
-            </a:endParaRPr>
-          </a:p>
-          <a:p>
-            <a:pPr marL="976320" indent="-648720">
+              <a:t>	</a:t>
+            </a:r>
+            <a:r>
+              <a:rPr b="0" lang="en-US" sz="2400" spc="-1" strike="noStrike">
+                <a:solidFill>
+                  <a:srgbClr val="000000"/>
+                </a:solidFill>
+                <a:latin typeface="Arial"/>
+                <a:ea typeface="ＭＳ Ｐゴシック"/>
+              </a:rPr>
+              <a:t>The ability to predict the outcome for overtime is considered a significant contribution. While predicting the goal differential for each period was perhaps to difficult for the scope of this research effort, there are a number of reasons why the overtime period was as accurate as it was. First, there less classes of goal differential with a sudden death overtime format. When analyzing the features that were used in the models it was interesting to see how some features changed, while others were important across all the periods. For example, penalty differential was important in all the periods, while the number of hits was most important in the first and overtime periods, or the blocked shot differential only proved important in the third period. In terms of predicting goal differential, we may have had better results if we attempted to calculate a goal differential and allowed non-integer values to be a result, and while goals are only counted in integers, a fractional goal differential extrapolated over an entire season could have a significant impact on a teams placement in the standings.</a:t>
+            </a:r>
+            <a:endParaRPr b="0" lang="en-US" sz="2400" spc="-1" strike="noStrike">
+              <a:latin typeface="Arial"/>
+            </a:endParaRPr>
+          </a:p>
+        </p:txBody>
+      </p:sp>
+      <p:sp>
+        <p:nvSpPr>
+          <p:cNvPr id="59" name="CustomShape 10"/>
+          <p:cNvSpPr/>
+          <p:nvPr/>
+        </p:nvSpPr>
+        <p:spPr>
+          <a:xfrm>
+            <a:off x="503280" y="10466280"/>
+            <a:ext cx="10066680" cy="11097000"/>
+          </a:xfrm>
+          <a:prstGeom prst="roundRect">
+            <a:avLst>
+              <a:gd name="adj" fmla="val 2269"/>
+            </a:avLst>
+          </a:prstGeom>
+          <a:solidFill>
+            <a:srgbClr val="eef7f8"/>
+          </a:solidFill>
+          <a:ln w="76320">
+            <a:solidFill>
+              <a:srgbClr val="000000"/>
+            </a:solidFill>
+            <a:round/>
+          </a:ln>
+        </p:spPr>
+        <p:style>
+          <a:lnRef idx="0"/>
+          <a:fillRef idx="0"/>
+          <a:effectRef idx="0"/>
+          <a:fontRef idx="minor"/>
+        </p:style>
+        <p:txBody>
+          <a:bodyPr lIns="0" rIns="137160" tIns="0" bIns="0"/>
+          <a:p>
+            <a:pPr marL="326880" algn="ctr">
+              <a:lnSpc>
+                <a:spcPct val="100000"/>
+              </a:lnSpc>
+            </a:pPr>
+            <a:r>
+              <a:rPr b="1" lang="en-US" sz="2900" spc="-1" strike="noStrike">
+                <a:solidFill>
+                  <a:srgbClr val="000000"/>
+                </a:solidFill>
+                <a:latin typeface="Arial"/>
+                <a:ea typeface="ＭＳ Ｐゴシック"/>
+              </a:rPr>
+              <a:t>Methods</a:t>
+            </a:r>
+            <a:endParaRPr b="0" lang="en-US" sz="2900" spc="-1" strike="noStrike">
+              <a:latin typeface="Arial"/>
+            </a:endParaRPr>
+          </a:p>
+          <a:p>
+            <a:pPr marL="326880" algn="just">
               <a:lnSpc>
                 <a:spcPct val="100000"/>
               </a:lnSpc>
@@ -2236,484 +2998,26 @@
               </a:spcBef>
             </a:pPr>
             <a:r>
-              <a:rPr b="0" lang="en-US" sz="1800" spc="-1" strike="noStrike">
+              <a:rPr b="0" lang="en-US" sz="2800" spc="-1" strike="noStrike">
                 <a:solidFill>
                   <a:srgbClr val="000000"/>
                 </a:solidFill>
                 <a:latin typeface="Arial"/>
                 <a:ea typeface="ＭＳ Ｐゴシック"/>
               </a:rPr>
-              <a:t>Proin adipiscing. Aliquam mattis magna a justo. </a:t>
-            </a:r>
-            <a:endParaRPr b="0" lang="en-US" sz="1800" spc="-1" strike="noStrike">
-              <a:latin typeface="Arial"/>
-            </a:endParaRPr>
-          </a:p>
-          <a:p>
-            <a:pPr marL="976320" indent="-648720">
-              <a:lnSpc>
-                <a:spcPct val="100000"/>
-              </a:lnSpc>
-              <a:spcBef>
-                <a:spcPts val="862"/>
-              </a:spcBef>
-            </a:pPr>
-            <a:r>
-              <a:rPr b="0" lang="en-US" sz="1800" spc="-1" strike="noStrike">
+              <a:t>	</a:t>
+            </a:r>
+            <a:r>
+              <a:rPr b="0" lang="en-US" sz="2800" spc="-1" strike="noStrike">
                 <a:solidFill>
                   <a:srgbClr val="000000"/>
                 </a:solidFill>
                 <a:latin typeface="Arial"/>
                 <a:ea typeface="ＭＳ Ｐゴシック"/>
               </a:rPr>
-              <a:t>Mauris nunc. Class aptent taciti sociosqu ad litora torquent per conubia nostra, per inceptos hymenaeos. Praesent at ante.</a:t>
-            </a:r>
-            <a:endParaRPr b="0" lang="en-US" sz="1800" spc="-1" strike="noStrike">
-              <a:latin typeface="Arial"/>
-            </a:endParaRPr>
-          </a:p>
-          <a:p>
-            <a:pPr marL="976320" indent="-648720">
-              <a:lnSpc>
-                <a:spcPct val="100000"/>
-              </a:lnSpc>
-              <a:spcBef>
-                <a:spcPts val="862"/>
-              </a:spcBef>
-            </a:pPr>
-            <a:r>
-              <a:rPr b="0" lang="en-US" sz="1800" spc="-1" strike="noStrike">
-                <a:solidFill>
-                  <a:srgbClr val="000000"/>
-                </a:solidFill>
-                <a:latin typeface="Arial"/>
-                <a:ea typeface="ＭＳ Ｐゴシック"/>
-              </a:rPr>
-              <a:t>Quisque elit pede, gravida in, congue vitae, consectetuer a, lectus. Aenean in massa. Sed diam. Class aptent taciti sociosqu ad litora torquent per conubia nostra, per inceptos hymenaeos.</a:t>
-            </a:r>
-            <a:endParaRPr b="0" lang="en-US" sz="1800" spc="-1" strike="noStrike">
-              <a:latin typeface="Arial"/>
-            </a:endParaRPr>
-          </a:p>
-        </p:txBody>
-      </p:sp>
-      <p:pic>
-        <p:nvPicPr>
-          <p:cNvPr id="46" name="Picture 1" descr=""/>
-          <p:cNvPicPr/>
-          <p:nvPr/>
-        </p:nvPicPr>
-        <p:blipFill>
-          <a:blip r:embed="rId1"/>
-          <a:stretch/>
-        </p:blipFill>
-        <p:spPr>
-          <a:xfrm>
-            <a:off x="2971800" y="507960"/>
-            <a:ext cx="4799880" cy="2463120"/>
-          </a:xfrm>
-          <a:prstGeom prst="rect">
-            <a:avLst/>
-          </a:prstGeom>
-          <a:ln>
-            <a:noFill/>
-          </a:ln>
-        </p:spPr>
-      </p:pic>
-      <p:pic>
-        <p:nvPicPr>
-          <p:cNvPr id="47" name="Picture 2" descr=""/>
-          <p:cNvPicPr/>
-          <p:nvPr/>
-        </p:nvPicPr>
-        <p:blipFill>
-          <a:blip r:embed="rId2"/>
-          <a:stretch/>
-        </p:blipFill>
-        <p:spPr>
-          <a:xfrm>
-            <a:off x="25526880" y="457200"/>
-            <a:ext cx="3961800" cy="2971080"/>
-          </a:xfrm>
-          <a:prstGeom prst="rect">
-            <a:avLst/>
-          </a:prstGeom>
-          <a:ln>
-            <a:noFill/>
-          </a:ln>
-        </p:spPr>
-      </p:pic>
-      <p:sp>
-        <p:nvSpPr>
-          <p:cNvPr id="48" name="TextShape 5"/>
-          <p:cNvSpPr txBox="1"/>
-          <p:nvPr/>
-        </p:nvSpPr>
-        <p:spPr>
-          <a:xfrm>
-            <a:off x="18786600" y="7936560"/>
-            <a:ext cx="1695960" cy="1573200"/>
-          </a:xfrm>
-          <a:prstGeom prst="rect">
-            <a:avLst/>
-          </a:prstGeom>
-          <a:noFill/>
-          <a:ln>
-            <a:noFill/>
-          </a:ln>
-        </p:spPr>
-      </p:sp>
-      <p:sp>
-        <p:nvSpPr>
-          <p:cNvPr id="49" name="TextShape 6"/>
-          <p:cNvSpPr txBox="1"/>
-          <p:nvPr/>
-        </p:nvSpPr>
-        <p:spPr>
-          <a:xfrm>
-            <a:off x="12893040" y="3383280"/>
-            <a:ext cx="6074280" cy="4785840"/>
-          </a:xfrm>
-          <a:prstGeom prst="rect">
-            <a:avLst/>
-          </a:prstGeom>
-          <a:noFill/>
-          <a:ln>
-            <a:noFill/>
-          </a:ln>
-        </p:spPr>
-      </p:sp>
-      <p:sp>
-        <p:nvSpPr>
-          <p:cNvPr id="50" name="TextShape 7"/>
-          <p:cNvSpPr txBox="1"/>
-          <p:nvPr/>
-        </p:nvSpPr>
-        <p:spPr>
-          <a:xfrm>
-            <a:off x="18786600" y="7936560"/>
-            <a:ext cx="180720" cy="232560"/>
-          </a:xfrm>
-          <a:prstGeom prst="rect">
-            <a:avLst/>
-          </a:prstGeom>
-          <a:noFill/>
-          <a:ln>
-            <a:noFill/>
-          </a:ln>
-        </p:spPr>
-      </p:sp>
-      <p:pic>
-        <p:nvPicPr>
-          <p:cNvPr id="51" name="" descr=""/>
-          <p:cNvPicPr/>
-          <p:nvPr/>
-        </p:nvPicPr>
-        <p:blipFill>
-          <a:blip r:embed="rId3"/>
-          <a:stretch/>
-        </p:blipFill>
-        <p:spPr>
-          <a:xfrm>
-            <a:off x="17388360" y="16733520"/>
-            <a:ext cx="4374360" cy="4389120"/>
-          </a:xfrm>
-          <a:prstGeom prst="rect">
-            <a:avLst/>
-          </a:prstGeom>
-          <a:ln>
-            <a:noFill/>
-          </a:ln>
-        </p:spPr>
-      </p:pic>
-      <p:pic>
-        <p:nvPicPr>
-          <p:cNvPr id="52" name="" descr=""/>
-          <p:cNvPicPr/>
-          <p:nvPr/>
-        </p:nvPicPr>
-        <p:blipFill>
-          <a:blip r:embed="rId4"/>
-          <a:stretch/>
-        </p:blipFill>
-        <p:spPr>
-          <a:xfrm>
-            <a:off x="11178000" y="3661560"/>
-            <a:ext cx="10241280" cy="7677000"/>
-          </a:xfrm>
-          <a:prstGeom prst="rect">
-            <a:avLst/>
-          </a:prstGeom>
-          <a:ln>
-            <a:noFill/>
-          </a:ln>
-        </p:spPr>
-      </p:pic>
-      <p:sp>
-        <p:nvSpPr>
-          <p:cNvPr id="53" name="TextShape 8"/>
-          <p:cNvSpPr txBox="1"/>
-          <p:nvPr/>
-        </p:nvSpPr>
-        <p:spPr>
-          <a:xfrm>
-            <a:off x="18786600" y="15145200"/>
-            <a:ext cx="180720" cy="232560"/>
-          </a:xfrm>
-          <a:prstGeom prst="rect">
-            <a:avLst/>
-          </a:prstGeom>
-          <a:noFill/>
-          <a:ln>
-            <a:noFill/>
-          </a:ln>
-        </p:spPr>
-      </p:sp>
-      <p:pic>
-        <p:nvPicPr>
-          <p:cNvPr id="54" name="" descr=""/>
-          <p:cNvPicPr/>
-          <p:nvPr/>
-        </p:nvPicPr>
-        <p:blipFill>
-          <a:blip r:embed="rId5"/>
-          <a:stretch/>
-        </p:blipFill>
-        <p:spPr>
-          <a:xfrm>
-            <a:off x="10623960" y="11405520"/>
-            <a:ext cx="6217560" cy="4663080"/>
-          </a:xfrm>
-          <a:prstGeom prst="rect">
-            <a:avLst/>
-          </a:prstGeom>
-          <a:ln>
-            <a:noFill/>
-          </a:ln>
-        </p:spPr>
-      </p:pic>
-      <p:pic>
-        <p:nvPicPr>
-          <p:cNvPr id="55" name="" descr=""/>
-          <p:cNvPicPr/>
-          <p:nvPr/>
-        </p:nvPicPr>
-        <p:blipFill>
-          <a:blip r:embed="rId6"/>
-          <a:stretch/>
-        </p:blipFill>
-        <p:spPr>
-          <a:xfrm>
-            <a:off x="16315200" y="11373480"/>
-            <a:ext cx="6217920" cy="4663440"/>
-          </a:xfrm>
-          <a:prstGeom prst="rect">
-            <a:avLst/>
-          </a:prstGeom>
-          <a:ln>
-            <a:noFill/>
-          </a:ln>
-        </p:spPr>
-      </p:pic>
-      <p:sp>
-        <p:nvSpPr>
-          <p:cNvPr id="56" name="CustomShape 9"/>
-          <p:cNvSpPr/>
-          <p:nvPr/>
-        </p:nvSpPr>
-        <p:spPr>
-          <a:xfrm>
-            <a:off x="22345560" y="10312560"/>
-            <a:ext cx="10067040" cy="6552360"/>
-          </a:xfrm>
-          <a:prstGeom prst="roundRect">
-            <a:avLst>
-              <a:gd name="adj" fmla="val 2269"/>
-            </a:avLst>
-          </a:prstGeom>
-          <a:solidFill>
-            <a:srgbClr val="eef7f8"/>
-          </a:solidFill>
-          <a:ln w="76320">
-            <a:solidFill>
-              <a:schemeClr val="tx1"/>
-            </a:solidFill>
-            <a:round/>
-          </a:ln>
-        </p:spPr>
-        <p:style>
-          <a:lnRef idx="0"/>
-          <a:fillRef idx="0"/>
-          <a:effectRef idx="0"/>
-          <a:fontRef idx="minor"/>
-        </p:style>
-        <p:txBody>
-          <a:bodyPr lIns="0" rIns="0" tIns="0" bIns="0"/>
-          <a:p>
-            <a:pPr marL="326880" algn="ctr">
-              <a:lnSpc>
-                <a:spcPct val="100000"/>
-              </a:lnSpc>
-            </a:pPr>
-            <a:r>
-              <a:rPr b="1" lang="en-US" sz="2900" spc="-1" strike="noStrike">
-                <a:solidFill>
-                  <a:srgbClr val="000000"/>
-                </a:solidFill>
-                <a:latin typeface="Arial"/>
-                <a:ea typeface="ＭＳ Ｐゴシック"/>
-              </a:rPr>
-              <a:t>Discussion</a:t>
-            </a:r>
-            <a:endParaRPr b="0" lang="en-US" sz="2900" spc="-1" strike="noStrike">
-              <a:latin typeface="Arial"/>
-            </a:endParaRPr>
-          </a:p>
-          <a:p>
-            <a:pPr marL="326880">
-              <a:lnSpc>
-                <a:spcPct val="100000"/>
-              </a:lnSpc>
-              <a:spcBef>
-                <a:spcPts val="862"/>
-              </a:spcBef>
-            </a:pPr>
-            <a:r>
-              <a:rPr b="0" lang="en-US" sz="2400" spc="-1" strike="noStrike">
-                <a:solidFill>
-                  <a:srgbClr val="000000"/>
-                </a:solidFill>
-                <a:latin typeface="Arial"/>
-                <a:ea typeface="ＭＳ Ｐゴシック"/>
-              </a:rPr>
-              <a:t>Lorem ipsum dolor sit amet, consectetuer adipiscing elit. Vivamus sagittis, risus et mattis convallis, leo metus molestie sapien, molestie facilisis mi tortor in arcu. Integer iaculis magna a arcu. Duis nibh. Donec tempus pede nec massa. Donec eget felis id ante consequat viverra. Proin adipiscing. Aliquam mattis magna a justo. </a:t>
-            </a:r>
-            <a:endParaRPr b="0" lang="en-US" sz="2400" spc="-1" strike="noStrike">
-              <a:latin typeface="Arial"/>
-            </a:endParaRPr>
-          </a:p>
-          <a:p>
-            <a:pPr marL="326880">
-              <a:lnSpc>
-                <a:spcPct val="100000"/>
-              </a:lnSpc>
-              <a:spcBef>
-                <a:spcPts val="862"/>
-              </a:spcBef>
-            </a:pPr>
-            <a:r>
-              <a:rPr b="0" lang="en-US" sz="2400" spc="-1" strike="noStrike">
-                <a:solidFill>
-                  <a:srgbClr val="000000"/>
-                </a:solidFill>
-                <a:latin typeface="Arial"/>
-                <a:ea typeface="ＭＳ Ｐゴシック"/>
-              </a:rPr>
-              <a:t>Mauris nunc. Class aptent taciti sociosqu ad litora torquent per conubia nostra, per inceptos hymenaeos. Praesent at ante. Quisque elit pede, gravida in, congue vitae, consectetuer a, lectus. Aenean in massa. Sed diam. Class aptent taciti sociosqu ad litora torquent per conubia nostra, per inceptos hymenaeos.</a:t>
-            </a:r>
-            <a:endParaRPr b="0" lang="en-US" sz="2400" spc="-1" strike="noStrike">
-              <a:latin typeface="Arial"/>
-            </a:endParaRPr>
-          </a:p>
-        </p:txBody>
-      </p:sp>
-      <p:sp>
-        <p:nvSpPr>
-          <p:cNvPr id="57" name="CustomShape 10"/>
-          <p:cNvSpPr/>
-          <p:nvPr/>
-        </p:nvSpPr>
-        <p:spPr>
-          <a:xfrm>
-            <a:off x="503280" y="10466280"/>
-            <a:ext cx="10067040" cy="11097360"/>
-          </a:xfrm>
-          <a:prstGeom prst="roundRect">
-            <a:avLst>
-              <a:gd name="adj" fmla="val 2269"/>
-            </a:avLst>
-          </a:prstGeom>
-          <a:solidFill>
-            <a:srgbClr val="eef7f8"/>
-          </a:solidFill>
-          <a:ln w="76320">
-            <a:solidFill>
-              <a:schemeClr val="tx1"/>
-            </a:solidFill>
-            <a:round/>
-          </a:ln>
-        </p:spPr>
-        <p:style>
-          <a:lnRef idx="0"/>
-          <a:fillRef idx="0"/>
-          <a:effectRef idx="0"/>
-          <a:fontRef idx="minor"/>
-        </p:style>
-        <p:txBody>
-          <a:bodyPr lIns="0" rIns="0" tIns="0" bIns="0"/>
-          <a:p>
-            <a:pPr marL="326880" algn="ctr">
-              <a:lnSpc>
-                <a:spcPct val="100000"/>
-              </a:lnSpc>
-            </a:pPr>
-            <a:r>
-              <a:rPr b="1" lang="en-US" sz="2900" spc="-1" strike="noStrike">
-                <a:solidFill>
-                  <a:srgbClr val="000000"/>
-                </a:solidFill>
-                <a:latin typeface="Arial"/>
-                <a:ea typeface="ＭＳ Ｐゴシック"/>
-              </a:rPr>
-              <a:t>Methods</a:t>
-            </a:r>
-            <a:endParaRPr b="0" lang="en-US" sz="2900" spc="-1" strike="noStrike">
-              <a:latin typeface="Arial"/>
-            </a:endParaRPr>
-          </a:p>
-          <a:p>
-            <a:pPr marL="326880">
-              <a:lnSpc>
-                <a:spcPct val="100000"/>
-              </a:lnSpc>
-              <a:spcBef>
-                <a:spcPts val="862"/>
-              </a:spcBef>
-            </a:pPr>
-            <a:r>
-              <a:rPr b="0" lang="en-US" sz="2400" spc="-1" strike="noStrike">
-                <a:solidFill>
-                  <a:srgbClr val="000000"/>
-                </a:solidFill>
-                <a:latin typeface="Arial"/>
-                <a:ea typeface="ＭＳ Ｐゴシック"/>
-              </a:rPr>
-              <a:t>Lorem ipsum dolor sit amet, consectetuer adipiscing elit. Vivamus sagittis, risus et mattis convallis, leo metus molestie sapien, molestie facilisis mi tortor in arcu. Integer iaculis magna a arcu. Duis nibh. Donec tempus pede nec massa. Donec eget felis id ante consequat viverra. Proin adipiscing. Aliquam mattis magna a justo. </a:t>
-            </a:r>
-            <a:endParaRPr b="0" lang="en-US" sz="2400" spc="-1" strike="noStrike">
-              <a:latin typeface="Arial"/>
-            </a:endParaRPr>
-          </a:p>
-          <a:p>
-            <a:pPr marL="326880">
-              <a:lnSpc>
-                <a:spcPct val="100000"/>
-              </a:lnSpc>
-              <a:spcBef>
-                <a:spcPts val="862"/>
-              </a:spcBef>
-            </a:pPr>
-            <a:r>
-              <a:rPr b="0" lang="en-US" sz="2400" spc="-1" strike="noStrike">
-                <a:solidFill>
-                  <a:srgbClr val="000000"/>
-                </a:solidFill>
-                <a:latin typeface="Arial"/>
-                <a:ea typeface="ＭＳ Ｐゴシック"/>
-              </a:rPr>
-              <a:t>Mauris nunc. Class aptent taciti sociosqu ad litora torquent per conubia nostra, per inceptos hymenaeos. Praesent at ante. Quisque elit pede, gravida in, congue vitae, consectetuer a, lectus. Aenean in massa. Sed diam. Class aptent taciti sociosqu ad litora torquent per conubia nostra, per inceptos hymenaeos.</a:t>
-            </a:r>
-            <a:endParaRPr b="0" lang="en-US" sz="2400" spc="-1" strike="noStrike">
+              <a:t>Our approach to address the problem iterated through three steps over multiple phases. The first step was to prepare the data. Once the data was prepared, we performed a number of visualizations around the data to get an understanding of relationships between features and the end of period goal differential. Once we had an understanding of the relationships between the features, we ran them through different machine learning classifiers based on the results we were seeking. We did not seek a binary prediction, but a goal differential which is a bit more challenging. Furthermore, as we settled on our models we experimented with different normalization approaches and ran a grid search on our classifier to help fine tune the results. Several classifiers will be tested including a gradient boost, random forest, and KNN. The gradient boosting classifier performed the best, and we used that to perform the search for which features were the most important. When our results were output we output confusion matrices to help us interpret how our model was performing relative to the other potential outcomes of the model. We performed forward stepwise selection to determine the best subset of features to be used to predict the outcomes of each period, and used the best subset per period to train and predict the models for the individual periods.</a:t>
+            </a:r>
+            <a:endParaRPr b="0" lang="en-US" sz="2800" spc="-1" strike="noStrike">
               <a:latin typeface="Arial"/>
             </a:endParaRPr>
           </a:p>
@@ -2721,21 +3025,21 @@
       </p:sp>
       <p:grpSp>
         <p:nvGrpSpPr>
-          <p:cNvPr id="58" name="Group 11"/>
+          <p:cNvPr id="60" name="Group 11"/>
           <p:cNvGrpSpPr/>
           <p:nvPr/>
         </p:nvGrpSpPr>
         <p:grpSpPr>
           <a:xfrm>
-            <a:off x="11053440" y="16714080"/>
-            <a:ext cx="5802840" cy="4572000"/>
-            <a:chOff x="11053440" y="16714080"/>
-            <a:chExt cx="5802840" cy="4572000"/>
+            <a:off x="11358000" y="16382520"/>
+            <a:ext cx="5394960" cy="5125320"/>
+            <a:chOff x="11358000" y="16382520"/>
+            <a:chExt cx="5394960" cy="5125320"/>
           </a:xfrm>
         </p:grpSpPr>
         <p:pic>
           <p:nvPicPr>
-            <p:cNvPr id="59" name="" descr=""/>
+            <p:cNvPr id="61" name="" descr=""/>
             <p:cNvPicPr/>
             <p:nvPr/>
           </p:nvPicPr>
@@ -2745,8 +3049,8 @@
           </p:blipFill>
           <p:spPr>
             <a:xfrm>
-              <a:off x="11053440" y="17102160"/>
-              <a:ext cx="5802840" cy="3837600"/>
+              <a:off x="11358000" y="16382520"/>
+              <a:ext cx="5394960" cy="4465800"/>
             </a:xfrm>
             <a:prstGeom prst="rect">
               <a:avLst/>
@@ -2758,14 +3062,14 @@
         </p:pic>
         <p:sp>
           <p:nvSpPr>
-            <p:cNvPr id="60" name="TextShape 12"/>
+            <p:cNvPr id="62" name="TextShape 12"/>
             <p:cNvSpPr txBox="1"/>
             <p:nvPr/>
           </p:nvSpPr>
           <p:spPr>
             <a:xfrm>
-              <a:off x="11704320" y="16714080"/>
-              <a:ext cx="4982760" cy="346320"/>
+              <a:off x="11906640" y="20905560"/>
+              <a:ext cx="3931920" cy="602280"/>
             </a:xfrm>
             <a:prstGeom prst="rect">
               <a:avLst/>
@@ -2779,44 +3083,10 @@
             <a:bodyPr lIns="90000" rIns="90000" tIns="45000" bIns="45000"/>
             <a:p>
               <a:r>
-                <a:rPr b="0" lang="en-US" sz="1800" spc="-1" strike="noStrike">
+                <a:rPr b="1" lang="en-US" sz="1800" spc="-1" strike="noStrike">
                   <a:latin typeface="Arial"/>
                 </a:rPr>
-                <a:t>Overtime Goal Differential Prediction Histogram</a:t>
-              </a:r>
-              <a:endParaRPr b="0" lang="en-US" sz="1800" spc="-1" strike="noStrike">
-                <a:latin typeface="Arial"/>
-              </a:endParaRPr>
-            </a:p>
-          </p:txBody>
-        </p:sp>
-        <p:sp>
-          <p:nvSpPr>
-            <p:cNvPr id="61" name="TextShape 13"/>
-            <p:cNvSpPr txBox="1"/>
-            <p:nvPr/>
-          </p:nvSpPr>
-          <p:spPr>
-            <a:xfrm>
-              <a:off x="13367520" y="20939760"/>
-              <a:ext cx="1811520" cy="346320"/>
-            </a:xfrm>
-            <a:prstGeom prst="rect">
-              <a:avLst/>
-            </a:prstGeom>
-            <a:noFill/>
-            <a:ln>
-              <a:noFill/>
-            </a:ln>
-          </p:spPr>
-          <p:txBody>
-            <a:bodyPr lIns="90000" rIns="90000" tIns="45000" bIns="45000"/>
-            <a:p>
-              <a:r>
-                <a:rPr b="0" lang="en-US" sz="1800" spc="-1" strike="noStrike">
-                  <a:latin typeface="Arial"/>
-                </a:rPr>
-                <a:t>Goal Differential</a:t>
+                <a:t>Overtime Period Confusion Matrix</a:t>
               </a:r>
               <a:endParaRPr b="0" lang="en-US" sz="1800" spc="-1" strike="noStrike">
                 <a:latin typeface="Arial"/>
@@ -2868,34 +3138,34 @@
         <a:sysClr val="window" lastClr="FFFFFF"/>
       </a:lt1>
       <a:dk2>
-        <a:srgbClr val="000000"/>
+        <a:srgbClr val="1f497d"/>
       </a:dk2>
       <a:lt2>
-        <a:srgbClr val="808080"/>
+        <a:srgbClr val="eeece1"/>
       </a:lt2>
       <a:accent1>
-        <a:srgbClr val="e8f6f7"/>
+        <a:srgbClr val="4f81bd"/>
       </a:accent1>
       <a:accent2>
-        <a:srgbClr val="333399"/>
+        <a:srgbClr val="c0504d"/>
       </a:accent2>
       <a:accent3>
-        <a:srgbClr val="ffffff"/>
+        <a:srgbClr val="9bbb59"/>
       </a:accent3>
       <a:accent4>
-        <a:srgbClr val="000000"/>
+        <a:srgbClr val="8064a2"/>
       </a:accent4>
       <a:accent5>
-        <a:srgbClr val="f2fafa"/>
+        <a:srgbClr val="4bacc6"/>
       </a:accent5>
       <a:accent6>
-        <a:srgbClr val="2d2d8a"/>
+        <a:srgbClr val="f79646"/>
       </a:accent6>
       <a:hlink>
-        <a:srgbClr val="009999"/>
+        <a:srgbClr val="0000ff"/>
       </a:hlink>
       <a:folHlink>
-        <a:srgbClr val="99cc00"/>
+        <a:srgbClr val="800080"/>
       </a:folHlink>
     </a:clrScheme>
     <a:fontScheme name="Office">
@@ -3091,34 +3361,34 @@
         <a:sysClr val="window" lastClr="FFFFFF"/>
       </a:lt1>
       <a:dk2>
-        <a:srgbClr val="000000"/>
+        <a:srgbClr val="1f497d"/>
       </a:dk2>
       <a:lt2>
-        <a:srgbClr val="808080"/>
+        <a:srgbClr val="eeece1"/>
       </a:lt2>
       <a:accent1>
-        <a:srgbClr val="e8f6f7"/>
+        <a:srgbClr val="4f81bd"/>
       </a:accent1>
       <a:accent2>
-        <a:srgbClr val="333399"/>
+        <a:srgbClr val="c0504d"/>
       </a:accent2>
       <a:accent3>
-        <a:srgbClr val="ffffff"/>
+        <a:srgbClr val="9bbb59"/>
       </a:accent3>
       <a:accent4>
-        <a:srgbClr val="000000"/>
+        <a:srgbClr val="8064a2"/>
       </a:accent4>
       <a:accent5>
-        <a:srgbClr val="f2fafa"/>
+        <a:srgbClr val="4bacc6"/>
       </a:accent5>
       <a:accent6>
-        <a:srgbClr val="2d2d8a"/>
+        <a:srgbClr val="f79646"/>
       </a:accent6>
       <a:hlink>
-        <a:srgbClr val="009999"/>
+        <a:srgbClr val="0000ff"/>
       </a:hlink>
       <a:folHlink>
-        <a:srgbClr val="99cc00"/>
+        <a:srgbClr val="800080"/>
       </a:folHlink>
     </a:clrScheme>
     <a:fontScheme name="Office">

</xml_diff>

<commit_message>
Added data section, and descriptions of images
</commit_message>
<xml_diff>
--- a/Lord_Stanley_Seekers_Final_Poster.pptx
+++ b/Lord_Stanley_Seekers_Final_Poster.pptx
@@ -59,7 +59,139 @@
               <a:rPr b="0" lang="en-US" sz="4400" spc="-1" strike="noStrike">
                 <a:latin typeface="Arial"/>
               </a:rPr>
-              <a:t>Click to move the slide</a:t>
+              <a:t>C</a:t>
+            </a:r>
+            <a:r>
+              <a:rPr b="0" lang="en-US" sz="4400" spc="-1" strike="noStrike">
+                <a:latin typeface="Arial"/>
+              </a:rPr>
+              <a:t>l</a:t>
+            </a:r>
+            <a:r>
+              <a:rPr b="0" lang="en-US" sz="4400" spc="-1" strike="noStrike">
+                <a:latin typeface="Arial"/>
+              </a:rPr>
+              <a:t>i</a:t>
+            </a:r>
+            <a:r>
+              <a:rPr b="0" lang="en-US" sz="4400" spc="-1" strike="noStrike">
+                <a:latin typeface="Arial"/>
+              </a:rPr>
+              <a:t>c</a:t>
+            </a:r>
+            <a:r>
+              <a:rPr b="0" lang="en-US" sz="4400" spc="-1" strike="noStrike">
+                <a:latin typeface="Arial"/>
+              </a:rPr>
+              <a:t>k</a:t>
+            </a:r>
+            <a:r>
+              <a:rPr b="0" lang="en-US" sz="4400" spc="-1" strike="noStrike">
+                <a:latin typeface="Arial"/>
+              </a:rPr>
+              <a:t> </a:t>
+            </a:r>
+            <a:r>
+              <a:rPr b="0" lang="en-US" sz="4400" spc="-1" strike="noStrike">
+                <a:latin typeface="Arial"/>
+              </a:rPr>
+              <a:t>t</a:t>
+            </a:r>
+            <a:r>
+              <a:rPr b="0" lang="en-US" sz="4400" spc="-1" strike="noStrike">
+                <a:latin typeface="Arial"/>
+              </a:rPr>
+              <a:t>o</a:t>
+            </a:r>
+            <a:r>
+              <a:rPr b="0" lang="en-US" sz="4400" spc="-1" strike="noStrike">
+                <a:latin typeface="Arial"/>
+              </a:rPr>
+              <a:t> </a:t>
+            </a:r>
+            <a:r>
+              <a:rPr b="0" lang="en-US" sz="4400" spc="-1" strike="noStrike">
+                <a:latin typeface="Arial"/>
+              </a:rPr>
+              <a:t>m</a:t>
+            </a:r>
+            <a:r>
+              <a:rPr b="0" lang="en-US" sz="4400" spc="-1" strike="noStrike">
+                <a:latin typeface="Arial"/>
+              </a:rPr>
+              <a:t>o</a:t>
+            </a:r>
+            <a:r>
+              <a:rPr b="0" lang="en-US" sz="4400" spc="-1" strike="noStrike">
+                <a:latin typeface="Arial"/>
+              </a:rPr>
+              <a:t>v</a:t>
+            </a:r>
+            <a:r>
+              <a:rPr b="0" lang="en-US" sz="4400" spc="-1" strike="noStrike">
+                <a:latin typeface="Arial"/>
+              </a:rPr>
+              <a:t>e</a:t>
+            </a:r>
+            <a:r>
+              <a:rPr b="0" lang="en-US" sz="4400" spc="-1" strike="noStrike">
+                <a:latin typeface="Arial"/>
+              </a:rPr>
+              <a:t> </a:t>
+            </a:r>
+            <a:r>
+              <a:rPr b="0" lang="en-US" sz="4400" spc="-1" strike="noStrike">
+                <a:latin typeface="Arial"/>
+              </a:rPr>
+              <a:t>t</a:t>
+            </a:r>
+            <a:r>
+              <a:rPr b="0" lang="en-US" sz="4400" spc="-1" strike="noStrike">
+                <a:latin typeface="Arial"/>
+              </a:rPr>
+              <a:t>h</a:t>
+            </a:r>
+            <a:r>
+              <a:rPr b="0" lang="en-US" sz="4400" spc="-1" strike="noStrike">
+                <a:latin typeface="Arial"/>
+              </a:rPr>
+              <a:t>e</a:t>
+            </a:r>
+            <a:r>
+              <a:rPr b="0" lang="en-US" sz="4400" spc="-1" strike="noStrike">
+                <a:latin typeface="Arial"/>
+              </a:rPr>
+              <a:t> </a:t>
+            </a:r>
+            <a:r>
+              <a:rPr b="0" lang="en-US" sz="4400" spc="-1" strike="noStrike">
+                <a:latin typeface="Arial"/>
+              </a:rPr>
+              <a:t>s</a:t>
+            </a:r>
+            <a:r>
+              <a:rPr b="0" lang="en-US" sz="4400" spc="-1" strike="noStrike">
+                <a:latin typeface="Arial"/>
+              </a:rPr>
+              <a:t>l</a:t>
+            </a:r>
+            <a:r>
+              <a:rPr b="0" lang="en-US" sz="4400" spc="-1" strike="noStrike">
+                <a:latin typeface="Arial"/>
+              </a:rPr>
+              <a:t>i</a:t>
+            </a:r>
+            <a:r>
+              <a:rPr b="0" lang="en-US" sz="4400" spc="-1" strike="noStrike">
+                <a:latin typeface="Arial"/>
+              </a:rPr>
+              <a:t>d</a:t>
+            </a:r>
+            <a:r>
+              <a:rPr b="0" lang="en-US" sz="4400" spc="-1" strike="noStrike">
+                <a:latin typeface="Arial"/>
+              </a:rPr>
+              <a:t>e</a:t>
             </a:r>
             <a:endParaRPr b="0" lang="en-US" sz="4400" spc="-1" strike="noStrike">
               <a:latin typeface="Arial"/>
@@ -227,7 +359,7 @@
           <a:bodyPr lIns="0" rIns="0" tIns="0" bIns="0" anchor="b"/>
           <a:p>
             <a:pPr algn="r"/>
-            <a:fld id="{D8639F26-D289-4708-90A9-27BC4774C662}" type="slidenum">
+            <a:fld id="{F614C5D2-F549-4ECF-B380-ABA6058143BA}" type="slidenum">
               <a:rPr b="0" lang="en-US" sz="1400" spc="-1" strike="noStrike">
                 <a:latin typeface="Times New Roman"/>
               </a:rPr>
@@ -264,7 +396,7 @@
       </p:grpSpPr>
       <p:sp>
         <p:nvSpPr>
-          <p:cNvPr id="63" name="CustomShape 1"/>
+          <p:cNvPr id="70" name="CustomShape 1"/>
           <p:cNvSpPr/>
           <p:nvPr/>
         </p:nvSpPr>
@@ -295,7 +427,7 @@
                 <a:spcPct val="100000"/>
               </a:lnSpc>
             </a:pPr>
-            <a:fld id="{B9C0B6DB-DCD8-4B44-92D1-740ECA8393AA}" type="slidenum">
+            <a:fld id="{C42BD442-7ED4-4BE8-9B65-578DD656A08A}" type="slidenum">
               <a:rPr b="0" lang="en-US" sz="1200" spc="-1" strike="noStrike">
                 <a:solidFill>
                   <a:srgbClr val="000000"/>
@@ -303,7 +435,7 @@
                 <a:latin typeface="Gill Sans"/>
                 <a:ea typeface="ＭＳ Ｐゴシック"/>
               </a:rPr>
-              <a:t>1</a:t>
+              <a:t>&lt;number&gt;</a:t>
             </a:fld>
             <a:endParaRPr b="0" lang="en-US" sz="1200" spc="-1" strike="noStrike">
               <a:latin typeface="Arial"/>
@@ -313,7 +445,7 @@
       </p:sp>
       <p:sp>
         <p:nvSpPr>
-          <p:cNvPr id="64" name="PlaceHolder 2"/>
+          <p:cNvPr id="71" name="PlaceHolder 2"/>
           <p:cNvSpPr>
             <a:spLocks noGrp="1"/>
           </p:cNvSpPr>
@@ -333,7 +465,7 @@
       </p:sp>
       <p:sp>
         <p:nvSpPr>
-          <p:cNvPr id="65" name="PlaceHolder 3"/>
+          <p:cNvPr id="72" name="PlaceHolder 3"/>
           <p:cNvSpPr>
             <a:spLocks noGrp="1"/>
           </p:cNvSpPr>
@@ -2272,7 +2404,7 @@
         </p:nvSpPr>
         <p:spPr>
           <a:xfrm>
-            <a:off x="503280" y="3936960"/>
+            <a:off x="503280" y="3144960"/>
             <a:ext cx="10066680" cy="5586840"/>
           </a:xfrm>
           <a:prstGeom prst="roundRect">
@@ -2299,7 +2431,7 @@
         <p:txBody>
           <a:bodyPr lIns="0" rIns="137160" tIns="0" bIns="0"/>
           <a:p>
-            <a:pPr marL="326880" algn="just">
+            <a:pPr marL="326880" algn="ctr">
               <a:lnSpc>
                 <a:spcPct val="100000"/>
               </a:lnSpc>
@@ -2394,7 +2526,7 @@
         </p:nvSpPr>
         <p:spPr>
           <a:xfrm>
-            <a:off x="22345560" y="3936960"/>
+            <a:off x="22345560" y="4332960"/>
             <a:ext cx="10066680" cy="5586840"/>
           </a:xfrm>
           <a:prstGeom prst="roundRect">
@@ -2649,16 +2781,39 @@
           </a:ln>
         </p:spPr>
       </p:pic>
-      <p:sp>
-        <p:nvSpPr>
-          <p:cNvPr id="50" name="CustomShape 5"/>
+      <p:pic>
+        <p:nvPicPr>
+          <p:cNvPr id="50" name="" descr=""/>
+          <p:cNvPicPr/>
+          <p:nvPr/>
+        </p:nvPicPr>
+        <p:blipFill>
+          <a:blip r:embed="rId3"/>
+          <a:stretch/>
+        </p:blipFill>
+        <p:spPr>
+          <a:xfrm>
+            <a:off x="17280360" y="16301520"/>
+            <a:ext cx="4374000" cy="4388760"/>
+          </a:xfrm>
+          <a:prstGeom prst="rect">
+            <a:avLst/>
+          </a:prstGeom>
+          <a:ln>
+            <a:noFill/>
+          </a:ln>
+        </p:spPr>
+      </p:pic>
+      <p:sp>
+        <p:nvSpPr>
+          <p:cNvPr id="51" name="CustomShape 5"/>
           <p:cNvSpPr/>
           <p:nvPr/>
         </p:nvSpPr>
         <p:spPr>
           <a:xfrm>
-            <a:off x="18786600" y="7936560"/>
-            <a:ext cx="1695600" cy="1572840"/>
+            <a:off x="18786600" y="15145200"/>
+            <a:ext cx="180360" cy="232200"/>
           </a:xfrm>
           <a:prstGeom prst="rect">
             <a:avLst/>
@@ -2675,58 +2830,29 @@
           <a:fontRef idx="minor"/>
         </p:style>
       </p:sp>
-      <p:sp>
-        <p:nvSpPr>
-          <p:cNvPr id="51" name="CustomShape 6"/>
-          <p:cNvSpPr/>
+      <p:pic>
+        <p:nvPicPr>
+          <p:cNvPr id="52" name="" descr=""/>
+          <p:cNvPicPr/>
           <p:nvPr/>
-        </p:nvSpPr>
-        <p:spPr>
-          <a:xfrm>
-            <a:off x="12893040" y="3383280"/>
-            <a:ext cx="6073920" cy="4785480"/>
-          </a:xfrm>
-          <a:prstGeom prst="rect">
-            <a:avLst/>
-          </a:prstGeom>
-          <a:noFill/>
+        </p:nvPicPr>
+        <p:blipFill>
+          <a:blip r:embed="rId4"/>
+          <a:stretch/>
+        </p:blipFill>
+        <p:spPr>
+          <a:xfrm>
+            <a:off x="10623960" y="10577520"/>
+            <a:ext cx="6217200" cy="4662720"/>
+          </a:xfrm>
+          <a:prstGeom prst="rect">
+            <a:avLst/>
+          </a:prstGeom>
           <a:ln>
             <a:noFill/>
           </a:ln>
         </p:spPr>
-        <p:style>
-          <a:lnRef idx="0"/>
-          <a:fillRef idx="0"/>
-          <a:effectRef idx="0"/>
-          <a:fontRef idx="minor"/>
-        </p:style>
-      </p:sp>
-      <p:sp>
-        <p:nvSpPr>
-          <p:cNvPr id="52" name="CustomShape 7"/>
-          <p:cNvSpPr/>
-          <p:nvPr/>
-        </p:nvSpPr>
-        <p:spPr>
-          <a:xfrm>
-            <a:off x="18786600" y="7936560"/>
-            <a:ext cx="180360" cy="232200"/>
-          </a:xfrm>
-          <a:prstGeom prst="rect">
-            <a:avLst/>
-          </a:prstGeom>
-          <a:noFill/>
-          <a:ln>
-            <a:noFill/>
-          </a:ln>
-        </p:spPr>
-        <p:style>
-          <a:lnRef idx="0"/>
-          <a:fillRef idx="0"/>
-          <a:effectRef idx="0"/>
-          <a:fontRef idx="minor"/>
-        </p:style>
-      </p:sp>
+      </p:pic>
       <p:pic>
         <p:nvPicPr>
           <p:cNvPr id="53" name="" descr=""/>
@@ -2734,13 +2860,13 @@
           <p:nvPr/>
         </p:nvPicPr>
         <p:blipFill>
-          <a:blip r:embed="rId3"/>
+          <a:blip r:embed="rId5"/>
           <a:stretch/>
         </p:blipFill>
         <p:spPr>
           <a:xfrm>
-            <a:off x="17388360" y="16733520"/>
-            <a:ext cx="4374000" cy="4388760"/>
+            <a:off x="16315200" y="10581480"/>
+            <a:ext cx="6217560" cy="4663080"/>
           </a:xfrm>
           <a:prstGeom prst="rect">
             <a:avLst/>
@@ -2750,104 +2876,9 @@
           </a:ln>
         </p:spPr>
       </p:pic>
-      <p:pic>
-        <p:nvPicPr>
-          <p:cNvPr id="54" name="" descr=""/>
-          <p:cNvPicPr/>
-          <p:nvPr/>
-        </p:nvPicPr>
-        <p:blipFill>
-          <a:blip r:embed="rId4"/>
-          <a:stretch/>
-        </p:blipFill>
-        <p:spPr>
-          <a:xfrm>
-            <a:off x="11178000" y="3661560"/>
-            <a:ext cx="10240920" cy="7676640"/>
-          </a:xfrm>
-          <a:prstGeom prst="rect">
-            <a:avLst/>
-          </a:prstGeom>
-          <a:ln>
-            <a:noFill/>
-          </a:ln>
-        </p:spPr>
-      </p:pic>
-      <p:sp>
-        <p:nvSpPr>
-          <p:cNvPr id="55" name="CustomShape 8"/>
-          <p:cNvSpPr/>
-          <p:nvPr/>
-        </p:nvSpPr>
-        <p:spPr>
-          <a:xfrm>
-            <a:off x="18786600" y="15145200"/>
-            <a:ext cx="180360" cy="232200"/>
-          </a:xfrm>
-          <a:prstGeom prst="rect">
-            <a:avLst/>
-          </a:prstGeom>
-          <a:noFill/>
-          <a:ln>
-            <a:noFill/>
-          </a:ln>
-        </p:spPr>
-        <p:style>
-          <a:lnRef idx="0"/>
-          <a:fillRef idx="0"/>
-          <a:effectRef idx="0"/>
-          <a:fontRef idx="minor"/>
-        </p:style>
-      </p:sp>
-      <p:pic>
-        <p:nvPicPr>
-          <p:cNvPr id="56" name="" descr=""/>
-          <p:cNvPicPr/>
-          <p:nvPr/>
-        </p:nvPicPr>
-        <p:blipFill>
-          <a:blip r:embed="rId5"/>
-          <a:stretch/>
-        </p:blipFill>
-        <p:spPr>
-          <a:xfrm>
-            <a:off x="10623960" y="11405520"/>
-            <a:ext cx="6217200" cy="4662720"/>
-          </a:xfrm>
-          <a:prstGeom prst="rect">
-            <a:avLst/>
-          </a:prstGeom>
-          <a:ln>
-            <a:noFill/>
-          </a:ln>
-        </p:spPr>
-      </p:pic>
-      <p:pic>
-        <p:nvPicPr>
-          <p:cNvPr id="57" name="" descr=""/>
-          <p:cNvPicPr/>
-          <p:nvPr/>
-        </p:nvPicPr>
-        <p:blipFill>
-          <a:blip r:embed="rId6"/>
-          <a:stretch/>
-        </p:blipFill>
-        <p:spPr>
-          <a:xfrm>
-            <a:off x="16315200" y="11373480"/>
-            <a:ext cx="6217560" cy="4663080"/>
-          </a:xfrm>
-          <a:prstGeom prst="rect">
-            <a:avLst/>
-          </a:prstGeom>
-          <a:ln>
-            <a:noFill/>
-          </a:ln>
-        </p:spPr>
-      </p:pic>
-      <p:sp>
-        <p:nvSpPr>
-          <p:cNvPr id="58" name="CustomShape 9"/>
+      <p:sp>
+        <p:nvSpPr>
+          <p:cNvPr id="54" name="CustomShape 6"/>
           <p:cNvSpPr/>
           <p:nvPr/>
         </p:nvSpPr>
@@ -2936,14 +2967,14 @@
       </p:sp>
       <p:sp>
         <p:nvSpPr>
-          <p:cNvPr id="59" name="CustomShape 10"/>
+          <p:cNvPr id="55" name="CustomShape 7"/>
           <p:cNvSpPr/>
           <p:nvPr/>
         </p:nvSpPr>
         <p:spPr>
           <a:xfrm>
-            <a:off x="503280" y="10466280"/>
-            <a:ext cx="10066680" cy="11097000"/>
+            <a:off x="503280" y="8954280"/>
+            <a:ext cx="10066680" cy="8219880"/>
           </a:xfrm>
           <a:prstGeom prst="roundRect">
             <a:avLst>
@@ -3008,7 +3039,7 @@
               <a:t>	</a:t>
             </a:r>
             <a:r>
-              <a:rPr b="0" lang="en-US" sz="2800" spc="-1" strike="noStrike">
+              <a:rPr b="0" lang="en-US" sz="2400" spc="-1" strike="noStrike">
                 <a:solidFill>
                   <a:srgbClr val="000000"/>
                 </a:solidFill>
@@ -3017,7 +3048,7 @@
               </a:rPr>
               <a:t>Our approach to address the problem iterated through three steps over multiple phases. The first step was to prepare the data. Once the data was prepared, we performed a number of visualizations around the data to get an understanding of relationships between features and the end of period goal differential. Once we had an understanding of the relationships between the features, we ran them through different machine learning classifiers based on the results we were seeking. We did not seek a binary prediction, but a goal differential which is a bit more challenging. Furthermore, as we settled on our models we experimented with different normalization approaches and ran a grid search on our classifier to help fine tune the results. Several classifiers will be tested including a gradient boost, random forest, and KNN. The gradient boosting classifier performed the best, and we used that to perform the search for which features were the most important. When our results were output we output confusion matrices to help us interpret how our model was performing relative to the other potential outcomes of the model. We performed forward stepwise selection to determine the best subset of features to be used to predict the outcomes of each period, and used the best subset per period to train and predict the models for the individual periods.</a:t>
             </a:r>
-            <a:endParaRPr b="0" lang="en-US" sz="2800" spc="-1" strike="noStrike">
+            <a:endParaRPr b="0" lang="en-US" sz="2400" spc="-1" strike="noStrike">
               <a:latin typeface="Arial"/>
             </a:endParaRPr>
           </a:p>
@@ -3025,31 +3056,31 @@
       </p:sp>
       <p:grpSp>
         <p:nvGrpSpPr>
-          <p:cNvPr id="60" name="Group 11"/>
+          <p:cNvPr id="56" name="Group 8"/>
           <p:cNvGrpSpPr/>
           <p:nvPr/>
         </p:nvGrpSpPr>
         <p:grpSpPr>
           <a:xfrm>
-            <a:off x="11358000" y="16382520"/>
+            <a:off x="11286000" y="15950520"/>
             <a:ext cx="5394960" cy="5125320"/>
-            <a:chOff x="11358000" y="16382520"/>
+            <a:chOff x="11286000" y="15950520"/>
             <a:chExt cx="5394960" cy="5125320"/>
           </a:xfrm>
         </p:grpSpPr>
         <p:pic>
           <p:nvPicPr>
-            <p:cNvPr id="61" name="" descr=""/>
+            <p:cNvPr id="57" name="" descr=""/>
             <p:cNvPicPr/>
             <p:nvPr/>
           </p:nvPicPr>
           <p:blipFill>
-            <a:blip r:embed="rId7"/>
+            <a:blip r:embed="rId6"/>
             <a:stretch/>
           </p:blipFill>
           <p:spPr>
             <a:xfrm>
-              <a:off x="11358000" y="16382520"/>
+              <a:off x="11286000" y="15950520"/>
               <a:ext cx="5394960" cy="4465800"/>
             </a:xfrm>
             <a:prstGeom prst="rect">
@@ -3062,13 +3093,13 @@
         </p:pic>
         <p:sp>
           <p:nvSpPr>
-            <p:cNvPr id="62" name="TextShape 12"/>
+            <p:cNvPr id="58" name="TextShape 9"/>
             <p:cNvSpPr txBox="1"/>
             <p:nvPr/>
           </p:nvSpPr>
           <p:spPr>
             <a:xfrm>
-              <a:off x="11906640" y="20905560"/>
+              <a:off x="11834640" y="20473560"/>
               <a:ext cx="3931920" cy="602280"/>
             </a:xfrm>
             <a:prstGeom prst="rect">
@@ -3095,6 +3126,495 @@
           </p:txBody>
         </p:sp>
       </p:grpSp>
+      <p:sp>
+        <p:nvSpPr>
+          <p:cNvPr id="59" name="CustomShape 10"/>
+          <p:cNvSpPr/>
+          <p:nvPr/>
+        </p:nvSpPr>
+        <p:spPr>
+          <a:xfrm>
+            <a:off x="515520" y="17405280"/>
+            <a:ext cx="10066680" cy="4266000"/>
+          </a:xfrm>
+          <a:prstGeom prst="roundRect">
+            <a:avLst>
+              <a:gd name="adj" fmla="val 2269"/>
+            </a:avLst>
+          </a:prstGeom>
+          <a:solidFill>
+            <a:srgbClr val="eef7f8"/>
+          </a:solidFill>
+          <a:ln w="76320">
+            <a:solidFill>
+              <a:srgbClr val="000000"/>
+            </a:solidFill>
+            <a:round/>
+          </a:ln>
+        </p:spPr>
+        <p:style>
+          <a:lnRef idx="0"/>
+          <a:fillRef idx="0"/>
+          <a:effectRef idx="0"/>
+          <a:fontRef idx="minor"/>
+        </p:style>
+        <p:txBody>
+          <a:bodyPr lIns="137160" rIns="137160" tIns="0" bIns="0"/>
+          <a:p>
+            <a:pPr marL="976320" indent="-648360" algn="ctr">
+              <a:lnSpc>
+                <a:spcPct val="100000"/>
+              </a:lnSpc>
+              <a:spcBef>
+                <a:spcPts val="862"/>
+              </a:spcBef>
+            </a:pPr>
+            <a:r>
+              <a:rPr b="1" lang="en-US" sz="2600" spc="-1" strike="noStrike">
+                <a:solidFill>
+                  <a:srgbClr val="000000"/>
+                </a:solidFill>
+                <a:latin typeface="Arial"/>
+                <a:ea typeface="ＭＳ Ｐゴシック"/>
+              </a:rPr>
+              <a:t>Data</a:t>
+            </a:r>
+            <a:endParaRPr b="0" lang="en-US" sz="2600" spc="-1" strike="noStrike">
+              <a:latin typeface="Arial"/>
+            </a:endParaRPr>
+          </a:p>
+          <a:p>
+            <a:pPr algn="just"/>
+            <a:r>
+              <a:rPr b="0" lang="en-US" sz="2200" spc="-1" strike="noStrike">
+                <a:latin typeface="Arial"/>
+              </a:rPr>
+              <a:t>The data for this work was obtained from Kaggle, </a:t>
+            </a:r>
+            <a:r>
+              <a:rPr b="0" lang="en-US" sz="2200" spc="-1" strike="noStrike">
+                <a:latin typeface="Arial"/>
+              </a:rPr>
+              <a:t>comprised of 3.6 million plays over 11,400 </a:t>
+            </a:r>
+            <a:r>
+              <a:rPr b="0" lang="en-US" sz="2200" spc="-1" strike="noStrike">
+                <a:latin typeface="Arial"/>
+              </a:rPr>
+              <a:t>games over the course of 3 full seasons. The </a:t>
+            </a:r>
+            <a:r>
+              <a:rPr b="0" lang="en-US" sz="2200" spc="-1" strike="noStrike">
+                <a:latin typeface="Arial"/>
+              </a:rPr>
+              <a:t>plays including the standard stats recorded by </a:t>
+            </a:r>
+            <a:r>
+              <a:rPr b="0" lang="en-US" sz="2200" spc="-1" strike="noStrike">
+                <a:latin typeface="Arial"/>
+              </a:rPr>
+              <a:t>the NHL goals, penalties, shots on goal, blocked </a:t>
+            </a:r>
+            <a:r>
+              <a:rPr b="0" lang="en-US" sz="2200" spc="-1" strike="noStrike">
+                <a:latin typeface="Arial"/>
+              </a:rPr>
+              <a:t>shot, hits, faceoffs, takeaways, giveaways, and </a:t>
+            </a:r>
+            <a:r>
+              <a:rPr b="0" lang="en-US" sz="2200" spc="-1" strike="noStrike">
+                <a:latin typeface="Arial"/>
+              </a:rPr>
+              <a:t>missed shots. This data was synchronized with </a:t>
+            </a:r>
+            <a:r>
+              <a:rPr b="0" lang="en-US" sz="2200" spc="-1" strike="noStrike">
+                <a:latin typeface="Arial"/>
+              </a:rPr>
+              <a:t>8.9 million shifts for the same games (a shift is </a:t>
+            </a:r>
+            <a:r>
+              <a:rPr b="0" lang="en-US" sz="2200" spc="-1" strike="noStrike">
+                <a:latin typeface="Arial"/>
+              </a:rPr>
+              <a:t>defined as a consecutive time on ice for a player, </a:t>
+            </a:r>
+            <a:r>
+              <a:rPr b="0" lang="en-US" sz="2200" spc="-1" strike="noStrike">
+                <a:latin typeface="Arial"/>
+              </a:rPr>
+              <a:t>typically 20-40 seconds, and a player might have </a:t>
+            </a:r>
+            <a:r>
+              <a:rPr b="0" lang="en-US" sz="2200" spc="-1" strike="noStrike">
+                <a:latin typeface="Arial"/>
+              </a:rPr>
+              <a:t>40 shifts over the course of a single game). This </a:t>
+            </a:r>
+            <a:r>
+              <a:rPr b="0" lang="en-US" sz="2200" spc="-1" strike="noStrike">
+                <a:latin typeface="Arial"/>
+              </a:rPr>
+              <a:t>data was then split by home and away, the </a:t>
+            </a:r>
+            <a:r>
+              <a:rPr b="0" lang="en-US" sz="2200" spc="-1" strike="noStrike">
+                <a:latin typeface="Arial"/>
+              </a:rPr>
+              <a:t>artificial split we used as the easiest way to </a:t>
+            </a:r>
+            <a:r>
+              <a:rPr b="0" lang="en-US" sz="2200" spc="-1" strike="noStrike">
+                <a:latin typeface="Arial"/>
+              </a:rPr>
+              <a:t>differentiate teams. This resulted in a feature set </a:t>
+            </a:r>
+            <a:r>
+              <a:rPr b="0" lang="en-US" sz="2200" spc="-1" strike="noStrike">
+                <a:latin typeface="Arial"/>
+              </a:rPr>
+              <a:t>made up of 37,589 periods for which we had </a:t>
+            </a:r>
+            <a:r>
+              <a:rPr b="0" lang="en-US" sz="2200" spc="-1" strike="noStrike">
+                <a:latin typeface="Arial"/>
+              </a:rPr>
+              <a:t>valid statistics and 19 statistical measurements, </a:t>
+            </a:r>
+            <a:r>
+              <a:rPr b="0" lang="en-US" sz="2200" spc="-1" strike="noStrike">
+                <a:latin typeface="Arial"/>
+              </a:rPr>
+              <a:t>originally given as raw counts that were </a:t>
+            </a:r>
+            <a:r>
+              <a:rPr b="0" lang="en-US" sz="2200" spc="-1" strike="noStrike">
+                <a:latin typeface="Arial"/>
+              </a:rPr>
+              <a:t>normalized and scaled.</a:t>
+            </a:r>
+            <a:endParaRPr b="0" lang="en-US" sz="2200" spc="-1" strike="noStrike">
+              <a:latin typeface="Arial"/>
+            </a:endParaRPr>
+          </a:p>
+        </p:txBody>
+      </p:sp>
+      <p:grpSp>
+        <p:nvGrpSpPr>
+          <p:cNvPr id="60" name="Group 11"/>
+          <p:cNvGrpSpPr/>
+          <p:nvPr/>
+        </p:nvGrpSpPr>
+        <p:grpSpPr>
+          <a:xfrm>
+            <a:off x="11178000" y="2905560"/>
+            <a:ext cx="10685880" cy="8067240"/>
+            <a:chOff x="11178000" y="2905560"/>
+            <a:chExt cx="10685880" cy="8067240"/>
+          </a:xfrm>
+        </p:grpSpPr>
+        <p:sp>
+          <p:nvSpPr>
+            <p:cNvPr id="61" name="CustomShape 12"/>
+            <p:cNvSpPr/>
+            <p:nvPr/>
+          </p:nvSpPr>
+          <p:spPr>
+            <a:xfrm>
+              <a:off x="18786600" y="7936560"/>
+              <a:ext cx="1695600" cy="1572840"/>
+            </a:xfrm>
+            <a:prstGeom prst="rect">
+              <a:avLst/>
+            </a:prstGeom>
+            <a:noFill/>
+            <a:ln>
+              <a:noFill/>
+            </a:ln>
+          </p:spPr>
+          <p:style>
+            <a:lnRef idx="0"/>
+            <a:fillRef idx="0"/>
+            <a:effectRef idx="0"/>
+            <a:fontRef idx="minor"/>
+          </p:style>
+        </p:sp>
+        <p:sp>
+          <p:nvSpPr>
+            <p:cNvPr id="62" name="CustomShape 13"/>
+            <p:cNvSpPr/>
+            <p:nvPr/>
+          </p:nvSpPr>
+          <p:spPr>
+            <a:xfrm>
+              <a:off x="12893040" y="3383280"/>
+              <a:ext cx="6073920" cy="4785480"/>
+            </a:xfrm>
+            <a:prstGeom prst="rect">
+              <a:avLst/>
+            </a:prstGeom>
+            <a:noFill/>
+            <a:ln>
+              <a:noFill/>
+            </a:ln>
+          </p:spPr>
+          <p:style>
+            <a:lnRef idx="0"/>
+            <a:fillRef idx="0"/>
+            <a:effectRef idx="0"/>
+            <a:fontRef idx="minor"/>
+          </p:style>
+        </p:sp>
+        <p:sp>
+          <p:nvSpPr>
+            <p:cNvPr id="63" name="CustomShape 14"/>
+            <p:cNvSpPr/>
+            <p:nvPr/>
+          </p:nvSpPr>
+          <p:spPr>
+            <a:xfrm>
+              <a:off x="18786600" y="7936560"/>
+              <a:ext cx="180360" cy="232200"/>
+            </a:xfrm>
+            <a:prstGeom prst="rect">
+              <a:avLst/>
+            </a:prstGeom>
+            <a:noFill/>
+            <a:ln>
+              <a:noFill/>
+            </a:ln>
+          </p:spPr>
+          <p:style>
+            <a:lnRef idx="0"/>
+            <a:fillRef idx="0"/>
+            <a:effectRef idx="0"/>
+            <a:fontRef idx="minor"/>
+          </p:style>
+        </p:sp>
+        <p:pic>
+          <p:nvPicPr>
+            <p:cNvPr id="64" name="" descr=""/>
+            <p:cNvPicPr/>
+            <p:nvPr/>
+          </p:nvPicPr>
+          <p:blipFill>
+            <a:blip r:embed="rId7"/>
+            <a:stretch/>
+          </p:blipFill>
+          <p:spPr>
+            <a:xfrm>
+              <a:off x="11178000" y="2905560"/>
+              <a:ext cx="10240920" cy="7676640"/>
+            </a:xfrm>
+            <a:prstGeom prst="rect">
+              <a:avLst/>
+            </a:prstGeom>
+            <a:ln>
+              <a:noFill/>
+            </a:ln>
+          </p:spPr>
+        </p:pic>
+        <p:sp>
+          <p:nvSpPr>
+            <p:cNvPr id="65" name="TextShape 15"/>
+            <p:cNvSpPr txBox="1"/>
+            <p:nvPr/>
+          </p:nvSpPr>
+          <p:spPr>
+            <a:xfrm>
+              <a:off x="11256840" y="10424160"/>
+              <a:ext cx="10607040" cy="548640"/>
+            </a:xfrm>
+            <a:prstGeom prst="rect">
+              <a:avLst/>
+            </a:prstGeom>
+            <a:noFill/>
+            <a:ln>
+              <a:noFill/>
+            </a:ln>
+          </p:spPr>
+          <p:txBody>
+            <a:bodyPr lIns="90000" rIns="90000" tIns="45000" bIns="45000"/>
+            <a:p>
+              <a:r>
+                <a:rPr b="1" lang="en-US" sz="2000" spc="-1" strike="noStrike">
+                  <a:latin typeface="Arial"/>
+                </a:rPr>
+                <a:t>Fig 1.</a:t>
+              </a:r>
+              <a:r>
+                <a:rPr b="0" lang="en-US" sz="2000" spc="-1" strike="noStrike">
+                  <a:latin typeface="Arial"/>
+                </a:rPr>
+                <a:t> A violin plot of the difference between home and away attributes vs. the outcome.</a:t>
+              </a:r>
+              <a:endParaRPr b="1" lang="en-US" sz="2000" spc="-1" strike="noStrike">
+                <a:latin typeface="Arial"/>
+              </a:endParaRPr>
+            </a:p>
+          </p:txBody>
+        </p:sp>
+      </p:grpSp>
+      <p:sp>
+        <p:nvSpPr>
+          <p:cNvPr id="66" name="TextShape 16"/>
+          <p:cNvSpPr txBox="1"/>
+          <p:nvPr/>
+        </p:nvSpPr>
+        <p:spPr>
+          <a:xfrm>
+            <a:off x="10989000" y="15244560"/>
+            <a:ext cx="5852160" cy="602280"/>
+          </a:xfrm>
+          <a:prstGeom prst="rect">
+            <a:avLst/>
+          </a:prstGeom>
+          <a:noFill/>
+          <a:ln>
+            <a:noFill/>
+          </a:ln>
+        </p:spPr>
+        <p:txBody>
+          <a:bodyPr lIns="90000" rIns="90000" tIns="45000" bIns="45000"/>
+          <a:p>
+            <a:r>
+              <a:rPr b="1" lang="en-US" sz="1800" spc="-1" strike="noStrike">
+                <a:latin typeface="Arial"/>
+              </a:rPr>
+              <a:t>Fig 2.</a:t>
+            </a:r>
+            <a:r>
+              <a:rPr b="0" lang="en-US" sz="1800" spc="-1" strike="noStrike">
+                <a:latin typeface="Arial"/>
+              </a:rPr>
+              <a:t> A density plot of away penalties to goal differential</a:t>
+            </a:r>
+            <a:endParaRPr b="1" lang="en-US" sz="1800" spc="-1" strike="noStrike">
+              <a:latin typeface="Arial"/>
+            </a:endParaRPr>
+          </a:p>
+        </p:txBody>
+      </p:sp>
+      <p:sp>
+        <p:nvSpPr>
+          <p:cNvPr id="67" name="TextShape 17"/>
+          <p:cNvSpPr txBox="1"/>
+          <p:nvPr/>
+        </p:nvSpPr>
+        <p:spPr>
+          <a:xfrm>
+            <a:off x="16841160" y="15244920"/>
+            <a:ext cx="5852160" cy="602280"/>
+          </a:xfrm>
+          <a:prstGeom prst="rect">
+            <a:avLst/>
+          </a:prstGeom>
+          <a:noFill/>
+          <a:ln>
+            <a:noFill/>
+          </a:ln>
+        </p:spPr>
+        <p:txBody>
+          <a:bodyPr lIns="90000" rIns="90000" tIns="45000" bIns="45000"/>
+          <a:p>
+            <a:r>
+              <a:rPr b="1" lang="en-US" sz="1800" spc="-1" strike="noStrike">
+                <a:latin typeface="Arial"/>
+              </a:rPr>
+              <a:t>Fig 3.</a:t>
+            </a:r>
+            <a:r>
+              <a:rPr b="0" lang="en-US" sz="1800" spc="-1" strike="noStrike">
+                <a:latin typeface="Arial"/>
+              </a:rPr>
+              <a:t> A density plot of home penalties to goal differential</a:t>
+            </a:r>
+            <a:endParaRPr b="1" lang="en-US" sz="1800" spc="-1" strike="noStrike">
+              <a:latin typeface="Arial"/>
+            </a:endParaRPr>
+          </a:p>
+        </p:txBody>
+      </p:sp>
+      <p:sp>
+        <p:nvSpPr>
+          <p:cNvPr id="68" name="TextShape 18"/>
+          <p:cNvSpPr txBox="1"/>
+          <p:nvPr/>
+        </p:nvSpPr>
+        <p:spPr>
+          <a:xfrm>
+            <a:off x="10864440" y="20786400"/>
+            <a:ext cx="6309360" cy="858240"/>
+          </a:xfrm>
+          <a:prstGeom prst="rect">
+            <a:avLst/>
+          </a:prstGeom>
+          <a:noFill/>
+          <a:ln>
+            <a:noFill/>
+          </a:ln>
+        </p:spPr>
+        <p:txBody>
+          <a:bodyPr lIns="90000" rIns="90000" tIns="45000" bIns="45000"/>
+          <a:p>
+            <a:r>
+              <a:rPr b="1" lang="en-US" sz="1800" spc="-1" strike="noStrike">
+                <a:latin typeface="Arial"/>
+              </a:rPr>
+              <a:t>Fig 4.</a:t>
+            </a:r>
+            <a:r>
+              <a:rPr b="0" lang="en-US" sz="1800" spc="-1" strike="noStrike">
+                <a:latin typeface="Arial"/>
+              </a:rPr>
+              <a:t> A confustion matrix of the goal differential predicted for overtime periods. The model had a 75% accuracy for predicting goal differential.</a:t>
+            </a:r>
+            <a:endParaRPr b="1" lang="en-US" sz="1800" spc="-1" strike="noStrike">
+              <a:latin typeface="Arial"/>
+            </a:endParaRPr>
+          </a:p>
+        </p:txBody>
+      </p:sp>
+      <p:sp>
+        <p:nvSpPr>
+          <p:cNvPr id="69" name="TextShape 19"/>
+          <p:cNvSpPr txBox="1"/>
+          <p:nvPr/>
+        </p:nvSpPr>
+        <p:spPr>
+          <a:xfrm>
+            <a:off x="17280360" y="20690280"/>
+            <a:ext cx="4573800" cy="602280"/>
+          </a:xfrm>
+          <a:prstGeom prst="rect">
+            <a:avLst/>
+          </a:prstGeom>
+          <a:noFill/>
+          <a:ln>
+            <a:noFill/>
+          </a:ln>
+        </p:spPr>
+        <p:txBody>
+          <a:bodyPr lIns="90000" rIns="90000" tIns="45000" bIns="45000"/>
+          <a:p>
+            <a:r>
+              <a:rPr b="1" lang="en-US" sz="1800" spc="-1" strike="noStrike">
+                <a:latin typeface="Arial"/>
+              </a:rPr>
+              <a:t>Fig 5. </a:t>
+            </a:r>
+            <a:r>
+              <a:rPr b="0" lang="en-US" sz="1800" spc="-1" strike="noStrike">
+                <a:latin typeface="Arial"/>
+              </a:rPr>
+              <a:t>A joint plot of the penalty differential and goal differential for a period.</a:t>
+            </a:r>
+            <a:endParaRPr b="1" lang="en-US" sz="1800" spc="-1" strike="noStrike">
+              <a:latin typeface="Arial"/>
+            </a:endParaRPr>
+          </a:p>
+        </p:txBody>
+      </p:sp>
     </p:spTree>
   </p:cSld>
   <p:timing>

</xml_diff>

<commit_message>
Added Brian's feedback to discussion section.
</commit_message>
<xml_diff>
--- a/Lord_Stanley_Seekers_Final_Poster.pptx
+++ b/Lord_Stanley_Seekers_Final_Poster.pptx
@@ -2,7 +2,7 @@
 <file path=ppt/presentation.xml><?xml version="1.0" encoding="utf-8"?>
 <p:presentation xmlns:a="http://schemas.openxmlformats.org/drawingml/2006/main" xmlns:p="http://schemas.openxmlformats.org/presentationml/2006/main" xmlns:r="http://schemas.openxmlformats.org/officeDocument/2006/relationships" xmlns:p14="http://schemas.microsoft.com/office/powerpoint/2010/main" xmlns:p15="http://schemas.microsoft.com/office/powerpoint/2012/main" xmlns:mc="http://schemas.openxmlformats.org/markup-compatibility/2006">
   <p:sldMasterIdLst>
-    <p:sldMasterId id="2147483648" r:id="rId2"/>
+    <p:sldMasterId id="2147483660" r:id="rId2"/>
   </p:sldMasterIdLst>
   <p:notesMasterIdLst>
     <p:notesMasterId r:id="rId3"/>
@@ -52,148 +52,149 @@
           </a:prstGeom>
         </p:spPr>
         <p:txBody>
-          <a:bodyPr lIns="0" rIns="0" tIns="0" bIns="0" anchor="ctr"/>
+          <a:bodyPr anchor="ctr" bIns="0" lIns="0" numCol="1" rIns="0" tIns="0"/>
+          <a:lstStyle/>
           <a:p>
             <a:pPr algn="ctr"/>
             <a:r>
-              <a:rPr b="0" lang="en-US" sz="4400" spc="-1" strike="noStrike">
+              <a:rPr b="0" lang="en-US" spc="-1" strike="noStrike" sz="4400">
                 <a:latin typeface="Arial"/>
               </a:rPr>
               <a:t>C</a:t>
             </a:r>
             <a:r>
-              <a:rPr b="0" lang="en-US" sz="4400" spc="-1" strike="noStrike">
+              <a:rPr b="0" lang="en-US" spc="-1" strike="noStrike" sz="4400">
                 <a:latin typeface="Arial"/>
               </a:rPr>
               <a:t>l</a:t>
             </a:r>
             <a:r>
-              <a:rPr b="0" lang="en-US" sz="4400" spc="-1" strike="noStrike">
+              <a:rPr b="0" lang="en-US" spc="-1" strike="noStrike" sz="4400">
                 <a:latin typeface="Arial"/>
               </a:rPr>
               <a:t>i</a:t>
             </a:r>
             <a:r>
-              <a:rPr b="0" lang="en-US" sz="4400" spc="-1" strike="noStrike">
+              <a:rPr b="0" lang="en-US" spc="-1" strike="noStrike" sz="4400">
                 <a:latin typeface="Arial"/>
               </a:rPr>
               <a:t>c</a:t>
             </a:r>
             <a:r>
-              <a:rPr b="0" lang="en-US" sz="4400" spc="-1" strike="noStrike">
+              <a:rPr b="0" lang="en-US" spc="-1" strike="noStrike" sz="4400">
                 <a:latin typeface="Arial"/>
               </a:rPr>
               <a:t>k</a:t>
             </a:r>
             <a:r>
-              <a:rPr b="0" lang="en-US" sz="4400" spc="-1" strike="noStrike">
+              <a:rPr b="0" lang="en-US" spc="-1" strike="noStrike" sz="4400">
                 <a:latin typeface="Arial"/>
               </a:rPr>
               <a:t> </a:t>
             </a:r>
             <a:r>
-              <a:rPr b="0" lang="en-US" sz="4400" spc="-1" strike="noStrike">
+              <a:rPr b="0" lang="en-US" spc="-1" strike="noStrike" sz="4400">
                 <a:latin typeface="Arial"/>
               </a:rPr>
               <a:t>t</a:t>
             </a:r>
             <a:r>
-              <a:rPr b="0" lang="en-US" sz="4400" spc="-1" strike="noStrike">
+              <a:rPr b="0" lang="en-US" spc="-1" strike="noStrike" sz="4400">
                 <a:latin typeface="Arial"/>
               </a:rPr>
               <a:t>o</a:t>
             </a:r>
             <a:r>
-              <a:rPr b="0" lang="en-US" sz="4400" spc="-1" strike="noStrike">
+              <a:rPr b="0" lang="en-US" spc="-1" strike="noStrike" sz="4400">
                 <a:latin typeface="Arial"/>
               </a:rPr>
               <a:t> </a:t>
             </a:r>
             <a:r>
-              <a:rPr b="0" lang="en-US" sz="4400" spc="-1" strike="noStrike">
+              <a:rPr b="0" lang="en-US" spc="-1" strike="noStrike" sz="4400">
                 <a:latin typeface="Arial"/>
               </a:rPr>
               <a:t>m</a:t>
             </a:r>
             <a:r>
-              <a:rPr b="0" lang="en-US" sz="4400" spc="-1" strike="noStrike">
+              <a:rPr b="0" lang="en-US" spc="-1" strike="noStrike" sz="4400">
                 <a:latin typeface="Arial"/>
               </a:rPr>
               <a:t>o</a:t>
             </a:r>
             <a:r>
-              <a:rPr b="0" lang="en-US" sz="4400" spc="-1" strike="noStrike">
+              <a:rPr b="0" lang="en-US" spc="-1" strike="noStrike" sz="4400">
                 <a:latin typeface="Arial"/>
               </a:rPr>
               <a:t>v</a:t>
             </a:r>
             <a:r>
-              <a:rPr b="0" lang="en-US" sz="4400" spc="-1" strike="noStrike">
+              <a:rPr b="0" lang="en-US" spc="-1" strike="noStrike" sz="4400">
                 <a:latin typeface="Arial"/>
               </a:rPr>
               <a:t>e</a:t>
             </a:r>
             <a:r>
-              <a:rPr b="0" lang="en-US" sz="4400" spc="-1" strike="noStrike">
+              <a:rPr b="0" lang="en-US" spc="-1" strike="noStrike" sz="4400">
                 <a:latin typeface="Arial"/>
               </a:rPr>
               <a:t> </a:t>
             </a:r>
             <a:r>
-              <a:rPr b="0" lang="en-US" sz="4400" spc="-1" strike="noStrike">
+              <a:rPr b="0" lang="en-US" spc="-1" strike="noStrike" sz="4400">
                 <a:latin typeface="Arial"/>
               </a:rPr>
               <a:t>t</a:t>
             </a:r>
             <a:r>
-              <a:rPr b="0" lang="en-US" sz="4400" spc="-1" strike="noStrike">
+              <a:rPr b="0" lang="en-US" spc="-1" strike="noStrike" sz="4400">
                 <a:latin typeface="Arial"/>
               </a:rPr>
               <a:t>h</a:t>
             </a:r>
             <a:r>
-              <a:rPr b="0" lang="en-US" sz="4400" spc="-1" strike="noStrike">
+              <a:rPr b="0" lang="en-US" spc="-1" strike="noStrike" sz="4400">
                 <a:latin typeface="Arial"/>
               </a:rPr>
               <a:t>e</a:t>
             </a:r>
             <a:r>
-              <a:rPr b="0" lang="en-US" sz="4400" spc="-1" strike="noStrike">
+              <a:rPr b="0" lang="en-US" spc="-1" strike="noStrike" sz="4400">
                 <a:latin typeface="Arial"/>
               </a:rPr>
               <a:t> </a:t>
             </a:r>
             <a:r>
-              <a:rPr b="0" lang="en-US" sz="4400" spc="-1" strike="noStrike">
+              <a:rPr b="0" lang="en-US" spc="-1" strike="noStrike" sz="4400">
                 <a:latin typeface="Arial"/>
               </a:rPr>
               <a:t>s</a:t>
             </a:r>
             <a:r>
-              <a:rPr b="0" lang="en-US" sz="4400" spc="-1" strike="noStrike">
+              <a:rPr b="0" lang="en-US" spc="-1" strike="noStrike" sz="4400">
                 <a:latin typeface="Arial"/>
               </a:rPr>
               <a:t>l</a:t>
             </a:r>
             <a:r>
-              <a:rPr b="0" lang="en-US" sz="4400" spc="-1" strike="noStrike">
+              <a:rPr b="0" lang="en-US" spc="-1" strike="noStrike" sz="4400">
                 <a:latin typeface="Arial"/>
               </a:rPr>
               <a:t>i</a:t>
             </a:r>
             <a:r>
-              <a:rPr b="0" lang="en-US" sz="4400" spc="-1" strike="noStrike">
+              <a:rPr b="0" lang="en-US" spc="-1" strike="noStrike" sz="4400">
                 <a:latin typeface="Arial"/>
               </a:rPr>
               <a:t>d</a:t>
             </a:r>
             <a:r>
-              <a:rPr b="0" lang="en-US" sz="4400" spc="-1" strike="noStrike">
+              <a:rPr b="0" lang="en-US" spc="-1" strike="noStrike" sz="4400">
                 <a:latin typeface="Arial"/>
               </a:rPr>
               <a:t>e</a:t>
             </a:r>
-            <a:endParaRPr b="0" lang="en-US" sz="4400" spc="-1" strike="noStrike">
+            <a:endParaRPr b="0" lang="en-US" spc="-1" strike="noStrike" sz="4400">
               <a:latin typeface="Arial"/>
             </a:endParaRPr>
           </a:p>
@@ -219,15 +220,16 @@
           </a:prstGeom>
         </p:spPr>
         <p:txBody>
-          <a:bodyPr lIns="0" rIns="0" tIns="0" bIns="0"/>
-          <a:p>
-            <a:r>
-              <a:rPr b="0" lang="en-US" sz="2000" spc="-1" strike="noStrike">
+          <a:bodyPr bIns="0" lIns="0" numCol="1" rIns="0" tIns="0"/>
+          <a:lstStyle/>
+          <a:p>
+            <a:r>
+              <a:rPr b="0" lang="en-US" spc="-1" strike="noStrike" sz="2000">
                 <a:latin typeface="Arial"/>
               </a:rPr>
               <a:t>Click to edit the notes format</a:t>
             </a:r>
-            <a:endParaRPr b="0" lang="en-US" sz="2000" spc="-1" strike="noStrike">
+            <a:endParaRPr b="0" lang="en-US" spc="-1" strike="noStrike" sz="2000">
               <a:latin typeface="Arial"/>
             </a:endParaRPr>
           </a:p>
@@ -253,15 +255,16 @@
           </a:prstGeom>
         </p:spPr>
         <p:txBody>
-          <a:bodyPr lIns="0" rIns="0" tIns="0" bIns="0"/>
-          <a:p>
-            <a:r>
-              <a:rPr b="0" lang="en-US" sz="1400" spc="-1" strike="noStrike">
+          <a:bodyPr bIns="0" lIns="0" numCol="1" rIns="0" tIns="0"/>
+          <a:lstStyle/>
+          <a:p>
+            <a:r>
+              <a:rPr b="0" lang="en-US" spc="-1" strike="noStrike" sz="1400">
                 <a:latin typeface="Times New Roman"/>
               </a:rPr>
               <a:t> </a:t>
             </a:r>
-            <a:endParaRPr b="0" lang="en-US" sz="1400" spc="-1" strike="noStrike">
+            <a:endParaRPr b="0" lang="en-US" spc="-1" strike="noStrike" sz="1400">
               <a:latin typeface="Times New Roman"/>
             </a:endParaRPr>
           </a:p>
@@ -287,16 +290,17 @@
           </a:prstGeom>
         </p:spPr>
         <p:txBody>
-          <a:bodyPr lIns="0" rIns="0" tIns="0" bIns="0"/>
+          <a:bodyPr bIns="0" lIns="0" numCol="1" rIns="0" tIns="0"/>
+          <a:lstStyle/>
           <a:p>
             <a:pPr algn="r"/>
             <a:r>
-              <a:rPr b="0" lang="en-US" sz="1400" spc="-1" strike="noStrike">
+              <a:rPr b="0" lang="en-US" spc="-1" strike="noStrike" sz="1400">
                 <a:latin typeface="Times New Roman"/>
               </a:rPr>
               <a:t> </a:t>
             </a:r>
-            <a:endParaRPr b="0" lang="en-US" sz="1400" spc="-1" strike="noStrike">
+            <a:endParaRPr b="0" lang="en-US" spc="-1" strike="noStrike" sz="1400">
               <a:latin typeface="Times New Roman"/>
             </a:endParaRPr>
           </a:p>
@@ -322,15 +326,16 @@
           </a:prstGeom>
         </p:spPr>
         <p:txBody>
-          <a:bodyPr lIns="0" rIns="0" tIns="0" bIns="0" anchor="b"/>
-          <a:p>
-            <a:r>
-              <a:rPr b="0" lang="en-US" sz="1400" spc="-1" strike="noStrike">
+          <a:bodyPr anchor="b" bIns="0" lIns="0" numCol="1" rIns="0" tIns="0"/>
+          <a:lstStyle/>
+          <a:p>
+            <a:r>
+              <a:rPr b="0" lang="en-US" spc="-1" strike="noStrike" sz="1400">
                 <a:latin typeface="Times New Roman"/>
               </a:rPr>
               <a:t> </a:t>
             </a:r>
-            <a:endParaRPr b="0" lang="en-US" sz="1400" spc="-1" strike="noStrike">
+            <a:endParaRPr b="0" lang="en-US" spc="-1" strike="noStrike" sz="1400">
               <a:latin typeface="Times New Roman"/>
             </a:endParaRPr>
           </a:p>
@@ -356,16 +361,17 @@
           </a:prstGeom>
         </p:spPr>
         <p:txBody>
-          <a:bodyPr lIns="0" rIns="0" tIns="0" bIns="0" anchor="b"/>
+          <a:bodyPr anchor="b" bIns="0" lIns="0" numCol="1" rIns="0" tIns="0"/>
+          <a:lstStyle/>
           <a:p>
             <a:pPr algn="r"/>
             <a:fld id="{F614C5D2-F549-4ECF-B380-ABA6058143BA}" type="slidenum">
-              <a:rPr b="0" lang="en-US" sz="1400" spc="-1" strike="noStrike">
+              <a:rPr b="0" lang="en-US" spc="-1" strike="noStrike" sz="1400">
                 <a:latin typeface="Times New Roman"/>
               </a:rPr>
               <a:t>1</a:t>
             </a:fld>
-            <a:endParaRPr b="0" lang="en-US" sz="1400" spc="-1" strike="noStrike">
+            <a:endParaRPr b="0" lang="en-US" spc="-1" strike="noStrike" sz="1400">
               <a:latin typeface="Times New Roman"/>
             </a:endParaRPr>
           </a:p>
@@ -373,7 +379,7 @@
       </p:sp>
     </p:spTree>
   </p:cSld>
-  <p:clrMap bg1="lt1" bg2="lt2" tx1="dk1" tx2="dk2" accent1="accent1" accent2="accent2" accent3="accent3" accent4="accent4" accent5="accent5" accent6="accent6" hlink="hlink" folHlink="folHlink"/>
+  <p:clrMap accent1="accent1" accent2="accent2" accent3="accent3" accent4="accent4" accent5="accent5" accent6="accent6" bg1="lt1" bg2="lt2" folHlink="folHlink" hlink="hlink" tx1="dk1" tx2="dk2"/>
 </p:notesMaster>
 </file>
 
@@ -420,7 +426,8 @@
           <a:fontRef idx="minor"/>
         </p:style>
         <p:txBody>
-          <a:bodyPr lIns="90000" rIns="90000" tIns="45000" bIns="45000" anchor="b"/>
+          <a:bodyPr anchor="b" bIns="45000" lIns="90000" numCol="1" rIns="90000" tIns="45000"/>
+          <a:lstStyle/>
           <a:p>
             <a:pPr algn="r">
               <a:lnSpc>
@@ -428,7 +435,7 @@
               </a:lnSpc>
             </a:pPr>
             <a:fld id="{C42BD442-7ED4-4BE8-9B65-578DD656A08A}" type="slidenum">
-              <a:rPr b="0" lang="en-US" sz="1200" spc="-1" strike="noStrike">
+              <a:rPr b="0" lang="en-US" spc="-1" strike="noStrike" sz="1200">
                 <a:solidFill>
                   <a:srgbClr val="000000"/>
                 </a:solidFill>
@@ -437,7 +444,7 @@
               </a:rPr>
               <a:t>&lt;number&gt;</a:t>
             </a:fld>
-            <a:endParaRPr b="0" lang="en-US" sz="1200" spc="-1" strike="noStrike">
+            <a:endParaRPr b="0" lang="en-US" spc="-1" strike="noStrike" sz="1200">
               <a:latin typeface="Arial"/>
             </a:endParaRPr>
           </a:p>
@@ -483,9 +490,10 @@
           </a:prstGeom>
         </p:spPr>
         <p:txBody>
-          <a:bodyPr lIns="0" rIns="0" tIns="0" bIns="0"/>
-          <a:p>
-            <a:endParaRPr b="0" lang="en-US" sz="2000" spc="-1" strike="noStrike">
+          <a:bodyPr bIns="0" lIns="0" numCol="1" rIns="0" tIns="0"/>
+          <a:lstStyle/>
+          <a:p>
+            <a:endParaRPr b="0" lang="en-US" spc="-1" strike="noStrike" sz="2000">
               <a:latin typeface="Arial"/>
             </a:endParaRPr>
           </a:p>
@@ -497,7 +505,7 @@
 </file>
 
 <file path=ppt/slideLayouts/slideLayout1.xml><?xml version="1.0" encoding="utf-8"?>
-<p:sldLayout xmlns:a="http://schemas.openxmlformats.org/drawingml/2006/main" xmlns:p="http://schemas.openxmlformats.org/presentationml/2006/main" xmlns:r="http://schemas.openxmlformats.org/officeDocument/2006/relationships" xmlns:p14="http://schemas.microsoft.com/office/powerpoint/2010/main" xmlns:p15="http://schemas.microsoft.com/office/powerpoint/2012/main" xmlns:mc="http://schemas.openxmlformats.org/markup-compatibility/2006" type="blank" preserve="1">
+<p:sldLayout xmlns:a="http://schemas.openxmlformats.org/drawingml/2006/main" xmlns:p="http://schemas.openxmlformats.org/presentationml/2006/main" xmlns:r="http://schemas.openxmlformats.org/officeDocument/2006/relationships" xmlns:p14="http://schemas.microsoft.com/office/powerpoint/2010/main" xmlns:p15="http://schemas.microsoft.com/office/powerpoint/2012/main" xmlns:mc="http://schemas.openxmlformats.org/markup-compatibility/2006" preserve="1" type="blank">
   <p:cSld name="Blank Slide">
     <p:spTree>
       <p:nvGrpSpPr>
@@ -519,7 +527,7 @@
 </file>
 
 <file path=ppt/slideLayouts/slideLayout10.xml><?xml version="1.0" encoding="utf-8"?>
-<p:sldLayout xmlns:a="http://schemas.openxmlformats.org/drawingml/2006/main" xmlns:p="http://schemas.openxmlformats.org/presentationml/2006/main" xmlns:r="http://schemas.openxmlformats.org/officeDocument/2006/relationships" xmlns:p14="http://schemas.microsoft.com/office/powerpoint/2010/main" xmlns:p15="http://schemas.microsoft.com/office/powerpoint/2012/main" xmlns:mc="http://schemas.openxmlformats.org/markup-compatibility/2006" type="objOverTx" preserve="1">
+<p:sldLayout xmlns:a="http://schemas.openxmlformats.org/drawingml/2006/main" xmlns:p="http://schemas.openxmlformats.org/presentationml/2006/main" xmlns:r="http://schemas.openxmlformats.org/officeDocument/2006/relationships" xmlns:p14="http://schemas.microsoft.com/office/powerpoint/2010/main" xmlns:p15="http://schemas.microsoft.com/office/powerpoint/2012/main" xmlns:mc="http://schemas.openxmlformats.org/markup-compatibility/2006" preserve="1" type="objOverTx">
   <p:cSld name="Title, Content over Content">
     <p:spTree>
       <p:nvGrpSpPr>
@@ -555,10 +563,11 @@
           </a:prstGeom>
         </p:spPr>
         <p:txBody>
-          <a:bodyPr lIns="0" rIns="0" tIns="0" bIns="0" anchor="ctr"/>
+          <a:bodyPr anchor="ctr" bIns="0" lIns="0" numCol="1" rIns="0" tIns="0"/>
+          <a:lstStyle/>
           <a:p>
             <a:pPr algn="ctr"/>
-            <a:endParaRPr b="0" lang="en-US" sz="4400" spc="-1" strike="noStrike">
+            <a:endParaRPr b="0" lang="en-US" spc="-1" strike="noStrike" sz="4400">
               <a:latin typeface="Arial"/>
             </a:endParaRPr>
           </a:p>
@@ -584,11 +593,12 @@
           </a:prstGeom>
         </p:spPr>
         <p:txBody>
-          <a:bodyPr lIns="0" rIns="0" tIns="0" bIns="0">
+          <a:bodyPr bIns="0" lIns="0" numCol="1" rIns="0" tIns="0">
             <a:normAutofit/>
           </a:bodyPr>
-          <a:p>
-            <a:endParaRPr b="0" lang="en-US" sz="3200" spc="-1" strike="noStrike">
+          <a:lstStyle/>
+          <a:p>
+            <a:endParaRPr b="0" lang="en-US" spc="-1" strike="noStrike" sz="3200">
               <a:latin typeface="Arial"/>
             </a:endParaRPr>
           </a:p>
@@ -614,11 +624,12 @@
           </a:prstGeom>
         </p:spPr>
         <p:txBody>
-          <a:bodyPr lIns="0" rIns="0" tIns="0" bIns="0">
+          <a:bodyPr bIns="0" lIns="0" numCol="1" rIns="0" tIns="0">
             <a:normAutofit/>
           </a:bodyPr>
-          <a:p>
-            <a:endParaRPr b="0" lang="en-US" sz="3200" spc="-1" strike="noStrike">
+          <a:lstStyle/>
+          <a:p>
+            <a:endParaRPr b="0" lang="en-US" spc="-1" strike="noStrike" sz="3200">
               <a:latin typeface="Arial"/>
             </a:endParaRPr>
           </a:p>
@@ -630,7 +641,7 @@
 </file>
 
 <file path=ppt/slideLayouts/slideLayout11.xml><?xml version="1.0" encoding="utf-8"?>
-<p:sldLayout xmlns:a="http://schemas.openxmlformats.org/drawingml/2006/main" xmlns:p="http://schemas.openxmlformats.org/presentationml/2006/main" xmlns:r="http://schemas.openxmlformats.org/officeDocument/2006/relationships" xmlns:p14="http://schemas.microsoft.com/office/powerpoint/2010/main" xmlns:p15="http://schemas.microsoft.com/office/powerpoint/2012/main" xmlns:mc="http://schemas.openxmlformats.org/markup-compatibility/2006" type="fourObj" preserve="1">
+<p:sldLayout xmlns:a="http://schemas.openxmlformats.org/drawingml/2006/main" xmlns:p="http://schemas.openxmlformats.org/presentationml/2006/main" xmlns:r="http://schemas.openxmlformats.org/officeDocument/2006/relationships" xmlns:p14="http://schemas.microsoft.com/office/powerpoint/2010/main" xmlns:p15="http://schemas.microsoft.com/office/powerpoint/2012/main" xmlns:mc="http://schemas.openxmlformats.org/markup-compatibility/2006" preserve="1" type="fourObj">
   <p:cSld name="Title, 4 Content">
     <p:spTree>
       <p:nvGrpSpPr>
@@ -666,10 +677,11 @@
           </a:prstGeom>
         </p:spPr>
         <p:txBody>
-          <a:bodyPr lIns="0" rIns="0" tIns="0" bIns="0" anchor="ctr"/>
+          <a:bodyPr anchor="ctr" bIns="0" lIns="0" numCol="1" rIns="0" tIns="0"/>
+          <a:lstStyle/>
           <a:p>
             <a:pPr algn="ctr"/>
-            <a:endParaRPr b="0" lang="en-US" sz="4400" spc="-1" strike="noStrike">
+            <a:endParaRPr b="0" lang="en-US" spc="-1" strike="noStrike" sz="4400">
               <a:latin typeface="Arial"/>
             </a:endParaRPr>
           </a:p>
@@ -695,11 +707,12 @@
           </a:prstGeom>
         </p:spPr>
         <p:txBody>
-          <a:bodyPr lIns="0" rIns="0" tIns="0" bIns="0">
+          <a:bodyPr bIns="0" lIns="0" numCol="1" rIns="0" tIns="0">
             <a:normAutofit/>
           </a:bodyPr>
-          <a:p>
-            <a:endParaRPr b="0" lang="en-US" sz="3200" spc="-1" strike="noStrike">
+          <a:lstStyle/>
+          <a:p>
+            <a:endParaRPr b="0" lang="en-US" spc="-1" strike="noStrike" sz="3200">
               <a:latin typeface="Arial"/>
             </a:endParaRPr>
           </a:p>
@@ -725,11 +738,12 @@
           </a:prstGeom>
         </p:spPr>
         <p:txBody>
-          <a:bodyPr lIns="0" rIns="0" tIns="0" bIns="0">
+          <a:bodyPr bIns="0" lIns="0" numCol="1" rIns="0" tIns="0">
             <a:normAutofit/>
           </a:bodyPr>
-          <a:p>
-            <a:endParaRPr b="0" lang="en-US" sz="3200" spc="-1" strike="noStrike">
+          <a:lstStyle/>
+          <a:p>
+            <a:endParaRPr b="0" lang="en-US" spc="-1" strike="noStrike" sz="3200">
               <a:latin typeface="Arial"/>
             </a:endParaRPr>
           </a:p>
@@ -755,11 +769,12 @@
           </a:prstGeom>
         </p:spPr>
         <p:txBody>
-          <a:bodyPr lIns="0" rIns="0" tIns="0" bIns="0">
+          <a:bodyPr bIns="0" lIns="0" numCol="1" rIns="0" tIns="0">
             <a:normAutofit/>
           </a:bodyPr>
-          <a:p>
-            <a:endParaRPr b="0" lang="en-US" sz="3200" spc="-1" strike="noStrike">
+          <a:lstStyle/>
+          <a:p>
+            <a:endParaRPr b="0" lang="en-US" spc="-1" strike="noStrike" sz="3200">
               <a:latin typeface="Arial"/>
             </a:endParaRPr>
           </a:p>
@@ -785,11 +800,12 @@
           </a:prstGeom>
         </p:spPr>
         <p:txBody>
-          <a:bodyPr lIns="0" rIns="0" tIns="0" bIns="0">
+          <a:bodyPr bIns="0" lIns="0" numCol="1" rIns="0" tIns="0">
             <a:normAutofit/>
           </a:bodyPr>
-          <a:p>
-            <a:endParaRPr b="0" lang="en-US" sz="3200" spc="-1" strike="noStrike">
+          <a:lstStyle/>
+          <a:p>
+            <a:endParaRPr b="0" lang="en-US" spc="-1" strike="noStrike" sz="3200">
               <a:latin typeface="Arial"/>
             </a:endParaRPr>
           </a:p>
@@ -801,7 +817,7 @@
 </file>
 
 <file path=ppt/slideLayouts/slideLayout12.xml><?xml version="1.0" encoding="utf-8"?>
-<p:sldLayout xmlns:a="http://schemas.openxmlformats.org/drawingml/2006/main" xmlns:p="http://schemas.openxmlformats.org/presentationml/2006/main" xmlns:r="http://schemas.openxmlformats.org/officeDocument/2006/relationships" xmlns:p14="http://schemas.microsoft.com/office/powerpoint/2010/main" xmlns:p15="http://schemas.microsoft.com/office/powerpoint/2012/main" xmlns:mc="http://schemas.openxmlformats.org/markup-compatibility/2006" type="blank" preserve="1">
+<p:sldLayout xmlns:a="http://schemas.openxmlformats.org/drawingml/2006/main" xmlns:p="http://schemas.openxmlformats.org/presentationml/2006/main" xmlns:r="http://schemas.openxmlformats.org/officeDocument/2006/relationships" xmlns:p14="http://schemas.microsoft.com/office/powerpoint/2010/main" xmlns:p15="http://schemas.microsoft.com/office/powerpoint/2012/main" xmlns:mc="http://schemas.openxmlformats.org/markup-compatibility/2006" preserve="1" type="blank">
   <p:cSld name="Title, 6 Content">
     <p:spTree>
       <p:nvGrpSpPr>
@@ -837,10 +853,11 @@
           </a:prstGeom>
         </p:spPr>
         <p:txBody>
-          <a:bodyPr lIns="0" rIns="0" tIns="0" bIns="0" anchor="ctr"/>
+          <a:bodyPr anchor="ctr" bIns="0" lIns="0" numCol="1" rIns="0" tIns="0"/>
+          <a:lstStyle/>
           <a:p>
             <a:pPr algn="ctr"/>
-            <a:endParaRPr b="0" lang="en-US" sz="4400" spc="-1" strike="noStrike">
+            <a:endParaRPr b="0" lang="en-US" spc="-1" strike="noStrike" sz="4400">
               <a:latin typeface="Arial"/>
             </a:endParaRPr>
           </a:p>
@@ -866,11 +883,12 @@
           </a:prstGeom>
         </p:spPr>
         <p:txBody>
-          <a:bodyPr lIns="0" rIns="0" tIns="0" bIns="0">
+          <a:bodyPr bIns="0" lIns="0" numCol="1" rIns="0" tIns="0">
             <a:normAutofit/>
           </a:bodyPr>
-          <a:p>
-            <a:endParaRPr b="0" lang="en-US" sz="3200" spc="-1" strike="noStrike">
+          <a:lstStyle/>
+          <a:p>
+            <a:endParaRPr b="0" lang="en-US" spc="-1" strike="noStrike" sz="3200">
               <a:latin typeface="Arial"/>
             </a:endParaRPr>
           </a:p>
@@ -896,11 +914,12 @@
           </a:prstGeom>
         </p:spPr>
         <p:txBody>
-          <a:bodyPr lIns="0" rIns="0" tIns="0" bIns="0">
+          <a:bodyPr bIns="0" lIns="0" numCol="1" rIns="0" tIns="0">
             <a:normAutofit/>
           </a:bodyPr>
-          <a:p>
-            <a:endParaRPr b="0" lang="en-US" sz="3200" spc="-1" strike="noStrike">
+          <a:lstStyle/>
+          <a:p>
+            <a:endParaRPr b="0" lang="en-US" spc="-1" strike="noStrike" sz="3200">
               <a:latin typeface="Arial"/>
             </a:endParaRPr>
           </a:p>
@@ -926,11 +945,12 @@
           </a:prstGeom>
         </p:spPr>
         <p:txBody>
-          <a:bodyPr lIns="0" rIns="0" tIns="0" bIns="0">
+          <a:bodyPr bIns="0" lIns="0" numCol="1" rIns="0" tIns="0">
             <a:normAutofit/>
           </a:bodyPr>
-          <a:p>
-            <a:endParaRPr b="0" lang="en-US" sz="3200" spc="-1" strike="noStrike">
+          <a:lstStyle/>
+          <a:p>
+            <a:endParaRPr b="0" lang="en-US" spc="-1" strike="noStrike" sz="3200">
               <a:latin typeface="Arial"/>
             </a:endParaRPr>
           </a:p>
@@ -956,11 +976,12 @@
           </a:prstGeom>
         </p:spPr>
         <p:txBody>
-          <a:bodyPr lIns="0" rIns="0" tIns="0" bIns="0">
+          <a:bodyPr bIns="0" lIns="0" numCol="1" rIns="0" tIns="0">
             <a:normAutofit/>
           </a:bodyPr>
-          <a:p>
-            <a:endParaRPr b="0" lang="en-US" sz="3200" spc="-1" strike="noStrike">
+          <a:lstStyle/>
+          <a:p>
+            <a:endParaRPr b="0" lang="en-US" spc="-1" strike="noStrike" sz="3200">
               <a:latin typeface="Arial"/>
             </a:endParaRPr>
           </a:p>
@@ -986,11 +1007,12 @@
           </a:prstGeom>
         </p:spPr>
         <p:txBody>
-          <a:bodyPr lIns="0" rIns="0" tIns="0" bIns="0">
+          <a:bodyPr bIns="0" lIns="0" numCol="1" rIns="0" tIns="0">
             <a:normAutofit/>
           </a:bodyPr>
-          <a:p>
-            <a:endParaRPr b="0" lang="en-US" sz="3200" spc="-1" strike="noStrike">
+          <a:lstStyle/>
+          <a:p>
+            <a:endParaRPr b="0" lang="en-US" spc="-1" strike="noStrike" sz="3200">
               <a:latin typeface="Arial"/>
             </a:endParaRPr>
           </a:p>
@@ -1016,11 +1038,12 @@
           </a:prstGeom>
         </p:spPr>
         <p:txBody>
-          <a:bodyPr lIns="0" rIns="0" tIns="0" bIns="0">
+          <a:bodyPr bIns="0" lIns="0" numCol="1" rIns="0" tIns="0">
             <a:normAutofit/>
           </a:bodyPr>
-          <a:p>
-            <a:endParaRPr b="0" lang="en-US" sz="3200" spc="-1" strike="noStrike">
+          <a:lstStyle/>
+          <a:p>
+            <a:endParaRPr b="0" lang="en-US" spc="-1" strike="noStrike" sz="3200">
               <a:latin typeface="Arial"/>
             </a:endParaRPr>
           </a:p>
@@ -1032,7 +1055,7 @@
 </file>
 
 <file path=ppt/slideLayouts/slideLayout2.xml><?xml version="1.0" encoding="utf-8"?>
-<p:sldLayout xmlns:a="http://schemas.openxmlformats.org/drawingml/2006/main" xmlns:p="http://schemas.openxmlformats.org/presentationml/2006/main" xmlns:r="http://schemas.openxmlformats.org/officeDocument/2006/relationships" xmlns:p14="http://schemas.microsoft.com/office/powerpoint/2010/main" xmlns:p15="http://schemas.microsoft.com/office/powerpoint/2012/main" xmlns:mc="http://schemas.openxmlformats.org/markup-compatibility/2006" type="tx" preserve="1">
+<p:sldLayout xmlns:a="http://schemas.openxmlformats.org/drawingml/2006/main" xmlns:p="http://schemas.openxmlformats.org/presentationml/2006/main" xmlns:r="http://schemas.openxmlformats.org/officeDocument/2006/relationships" xmlns:p14="http://schemas.microsoft.com/office/powerpoint/2010/main" xmlns:p15="http://schemas.microsoft.com/office/powerpoint/2012/main" xmlns:mc="http://schemas.openxmlformats.org/markup-compatibility/2006" preserve="1" type="tx">
   <p:cSld name="Title Slide">
     <p:spTree>
       <p:nvGrpSpPr>
@@ -1068,10 +1091,11 @@
           </a:prstGeom>
         </p:spPr>
         <p:txBody>
-          <a:bodyPr lIns="0" rIns="0" tIns="0" bIns="0" anchor="ctr"/>
+          <a:bodyPr anchor="ctr" bIns="0" lIns="0" numCol="1" rIns="0" tIns="0"/>
+          <a:lstStyle/>
           <a:p>
             <a:pPr algn="ctr"/>
-            <a:endParaRPr b="0" lang="en-US" sz="4400" spc="-1" strike="noStrike">
+            <a:endParaRPr b="0" lang="en-US" spc="-1" strike="noStrike" sz="4400">
               <a:latin typeface="Arial"/>
             </a:endParaRPr>
           </a:p>
@@ -1097,10 +1121,11 @@
           </a:prstGeom>
         </p:spPr>
         <p:txBody>
-          <a:bodyPr lIns="0" rIns="0" tIns="0" bIns="0" anchor="ctr"/>
+          <a:bodyPr anchor="ctr" bIns="0" lIns="0" numCol="1" rIns="0" tIns="0"/>
+          <a:lstStyle/>
           <a:p>
             <a:pPr algn="ctr"/>
-            <a:endParaRPr b="0" lang="en-US" sz="3200" spc="-1" strike="noStrike">
+            <a:endParaRPr b="0" lang="en-US" spc="-1" strike="noStrike" sz="3200">
               <a:latin typeface="Arial"/>
             </a:endParaRPr>
           </a:p>
@@ -1112,7 +1137,7 @@
 </file>
 
 <file path=ppt/slideLayouts/slideLayout3.xml><?xml version="1.0" encoding="utf-8"?>
-<p:sldLayout xmlns:a="http://schemas.openxmlformats.org/drawingml/2006/main" xmlns:p="http://schemas.openxmlformats.org/presentationml/2006/main" xmlns:r="http://schemas.openxmlformats.org/officeDocument/2006/relationships" xmlns:p14="http://schemas.microsoft.com/office/powerpoint/2010/main" xmlns:p15="http://schemas.microsoft.com/office/powerpoint/2012/main" xmlns:mc="http://schemas.openxmlformats.org/markup-compatibility/2006" type="obj" preserve="1">
+<p:sldLayout xmlns:a="http://schemas.openxmlformats.org/drawingml/2006/main" xmlns:p="http://schemas.openxmlformats.org/presentationml/2006/main" xmlns:r="http://schemas.openxmlformats.org/officeDocument/2006/relationships" xmlns:p14="http://schemas.microsoft.com/office/powerpoint/2010/main" xmlns:p15="http://schemas.microsoft.com/office/powerpoint/2012/main" xmlns:mc="http://schemas.openxmlformats.org/markup-compatibility/2006" preserve="1" type="obj">
   <p:cSld name="Title, Content">
     <p:spTree>
       <p:nvGrpSpPr>
@@ -1148,10 +1173,11 @@
           </a:prstGeom>
         </p:spPr>
         <p:txBody>
-          <a:bodyPr lIns="0" rIns="0" tIns="0" bIns="0" anchor="ctr"/>
+          <a:bodyPr anchor="ctr" bIns="0" lIns="0" numCol="1" rIns="0" tIns="0"/>
+          <a:lstStyle/>
           <a:p>
             <a:pPr algn="ctr"/>
-            <a:endParaRPr b="0" lang="en-US" sz="4400" spc="-1" strike="noStrike">
+            <a:endParaRPr b="0" lang="en-US" spc="-1" strike="noStrike" sz="4400">
               <a:latin typeface="Arial"/>
             </a:endParaRPr>
           </a:p>
@@ -1177,11 +1203,12 @@
           </a:prstGeom>
         </p:spPr>
         <p:txBody>
-          <a:bodyPr lIns="0" rIns="0" tIns="0" bIns="0">
+          <a:bodyPr bIns="0" lIns="0" numCol="1" rIns="0" tIns="0">
             <a:normAutofit/>
           </a:bodyPr>
-          <a:p>
-            <a:endParaRPr b="0" lang="en-US" sz="3200" spc="-1" strike="noStrike">
+          <a:lstStyle/>
+          <a:p>
+            <a:endParaRPr b="0" lang="en-US" spc="-1" strike="noStrike" sz="3200">
               <a:latin typeface="Arial"/>
             </a:endParaRPr>
           </a:p>
@@ -1193,7 +1220,7 @@
 </file>
 
 <file path=ppt/slideLayouts/slideLayout4.xml><?xml version="1.0" encoding="utf-8"?>
-<p:sldLayout xmlns:a="http://schemas.openxmlformats.org/drawingml/2006/main" xmlns:p="http://schemas.openxmlformats.org/presentationml/2006/main" xmlns:r="http://schemas.openxmlformats.org/officeDocument/2006/relationships" xmlns:p14="http://schemas.microsoft.com/office/powerpoint/2010/main" xmlns:p15="http://schemas.microsoft.com/office/powerpoint/2012/main" xmlns:mc="http://schemas.openxmlformats.org/markup-compatibility/2006" type="twoObj" preserve="1">
+<p:sldLayout xmlns:a="http://schemas.openxmlformats.org/drawingml/2006/main" xmlns:p="http://schemas.openxmlformats.org/presentationml/2006/main" xmlns:r="http://schemas.openxmlformats.org/officeDocument/2006/relationships" xmlns:p14="http://schemas.microsoft.com/office/powerpoint/2010/main" xmlns:p15="http://schemas.microsoft.com/office/powerpoint/2012/main" xmlns:mc="http://schemas.openxmlformats.org/markup-compatibility/2006" preserve="1" type="twoObj">
   <p:cSld name="Title, 2 Content">
     <p:spTree>
       <p:nvGrpSpPr>
@@ -1229,10 +1256,11 @@
           </a:prstGeom>
         </p:spPr>
         <p:txBody>
-          <a:bodyPr lIns="0" rIns="0" tIns="0" bIns="0" anchor="ctr"/>
+          <a:bodyPr anchor="ctr" bIns="0" lIns="0" numCol="1" rIns="0" tIns="0"/>
+          <a:lstStyle/>
           <a:p>
             <a:pPr algn="ctr"/>
-            <a:endParaRPr b="0" lang="en-US" sz="4400" spc="-1" strike="noStrike">
+            <a:endParaRPr b="0" lang="en-US" spc="-1" strike="noStrike" sz="4400">
               <a:latin typeface="Arial"/>
             </a:endParaRPr>
           </a:p>
@@ -1258,11 +1286,12 @@
           </a:prstGeom>
         </p:spPr>
         <p:txBody>
-          <a:bodyPr lIns="0" rIns="0" tIns="0" bIns="0">
+          <a:bodyPr bIns="0" lIns="0" numCol="1" rIns="0" tIns="0">
             <a:normAutofit/>
           </a:bodyPr>
-          <a:p>
-            <a:endParaRPr b="0" lang="en-US" sz="3200" spc="-1" strike="noStrike">
+          <a:lstStyle/>
+          <a:p>
+            <a:endParaRPr b="0" lang="en-US" spc="-1" strike="noStrike" sz="3200">
               <a:latin typeface="Arial"/>
             </a:endParaRPr>
           </a:p>
@@ -1288,11 +1317,12 @@
           </a:prstGeom>
         </p:spPr>
         <p:txBody>
-          <a:bodyPr lIns="0" rIns="0" tIns="0" bIns="0">
+          <a:bodyPr bIns="0" lIns="0" numCol="1" rIns="0" tIns="0">
             <a:normAutofit/>
           </a:bodyPr>
-          <a:p>
-            <a:endParaRPr b="0" lang="en-US" sz="3200" spc="-1" strike="noStrike">
+          <a:lstStyle/>
+          <a:p>
+            <a:endParaRPr b="0" lang="en-US" spc="-1" strike="noStrike" sz="3200">
               <a:latin typeface="Arial"/>
             </a:endParaRPr>
           </a:p>
@@ -1304,7 +1334,7 @@
 </file>
 
 <file path=ppt/slideLayouts/slideLayout5.xml><?xml version="1.0" encoding="utf-8"?>
-<p:sldLayout xmlns:a="http://schemas.openxmlformats.org/drawingml/2006/main" xmlns:p="http://schemas.openxmlformats.org/presentationml/2006/main" xmlns:r="http://schemas.openxmlformats.org/officeDocument/2006/relationships" xmlns:p14="http://schemas.microsoft.com/office/powerpoint/2010/main" xmlns:p15="http://schemas.microsoft.com/office/powerpoint/2012/main" xmlns:mc="http://schemas.openxmlformats.org/markup-compatibility/2006" type="titleOnly" preserve="1">
+<p:sldLayout xmlns:a="http://schemas.openxmlformats.org/drawingml/2006/main" xmlns:p="http://schemas.openxmlformats.org/presentationml/2006/main" xmlns:r="http://schemas.openxmlformats.org/officeDocument/2006/relationships" xmlns:p14="http://schemas.microsoft.com/office/powerpoint/2010/main" xmlns:p15="http://schemas.microsoft.com/office/powerpoint/2012/main" xmlns:mc="http://schemas.openxmlformats.org/markup-compatibility/2006" preserve="1" type="titleOnly">
   <p:cSld name="Title Only">
     <p:spTree>
       <p:nvGrpSpPr>
@@ -1340,10 +1370,11 @@
           </a:prstGeom>
         </p:spPr>
         <p:txBody>
-          <a:bodyPr lIns="0" rIns="0" tIns="0" bIns="0" anchor="ctr"/>
+          <a:bodyPr anchor="ctr" bIns="0" lIns="0" numCol="1" rIns="0" tIns="0"/>
+          <a:lstStyle/>
           <a:p>
             <a:pPr algn="ctr"/>
-            <a:endParaRPr b="0" lang="en-US" sz="4400" spc="-1" strike="noStrike">
+            <a:endParaRPr b="0" lang="en-US" spc="-1" strike="noStrike" sz="4400">
               <a:latin typeface="Arial"/>
             </a:endParaRPr>
           </a:p>
@@ -1355,7 +1386,7 @@
 </file>
 
 <file path=ppt/slideLayouts/slideLayout6.xml><?xml version="1.0" encoding="utf-8"?>
-<p:sldLayout xmlns:a="http://schemas.openxmlformats.org/drawingml/2006/main" xmlns:p="http://schemas.openxmlformats.org/presentationml/2006/main" xmlns:r="http://schemas.openxmlformats.org/officeDocument/2006/relationships" xmlns:p14="http://schemas.microsoft.com/office/powerpoint/2010/main" xmlns:p15="http://schemas.microsoft.com/office/powerpoint/2012/main" xmlns:mc="http://schemas.openxmlformats.org/markup-compatibility/2006" type="objOnly" preserve="1">
+<p:sldLayout xmlns:a="http://schemas.openxmlformats.org/drawingml/2006/main" xmlns:p="http://schemas.openxmlformats.org/presentationml/2006/main" xmlns:r="http://schemas.openxmlformats.org/officeDocument/2006/relationships" xmlns:p14="http://schemas.microsoft.com/office/powerpoint/2010/main" xmlns:p15="http://schemas.microsoft.com/office/powerpoint/2012/main" xmlns:mc="http://schemas.openxmlformats.org/markup-compatibility/2006" preserve="1" type="objOnly">
   <p:cSld name="Centered Text">
     <p:spTree>
       <p:nvGrpSpPr>
@@ -1391,10 +1422,11 @@
           </a:prstGeom>
         </p:spPr>
         <p:txBody>
-          <a:bodyPr lIns="0" rIns="0" tIns="0" bIns="0" anchor="ctr"/>
+          <a:bodyPr anchor="ctr" bIns="0" lIns="0" numCol="1" rIns="0" tIns="0"/>
+          <a:lstStyle/>
           <a:p>
             <a:pPr algn="ctr"/>
-            <a:endParaRPr b="0" lang="en-US" sz="3200" spc="-1" strike="noStrike">
+            <a:endParaRPr b="0" lang="en-US" spc="-1" strike="noStrike" sz="3200">
               <a:latin typeface="Arial"/>
             </a:endParaRPr>
           </a:p>
@@ -1406,7 +1438,7 @@
 </file>
 
 <file path=ppt/slideLayouts/slideLayout7.xml><?xml version="1.0" encoding="utf-8"?>
-<p:sldLayout xmlns:a="http://schemas.openxmlformats.org/drawingml/2006/main" xmlns:p="http://schemas.openxmlformats.org/presentationml/2006/main" xmlns:r="http://schemas.openxmlformats.org/officeDocument/2006/relationships" xmlns:p14="http://schemas.microsoft.com/office/powerpoint/2010/main" xmlns:p15="http://schemas.microsoft.com/office/powerpoint/2012/main" xmlns:mc="http://schemas.openxmlformats.org/markup-compatibility/2006" type="twoObjAndObj" preserve="1">
+<p:sldLayout xmlns:a="http://schemas.openxmlformats.org/drawingml/2006/main" xmlns:p="http://schemas.openxmlformats.org/presentationml/2006/main" xmlns:r="http://schemas.openxmlformats.org/officeDocument/2006/relationships" xmlns:p14="http://schemas.microsoft.com/office/powerpoint/2010/main" xmlns:p15="http://schemas.microsoft.com/office/powerpoint/2012/main" xmlns:mc="http://schemas.openxmlformats.org/markup-compatibility/2006" preserve="1" type="twoObjAndObj">
   <p:cSld name="Title, 2 Content and Content">
     <p:spTree>
       <p:nvGrpSpPr>
@@ -1442,10 +1474,11 @@
           </a:prstGeom>
         </p:spPr>
         <p:txBody>
-          <a:bodyPr lIns="0" rIns="0" tIns="0" bIns="0" anchor="ctr"/>
+          <a:bodyPr anchor="ctr" bIns="0" lIns="0" numCol="1" rIns="0" tIns="0"/>
+          <a:lstStyle/>
           <a:p>
             <a:pPr algn="ctr"/>
-            <a:endParaRPr b="0" lang="en-US" sz="4400" spc="-1" strike="noStrike">
+            <a:endParaRPr b="0" lang="en-US" spc="-1" strike="noStrike" sz="4400">
               <a:latin typeface="Arial"/>
             </a:endParaRPr>
           </a:p>
@@ -1471,11 +1504,12 @@
           </a:prstGeom>
         </p:spPr>
         <p:txBody>
-          <a:bodyPr lIns="0" rIns="0" tIns="0" bIns="0">
+          <a:bodyPr bIns="0" lIns="0" numCol="1" rIns="0" tIns="0">
             <a:normAutofit/>
           </a:bodyPr>
-          <a:p>
-            <a:endParaRPr b="0" lang="en-US" sz="3200" spc="-1" strike="noStrike">
+          <a:lstStyle/>
+          <a:p>
+            <a:endParaRPr b="0" lang="en-US" spc="-1" strike="noStrike" sz="3200">
               <a:latin typeface="Arial"/>
             </a:endParaRPr>
           </a:p>
@@ -1501,11 +1535,12 @@
           </a:prstGeom>
         </p:spPr>
         <p:txBody>
-          <a:bodyPr lIns="0" rIns="0" tIns="0" bIns="0">
+          <a:bodyPr bIns="0" lIns="0" numCol="1" rIns="0" tIns="0">
             <a:normAutofit/>
           </a:bodyPr>
-          <a:p>
-            <a:endParaRPr b="0" lang="en-US" sz="3200" spc="-1" strike="noStrike">
+          <a:lstStyle/>
+          <a:p>
+            <a:endParaRPr b="0" lang="en-US" spc="-1" strike="noStrike" sz="3200">
               <a:latin typeface="Arial"/>
             </a:endParaRPr>
           </a:p>
@@ -1531,11 +1566,12 @@
           </a:prstGeom>
         </p:spPr>
         <p:txBody>
-          <a:bodyPr lIns="0" rIns="0" tIns="0" bIns="0">
+          <a:bodyPr bIns="0" lIns="0" numCol="1" rIns="0" tIns="0">
             <a:normAutofit/>
           </a:bodyPr>
-          <a:p>
-            <a:endParaRPr b="0" lang="en-US" sz="3200" spc="-1" strike="noStrike">
+          <a:lstStyle/>
+          <a:p>
+            <a:endParaRPr b="0" lang="en-US" spc="-1" strike="noStrike" sz="3200">
               <a:latin typeface="Arial"/>
             </a:endParaRPr>
           </a:p>
@@ -1547,7 +1583,7 @@
 </file>
 
 <file path=ppt/slideLayouts/slideLayout8.xml><?xml version="1.0" encoding="utf-8"?>
-<p:sldLayout xmlns:a="http://schemas.openxmlformats.org/drawingml/2006/main" xmlns:p="http://schemas.openxmlformats.org/presentationml/2006/main" xmlns:r="http://schemas.openxmlformats.org/officeDocument/2006/relationships" xmlns:p14="http://schemas.microsoft.com/office/powerpoint/2010/main" xmlns:p15="http://schemas.microsoft.com/office/powerpoint/2012/main" xmlns:mc="http://schemas.openxmlformats.org/markup-compatibility/2006" type="objAndTwoObj" preserve="1">
+<p:sldLayout xmlns:a="http://schemas.openxmlformats.org/drawingml/2006/main" xmlns:p="http://schemas.openxmlformats.org/presentationml/2006/main" xmlns:r="http://schemas.openxmlformats.org/officeDocument/2006/relationships" xmlns:p14="http://schemas.microsoft.com/office/powerpoint/2010/main" xmlns:p15="http://schemas.microsoft.com/office/powerpoint/2012/main" xmlns:mc="http://schemas.openxmlformats.org/markup-compatibility/2006" preserve="1" type="objAndTwoObj">
   <p:cSld name="Title Content and 2 Content">
     <p:spTree>
       <p:nvGrpSpPr>
@@ -1583,10 +1619,11 @@
           </a:prstGeom>
         </p:spPr>
         <p:txBody>
-          <a:bodyPr lIns="0" rIns="0" tIns="0" bIns="0" anchor="ctr"/>
+          <a:bodyPr anchor="ctr" bIns="0" lIns="0" numCol="1" rIns="0" tIns="0"/>
+          <a:lstStyle/>
           <a:p>
             <a:pPr algn="ctr"/>
-            <a:endParaRPr b="0" lang="en-US" sz="4400" spc="-1" strike="noStrike">
+            <a:endParaRPr b="0" lang="en-US" spc="-1" strike="noStrike" sz="4400">
               <a:latin typeface="Arial"/>
             </a:endParaRPr>
           </a:p>
@@ -1612,11 +1649,12 @@
           </a:prstGeom>
         </p:spPr>
         <p:txBody>
-          <a:bodyPr lIns="0" rIns="0" tIns="0" bIns="0">
+          <a:bodyPr bIns="0" lIns="0" numCol="1" rIns="0" tIns="0">
             <a:normAutofit/>
           </a:bodyPr>
-          <a:p>
-            <a:endParaRPr b="0" lang="en-US" sz="3200" spc="-1" strike="noStrike">
+          <a:lstStyle/>
+          <a:p>
+            <a:endParaRPr b="0" lang="en-US" spc="-1" strike="noStrike" sz="3200">
               <a:latin typeface="Arial"/>
             </a:endParaRPr>
           </a:p>
@@ -1642,11 +1680,12 @@
           </a:prstGeom>
         </p:spPr>
         <p:txBody>
-          <a:bodyPr lIns="0" rIns="0" tIns="0" bIns="0">
+          <a:bodyPr bIns="0" lIns="0" numCol="1" rIns="0" tIns="0">
             <a:normAutofit/>
           </a:bodyPr>
-          <a:p>
-            <a:endParaRPr b="0" lang="en-US" sz="3200" spc="-1" strike="noStrike">
+          <a:lstStyle/>
+          <a:p>
+            <a:endParaRPr b="0" lang="en-US" spc="-1" strike="noStrike" sz="3200">
               <a:latin typeface="Arial"/>
             </a:endParaRPr>
           </a:p>
@@ -1672,11 +1711,12 @@
           </a:prstGeom>
         </p:spPr>
         <p:txBody>
-          <a:bodyPr lIns="0" rIns="0" tIns="0" bIns="0">
+          <a:bodyPr bIns="0" lIns="0" numCol="1" rIns="0" tIns="0">
             <a:normAutofit/>
           </a:bodyPr>
-          <a:p>
-            <a:endParaRPr b="0" lang="en-US" sz="3200" spc="-1" strike="noStrike">
+          <a:lstStyle/>
+          <a:p>
+            <a:endParaRPr b="0" lang="en-US" spc="-1" strike="noStrike" sz="3200">
               <a:latin typeface="Arial"/>
             </a:endParaRPr>
           </a:p>
@@ -1688,7 +1728,7 @@
 </file>
 
 <file path=ppt/slideLayouts/slideLayout9.xml><?xml version="1.0" encoding="utf-8"?>
-<p:sldLayout xmlns:a="http://schemas.openxmlformats.org/drawingml/2006/main" xmlns:p="http://schemas.openxmlformats.org/presentationml/2006/main" xmlns:r="http://schemas.openxmlformats.org/officeDocument/2006/relationships" xmlns:p14="http://schemas.microsoft.com/office/powerpoint/2010/main" xmlns:p15="http://schemas.microsoft.com/office/powerpoint/2012/main" xmlns:mc="http://schemas.openxmlformats.org/markup-compatibility/2006" type="twoObjOverTx" preserve="1">
+<p:sldLayout xmlns:a="http://schemas.openxmlformats.org/drawingml/2006/main" xmlns:p="http://schemas.openxmlformats.org/presentationml/2006/main" xmlns:r="http://schemas.openxmlformats.org/officeDocument/2006/relationships" xmlns:p14="http://schemas.microsoft.com/office/powerpoint/2010/main" xmlns:p15="http://schemas.microsoft.com/office/powerpoint/2012/main" xmlns:mc="http://schemas.openxmlformats.org/markup-compatibility/2006" preserve="1" type="twoObjOverTx">
   <p:cSld name="Title, 2 Content over Content">
     <p:spTree>
       <p:nvGrpSpPr>
@@ -1724,10 +1764,11 @@
           </a:prstGeom>
         </p:spPr>
         <p:txBody>
-          <a:bodyPr lIns="0" rIns="0" tIns="0" bIns="0" anchor="ctr"/>
+          <a:bodyPr anchor="ctr" bIns="0" lIns="0" numCol="1" rIns="0" tIns="0"/>
+          <a:lstStyle/>
           <a:p>
             <a:pPr algn="ctr"/>
-            <a:endParaRPr b="0" lang="en-US" sz="4400" spc="-1" strike="noStrike">
+            <a:endParaRPr b="0" lang="en-US" spc="-1" strike="noStrike" sz="4400">
               <a:latin typeface="Arial"/>
             </a:endParaRPr>
           </a:p>
@@ -1753,11 +1794,12 @@
           </a:prstGeom>
         </p:spPr>
         <p:txBody>
-          <a:bodyPr lIns="0" rIns="0" tIns="0" bIns="0">
+          <a:bodyPr bIns="0" lIns="0" numCol="1" rIns="0" tIns="0">
             <a:normAutofit/>
           </a:bodyPr>
-          <a:p>
-            <a:endParaRPr b="0" lang="en-US" sz="3200" spc="-1" strike="noStrike">
+          <a:lstStyle/>
+          <a:p>
+            <a:endParaRPr b="0" lang="en-US" spc="-1" strike="noStrike" sz="3200">
               <a:latin typeface="Arial"/>
             </a:endParaRPr>
           </a:p>
@@ -1783,11 +1825,12 @@
           </a:prstGeom>
         </p:spPr>
         <p:txBody>
-          <a:bodyPr lIns="0" rIns="0" tIns="0" bIns="0">
+          <a:bodyPr bIns="0" lIns="0" numCol="1" rIns="0" tIns="0">
             <a:normAutofit/>
           </a:bodyPr>
-          <a:p>
-            <a:endParaRPr b="0" lang="en-US" sz="3200" spc="-1" strike="noStrike">
+          <a:lstStyle/>
+          <a:p>
+            <a:endParaRPr b="0" lang="en-US" spc="-1" strike="noStrike" sz="3200">
               <a:latin typeface="Arial"/>
             </a:endParaRPr>
           </a:p>
@@ -1813,11 +1856,12 @@
           </a:prstGeom>
         </p:spPr>
         <p:txBody>
-          <a:bodyPr lIns="0" rIns="0" tIns="0" bIns="0">
+          <a:bodyPr bIns="0" lIns="0" numCol="1" rIns="0" tIns="0">
             <a:normAutofit/>
           </a:bodyPr>
-          <a:p>
-            <a:endParaRPr b="0" lang="en-US" sz="3200" spc="-1" strike="noStrike">
+          <a:lstStyle/>
+          <a:p>
+            <a:endParaRPr b="0" lang="en-US" spc="-1" strike="noStrike" sz="3200">
               <a:latin typeface="Arial"/>
             </a:endParaRPr>
           </a:p>
@@ -1834,7 +1878,7 @@
     <p:bg>
       <p:bgPr>
         <a:solidFill>
-          <a:srgbClr val="ffffff"/>
+          <a:srgbClr val="FFFFFF"/>
         </a:solidFill>
       </p:bgPr>
     </p:bg>
@@ -1872,220 +1916,221 @@
           </a:prstGeom>
         </p:spPr>
         <p:txBody>
-          <a:bodyPr lIns="0" rIns="0" tIns="0" bIns="0" anchor="ctr"/>
+          <a:bodyPr anchor="ctr" bIns="0" lIns="0" numCol="1" rIns="0" tIns="0"/>
+          <a:lstStyle/>
           <a:p>
             <a:pPr algn="ctr"/>
             <a:r>
-              <a:rPr b="0" lang="en-US" sz="4400" spc="-1" strike="noStrike">
+              <a:rPr b="0" lang="en-US" spc="-1" strike="noStrike" sz="4400">
                 <a:latin typeface="Arial"/>
               </a:rPr>
               <a:t>C</a:t>
             </a:r>
             <a:r>
-              <a:rPr b="0" lang="en-US" sz="4400" spc="-1" strike="noStrike">
+              <a:rPr b="0" lang="en-US" spc="-1" strike="noStrike" sz="4400">
                 <a:latin typeface="Arial"/>
               </a:rPr>
               <a:t>l</a:t>
             </a:r>
             <a:r>
-              <a:rPr b="0" lang="en-US" sz="4400" spc="-1" strike="noStrike">
+              <a:rPr b="0" lang="en-US" spc="-1" strike="noStrike" sz="4400">
                 <a:latin typeface="Arial"/>
               </a:rPr>
               <a:t>i</a:t>
             </a:r>
             <a:r>
-              <a:rPr b="0" lang="en-US" sz="4400" spc="-1" strike="noStrike">
+              <a:rPr b="0" lang="en-US" spc="-1" strike="noStrike" sz="4400">
                 <a:latin typeface="Arial"/>
               </a:rPr>
               <a:t>c</a:t>
             </a:r>
             <a:r>
-              <a:rPr b="0" lang="en-US" sz="4400" spc="-1" strike="noStrike">
+              <a:rPr b="0" lang="en-US" spc="-1" strike="noStrike" sz="4400">
                 <a:latin typeface="Arial"/>
               </a:rPr>
               <a:t>k</a:t>
             </a:r>
             <a:r>
-              <a:rPr b="0" lang="en-US" sz="4400" spc="-1" strike="noStrike">
+              <a:rPr b="0" lang="en-US" spc="-1" strike="noStrike" sz="4400">
                 <a:latin typeface="Arial"/>
               </a:rPr>
               <a:t> </a:t>
             </a:r>
             <a:r>
-              <a:rPr b="0" lang="en-US" sz="4400" spc="-1" strike="noStrike">
+              <a:rPr b="0" lang="en-US" spc="-1" strike="noStrike" sz="4400">
                 <a:latin typeface="Arial"/>
               </a:rPr>
               <a:t>t</a:t>
             </a:r>
             <a:r>
-              <a:rPr b="0" lang="en-US" sz="4400" spc="-1" strike="noStrike">
+              <a:rPr b="0" lang="en-US" spc="-1" strike="noStrike" sz="4400">
                 <a:latin typeface="Arial"/>
               </a:rPr>
               <a:t>o</a:t>
             </a:r>
             <a:r>
-              <a:rPr b="0" lang="en-US" sz="4400" spc="-1" strike="noStrike">
+              <a:rPr b="0" lang="en-US" spc="-1" strike="noStrike" sz="4400">
                 <a:latin typeface="Arial"/>
               </a:rPr>
               <a:t> </a:t>
             </a:r>
             <a:r>
-              <a:rPr b="0" lang="en-US" sz="4400" spc="-1" strike="noStrike">
+              <a:rPr b="0" lang="en-US" spc="-1" strike="noStrike" sz="4400">
                 <a:latin typeface="Arial"/>
               </a:rPr>
               <a:t>e</a:t>
             </a:r>
             <a:r>
-              <a:rPr b="0" lang="en-US" sz="4400" spc="-1" strike="noStrike">
+              <a:rPr b="0" lang="en-US" spc="-1" strike="noStrike" sz="4400">
                 <a:latin typeface="Arial"/>
               </a:rPr>
               <a:t>d</a:t>
             </a:r>
             <a:r>
-              <a:rPr b="0" lang="en-US" sz="4400" spc="-1" strike="noStrike">
+              <a:rPr b="0" lang="en-US" spc="-1" strike="noStrike" sz="4400">
                 <a:latin typeface="Arial"/>
               </a:rPr>
               <a:t>i</a:t>
             </a:r>
             <a:r>
-              <a:rPr b="0" lang="en-US" sz="4400" spc="-1" strike="noStrike">
+              <a:rPr b="0" lang="en-US" spc="-1" strike="noStrike" sz="4400">
                 <a:latin typeface="Arial"/>
               </a:rPr>
               <a:t>t</a:t>
             </a:r>
             <a:r>
-              <a:rPr b="0" lang="en-US" sz="4400" spc="-1" strike="noStrike">
+              <a:rPr b="0" lang="en-US" spc="-1" strike="noStrike" sz="4400">
                 <a:latin typeface="Arial"/>
               </a:rPr>
               <a:t> </a:t>
             </a:r>
             <a:r>
-              <a:rPr b="0" lang="en-US" sz="4400" spc="-1" strike="noStrike">
+              <a:rPr b="0" lang="en-US" spc="-1" strike="noStrike" sz="4400">
                 <a:latin typeface="Arial"/>
               </a:rPr>
               <a:t>t</a:t>
             </a:r>
             <a:r>
-              <a:rPr b="0" lang="en-US" sz="4400" spc="-1" strike="noStrike">
+              <a:rPr b="0" lang="en-US" spc="-1" strike="noStrike" sz="4400">
                 <a:latin typeface="Arial"/>
               </a:rPr>
               <a:t>h</a:t>
             </a:r>
             <a:r>
-              <a:rPr b="0" lang="en-US" sz="4400" spc="-1" strike="noStrike">
+              <a:rPr b="0" lang="en-US" spc="-1" strike="noStrike" sz="4400">
                 <a:latin typeface="Arial"/>
               </a:rPr>
               <a:t>e</a:t>
             </a:r>
             <a:r>
-              <a:rPr b="0" lang="en-US" sz="4400" spc="-1" strike="noStrike">
+              <a:rPr b="0" lang="en-US" spc="-1" strike="noStrike" sz="4400">
                 <a:latin typeface="Arial"/>
               </a:rPr>
               <a:t> </a:t>
             </a:r>
             <a:r>
-              <a:rPr b="0" lang="en-US" sz="4400" spc="-1" strike="noStrike">
+              <a:rPr b="0" lang="en-US" spc="-1" strike="noStrike" sz="4400">
                 <a:latin typeface="Arial"/>
               </a:rPr>
               <a:t>t</a:t>
             </a:r>
             <a:r>
-              <a:rPr b="0" lang="en-US" sz="4400" spc="-1" strike="noStrike">
+              <a:rPr b="0" lang="en-US" spc="-1" strike="noStrike" sz="4400">
                 <a:latin typeface="Arial"/>
               </a:rPr>
               <a:t>i</a:t>
             </a:r>
             <a:r>
-              <a:rPr b="0" lang="en-US" sz="4400" spc="-1" strike="noStrike">
+              <a:rPr b="0" lang="en-US" spc="-1" strike="noStrike" sz="4400">
                 <a:latin typeface="Arial"/>
               </a:rPr>
               <a:t>t</a:t>
             </a:r>
             <a:r>
-              <a:rPr b="0" lang="en-US" sz="4400" spc="-1" strike="noStrike">
+              <a:rPr b="0" lang="en-US" spc="-1" strike="noStrike" sz="4400">
                 <a:latin typeface="Arial"/>
               </a:rPr>
               <a:t>l</a:t>
             </a:r>
             <a:r>
-              <a:rPr b="0" lang="en-US" sz="4400" spc="-1" strike="noStrike">
+              <a:rPr b="0" lang="en-US" spc="-1" strike="noStrike" sz="4400">
                 <a:latin typeface="Arial"/>
               </a:rPr>
               <a:t>e</a:t>
             </a:r>
             <a:r>
-              <a:rPr b="0" lang="en-US" sz="4400" spc="-1" strike="noStrike">
+              <a:rPr b="0" lang="en-US" spc="-1" strike="noStrike" sz="4400">
                 <a:latin typeface="Arial"/>
               </a:rPr>
               <a:t> </a:t>
             </a:r>
             <a:r>
-              <a:rPr b="0" lang="en-US" sz="4400" spc="-1" strike="noStrike">
+              <a:rPr b="0" lang="en-US" spc="-1" strike="noStrike" sz="4400">
                 <a:latin typeface="Arial"/>
               </a:rPr>
               <a:t>t</a:t>
             </a:r>
             <a:r>
-              <a:rPr b="0" lang="en-US" sz="4400" spc="-1" strike="noStrike">
+              <a:rPr b="0" lang="en-US" spc="-1" strike="noStrike" sz="4400">
                 <a:latin typeface="Arial"/>
               </a:rPr>
               <a:t>e</a:t>
             </a:r>
             <a:r>
-              <a:rPr b="0" lang="en-US" sz="4400" spc="-1" strike="noStrike">
+              <a:rPr b="0" lang="en-US" spc="-1" strike="noStrike" sz="4400">
                 <a:latin typeface="Arial"/>
               </a:rPr>
               <a:t>x</a:t>
             </a:r>
             <a:r>
-              <a:rPr b="0" lang="en-US" sz="4400" spc="-1" strike="noStrike">
+              <a:rPr b="0" lang="en-US" spc="-1" strike="noStrike" sz="4400">
                 <a:latin typeface="Arial"/>
               </a:rPr>
               <a:t>t</a:t>
             </a:r>
             <a:r>
-              <a:rPr b="0" lang="en-US" sz="4400" spc="-1" strike="noStrike">
+              <a:rPr b="0" lang="en-US" spc="-1" strike="noStrike" sz="4400">
                 <a:latin typeface="Arial"/>
               </a:rPr>
               <a:t> </a:t>
             </a:r>
             <a:r>
-              <a:rPr b="0" lang="en-US" sz="4400" spc="-1" strike="noStrike">
+              <a:rPr b="0" lang="en-US" spc="-1" strike="noStrike" sz="4400">
                 <a:latin typeface="Arial"/>
               </a:rPr>
               <a:t>f</a:t>
             </a:r>
             <a:r>
-              <a:rPr b="0" lang="en-US" sz="4400" spc="-1" strike="noStrike">
+              <a:rPr b="0" lang="en-US" spc="-1" strike="noStrike" sz="4400">
                 <a:latin typeface="Arial"/>
               </a:rPr>
               <a:t>o</a:t>
             </a:r>
             <a:r>
-              <a:rPr b="0" lang="en-US" sz="4400" spc="-1" strike="noStrike">
+              <a:rPr b="0" lang="en-US" spc="-1" strike="noStrike" sz="4400">
                 <a:latin typeface="Arial"/>
               </a:rPr>
               <a:t>r</a:t>
             </a:r>
             <a:r>
-              <a:rPr b="0" lang="en-US" sz="4400" spc="-1" strike="noStrike">
+              <a:rPr b="0" lang="en-US" spc="-1" strike="noStrike" sz="4400">
                 <a:latin typeface="Arial"/>
               </a:rPr>
               <a:t>m</a:t>
             </a:r>
             <a:r>
-              <a:rPr b="0" lang="en-US" sz="4400" spc="-1" strike="noStrike">
+              <a:rPr b="0" lang="en-US" spc="-1" strike="noStrike" sz="4400">
                 <a:latin typeface="Arial"/>
               </a:rPr>
               <a:t>a</a:t>
             </a:r>
             <a:r>
-              <a:rPr b="0" lang="en-US" sz="4400" spc="-1" strike="noStrike">
+              <a:rPr b="0" lang="en-US" spc="-1" strike="noStrike" sz="4400">
                 <a:latin typeface="Arial"/>
               </a:rPr>
               <a:t>t</a:t>
             </a:r>
-            <a:endParaRPr b="0" lang="en-US" sz="4400" spc="-1" strike="noStrike">
+            <a:endParaRPr b="0" lang="en-US" spc="-1" strike="noStrike" sz="4400">
               <a:latin typeface="Arial"/>
             </a:endParaRPr>
           </a:p>
@@ -2111,11 +2156,12 @@
           </a:prstGeom>
         </p:spPr>
         <p:txBody>
-          <a:bodyPr lIns="0" rIns="0" tIns="0" bIns="0">
+          <a:bodyPr bIns="0" lIns="0" numCol="1" rIns="0" tIns="0">
             <a:normAutofit/>
           </a:bodyPr>
-          <a:p>
-            <a:pPr marL="432000" indent="-324000">
+          <a:lstStyle/>
+          <a:p>
+            <a:pPr indent="-324000" marL="432000">
               <a:spcBef>
                 <a:spcPts val="1417"/>
               </a:spcBef>
@@ -2123,21 +2169,21 @@
                 <a:srgbClr val="000000"/>
               </a:buClr>
               <a:buSzPct val="45000"/>
-              <a:buFont typeface="Wingdings" charset="2"/>
+              <a:buFont charset="2" typeface="Wingdings"/>
               <a:buChar char=""/>
             </a:pPr>
             <a:r>
-              <a:rPr b="0" lang="en-US" sz="3200" spc="-1" strike="noStrike">
+              <a:rPr b="0" lang="en-US" spc="-1" strike="noStrike" sz="3200">
                 <a:latin typeface="Arial"/>
               </a:rPr>
               <a:t>Click to edit the outline text format</a:t>
             </a:r>
-            <a:endParaRPr b="0" lang="en-US" sz="3200" spc="-1" strike="noStrike">
-              <a:latin typeface="Arial"/>
-            </a:endParaRPr>
-          </a:p>
-          <a:p>
-            <a:pPr lvl="1" marL="864000" indent="-324000">
+            <a:endParaRPr b="0" lang="en-US" spc="-1" strike="noStrike" sz="3200">
+              <a:latin typeface="Arial"/>
+            </a:endParaRPr>
+          </a:p>
+          <a:p>
+            <a:pPr indent="-324000" lvl="1" marL="864000">
               <a:spcBef>
                 <a:spcPts val="1134"/>
               </a:spcBef>
@@ -2145,21 +2191,21 @@
                 <a:srgbClr val="000000"/>
               </a:buClr>
               <a:buSzPct val="75000"/>
-              <a:buFont typeface="Symbol" charset="2"/>
+              <a:buFont charset="2" typeface="Symbol"/>
               <a:buChar char=""/>
             </a:pPr>
             <a:r>
-              <a:rPr b="0" lang="en-US" sz="2800" spc="-1" strike="noStrike">
+              <a:rPr b="0" lang="en-US" spc="-1" strike="noStrike" sz="2800">
                 <a:latin typeface="Arial"/>
               </a:rPr>
               <a:t>Second Outline Level</a:t>
             </a:r>
-            <a:endParaRPr b="0" lang="en-US" sz="2800" spc="-1" strike="noStrike">
-              <a:latin typeface="Arial"/>
-            </a:endParaRPr>
-          </a:p>
-          <a:p>
-            <a:pPr lvl="2" marL="1296000" indent="-288000">
+            <a:endParaRPr b="0" lang="en-US" spc="-1" strike="noStrike" sz="2800">
+              <a:latin typeface="Arial"/>
+            </a:endParaRPr>
+          </a:p>
+          <a:p>
+            <a:pPr indent="-288000" lvl="2" marL="1296000">
               <a:spcBef>
                 <a:spcPts val="850"/>
               </a:spcBef>
@@ -2167,21 +2213,21 @@
                 <a:srgbClr val="000000"/>
               </a:buClr>
               <a:buSzPct val="45000"/>
-              <a:buFont typeface="Wingdings" charset="2"/>
+              <a:buFont charset="2" typeface="Wingdings"/>
               <a:buChar char=""/>
             </a:pPr>
             <a:r>
-              <a:rPr b="0" lang="en-US" sz="2400" spc="-1" strike="noStrike">
+              <a:rPr b="0" lang="en-US" spc="-1" strike="noStrike" sz="2400">
                 <a:latin typeface="Arial"/>
               </a:rPr>
               <a:t>Third Outline Level</a:t>
             </a:r>
-            <a:endParaRPr b="0" lang="en-US" sz="2400" spc="-1" strike="noStrike">
-              <a:latin typeface="Arial"/>
-            </a:endParaRPr>
-          </a:p>
-          <a:p>
-            <a:pPr lvl="3" marL="1728000" indent="-216000">
+            <a:endParaRPr b="0" lang="en-US" spc="-1" strike="noStrike" sz="2400">
+              <a:latin typeface="Arial"/>
+            </a:endParaRPr>
+          </a:p>
+          <a:p>
+            <a:pPr indent="-216000" lvl="3" marL="1728000">
               <a:spcBef>
                 <a:spcPts val="567"/>
               </a:spcBef>
@@ -2189,21 +2235,21 @@
                 <a:srgbClr val="000000"/>
               </a:buClr>
               <a:buSzPct val="75000"/>
-              <a:buFont typeface="Symbol" charset="2"/>
+              <a:buFont charset="2" typeface="Symbol"/>
               <a:buChar char=""/>
             </a:pPr>
             <a:r>
-              <a:rPr b="0" lang="en-US" sz="2000" spc="-1" strike="noStrike">
+              <a:rPr b="0" lang="en-US" spc="-1" strike="noStrike" sz="2000">
                 <a:latin typeface="Arial"/>
               </a:rPr>
               <a:t>Fourth Outline Level</a:t>
             </a:r>
-            <a:endParaRPr b="0" lang="en-US" sz="2000" spc="-1" strike="noStrike">
-              <a:latin typeface="Arial"/>
-            </a:endParaRPr>
-          </a:p>
-          <a:p>
-            <a:pPr lvl="4" marL="2160000" indent="-216000">
+            <a:endParaRPr b="0" lang="en-US" spc="-1" strike="noStrike" sz="2000">
+              <a:latin typeface="Arial"/>
+            </a:endParaRPr>
+          </a:p>
+          <a:p>
+            <a:pPr indent="-216000" lvl="4" marL="2160000">
               <a:spcBef>
                 <a:spcPts val="283"/>
               </a:spcBef>
@@ -2211,21 +2257,21 @@
                 <a:srgbClr val="000000"/>
               </a:buClr>
               <a:buSzPct val="45000"/>
-              <a:buFont typeface="Wingdings" charset="2"/>
+              <a:buFont charset="2" typeface="Wingdings"/>
               <a:buChar char=""/>
             </a:pPr>
             <a:r>
-              <a:rPr b="0" lang="en-US" sz="2000" spc="-1" strike="noStrike">
+              <a:rPr b="0" lang="en-US" spc="-1" strike="noStrike" sz="2000">
                 <a:latin typeface="Arial"/>
               </a:rPr>
               <a:t>Fifth Outline Level</a:t>
             </a:r>
-            <a:endParaRPr b="0" lang="en-US" sz="2000" spc="-1" strike="noStrike">
-              <a:latin typeface="Arial"/>
-            </a:endParaRPr>
-          </a:p>
-          <a:p>
-            <a:pPr lvl="5" marL="2592000" indent="-216000">
+            <a:endParaRPr b="0" lang="en-US" spc="-1" strike="noStrike" sz="2000">
+              <a:latin typeface="Arial"/>
+            </a:endParaRPr>
+          </a:p>
+          <a:p>
+            <a:pPr indent="-216000" lvl="5" marL="2592000">
               <a:spcBef>
                 <a:spcPts val="283"/>
               </a:spcBef>
@@ -2233,21 +2279,21 @@
                 <a:srgbClr val="000000"/>
               </a:buClr>
               <a:buSzPct val="45000"/>
-              <a:buFont typeface="Wingdings" charset="2"/>
+              <a:buFont charset="2" typeface="Wingdings"/>
               <a:buChar char=""/>
             </a:pPr>
             <a:r>
-              <a:rPr b="0" lang="en-US" sz="2000" spc="-1" strike="noStrike">
+              <a:rPr b="0" lang="en-US" spc="-1" strike="noStrike" sz="2000">
                 <a:latin typeface="Arial"/>
               </a:rPr>
               <a:t>Sixth Outline Level</a:t>
             </a:r>
-            <a:endParaRPr b="0" lang="en-US" sz="2000" spc="-1" strike="noStrike">
-              <a:latin typeface="Arial"/>
-            </a:endParaRPr>
-          </a:p>
-          <a:p>
-            <a:pPr lvl="6" marL="3024000" indent="-216000">
+            <a:endParaRPr b="0" lang="en-US" spc="-1" strike="noStrike" sz="2000">
+              <a:latin typeface="Arial"/>
+            </a:endParaRPr>
+          </a:p>
+          <a:p>
+            <a:pPr indent="-216000" lvl="6" marL="3024000">
               <a:spcBef>
                 <a:spcPts val="283"/>
               </a:spcBef>
@@ -2255,16 +2301,16 @@
                 <a:srgbClr val="000000"/>
               </a:buClr>
               <a:buSzPct val="45000"/>
-              <a:buFont typeface="Wingdings" charset="2"/>
+              <a:buFont charset="2" typeface="Wingdings"/>
               <a:buChar char=""/>
             </a:pPr>
             <a:r>
-              <a:rPr b="0" lang="en-US" sz="2000" spc="-1" strike="noStrike">
+              <a:rPr b="0" lang="en-US" spc="-1" strike="noStrike" sz="2000">
                 <a:latin typeface="Arial"/>
               </a:rPr>
               <a:t>Seventh Outline Level</a:t>
             </a:r>
-            <a:endParaRPr b="0" lang="en-US" sz="2000" spc="-1" strike="noStrike">
+            <a:endParaRPr b="0" lang="en-US" spc="-1" strike="noStrike" sz="2000">
               <a:latin typeface="Arial"/>
             </a:endParaRPr>
           </a:p>
@@ -2272,20 +2318,20 @@
       </p:sp>
     </p:spTree>
   </p:cSld>
-  <p:clrMap bg1="lt1" bg2="lt2" tx1="dk1" tx2="dk2" accent1="accent1" accent2="accent2" accent3="accent3" accent4="accent4" accent5="accent5" accent6="accent6" hlink="hlink" folHlink="folHlink"/>
+  <p:clrMap accent1="accent1" accent2="accent2" accent3="accent3" accent4="accent4" accent5="accent5" accent6="accent6" bg1="lt1" bg2="lt2" folHlink="folHlink" hlink="hlink" tx1="dk1" tx2="dk2"/>
   <p:sldLayoutIdLst>
-    <p:sldLayoutId id="2147483649" r:id="rId2"/>
-    <p:sldLayoutId id="2147483650" r:id="rId3"/>
-    <p:sldLayoutId id="2147483651" r:id="rId4"/>
-    <p:sldLayoutId id="2147483652" r:id="rId5"/>
-    <p:sldLayoutId id="2147483653" r:id="rId6"/>
-    <p:sldLayoutId id="2147483654" r:id="rId7"/>
-    <p:sldLayoutId id="2147483655" r:id="rId8"/>
-    <p:sldLayoutId id="2147483656" r:id="rId9"/>
-    <p:sldLayoutId id="2147483657" r:id="rId10"/>
-    <p:sldLayoutId id="2147483658" r:id="rId11"/>
-    <p:sldLayoutId id="2147483659" r:id="rId12"/>
-    <p:sldLayoutId id="2147483660" r:id="rId13"/>
+    <p:sldLayoutId id="2147483648" r:id="rId2"/>
+    <p:sldLayoutId id="2147483649" r:id="rId3"/>
+    <p:sldLayoutId id="2147483650" r:id="rId4"/>
+    <p:sldLayoutId id="2147483651" r:id="rId5"/>
+    <p:sldLayoutId id="2147483652" r:id="rId6"/>
+    <p:sldLayoutId id="2147483653" r:id="rId7"/>
+    <p:sldLayoutId id="2147483654" r:id="rId8"/>
+    <p:sldLayoutId id="2147483655" r:id="rId9"/>
+    <p:sldLayoutId id="2147483656" r:id="rId10"/>
+    <p:sldLayoutId id="2147483657" r:id="rId11"/>
+    <p:sldLayoutId id="2147483658" r:id="rId12"/>
+    <p:sldLayoutId id="2147483659" r:id="rId13"/>
   </p:sldLayoutIdLst>
 </p:sldMaster>
 </file>
@@ -2333,7 +2379,8 @@
           <a:fontRef idx="minor"/>
         </p:style>
         <p:txBody>
-          <a:bodyPr lIns="0" rIns="0" tIns="0" bIns="0"/>
+          <a:bodyPr bIns="0" lIns="0" numCol="1" rIns="0" tIns="0"/>
+          <a:lstStyle/>
           <a:p>
             <a:pPr algn="ctr">
               <a:lnSpc>
@@ -2341,7 +2388,7 @@
               </a:lnSpc>
             </a:pPr>
             <a:r>
-              <a:rPr b="0" lang="en-US" sz="7200" spc="-1" strike="noStrike">
+              <a:rPr b="0" lang="en-US" spc="-1" strike="noStrike" sz="7200">
                 <a:solidFill>
                   <a:srgbClr val="000000"/>
                 </a:solidFill>
@@ -2350,7 +2397,7 @@
               </a:rPr>
               <a:t>The Lord Stanley Seekers</a:t>
             </a:r>
-            <a:endParaRPr b="0" lang="en-US" sz="7200" spc="-1" strike="noStrike">
+            <a:endParaRPr b="0" lang="en-US" spc="-1" strike="noStrike" sz="7200">
               <a:latin typeface="Arial"/>
             </a:endParaRPr>
           </a:p>
@@ -2361,7 +2408,7 @@
               </a:lnSpc>
             </a:pPr>
             <a:r>
-              <a:rPr b="0" lang="en-US" sz="4000" spc="-1" strike="noStrike">
+              <a:rPr b="0" lang="en-US" spc="-1" strike="noStrike" sz="4000">
                 <a:solidFill>
                   <a:srgbClr val="000000"/>
                 </a:solidFill>
@@ -2370,7 +2417,7 @@
               </a:rPr>
               <a:t>Kevin Crooks, Brian Lim, Arthur May</a:t>
             </a:r>
-            <a:endParaRPr b="0" lang="en-US" sz="4000" spc="-1" strike="noStrike">
+            <a:endParaRPr b="0" lang="en-US" spc="-1" strike="noStrike" sz="4000">
               <a:latin typeface="Arial"/>
             </a:endParaRPr>
           </a:p>
@@ -2381,7 +2428,7 @@
               </a:lnSpc>
             </a:pPr>
             <a:r>
-              <a:rPr b="0" lang="en-US" sz="2800" spc="-1" strike="noStrike">
+              <a:rPr b="0" lang="en-US" spc="-1" strike="noStrike" sz="2800">
                 <a:solidFill>
                   <a:srgbClr val="000000"/>
                 </a:solidFill>
@@ -2390,7 +2437,7 @@
               </a:rPr>
               <a:t>CSCI 5622 – Spring 2020, Professor Quigley</a:t>
             </a:r>
-            <a:endParaRPr b="0" lang="en-US" sz="2800" spc="-1" strike="noStrike">
+            <a:endParaRPr b="0" lang="en-US" spc="-1" strike="noStrike" sz="2800">
               <a:latin typeface="Arial"/>
             </a:endParaRPr>
           </a:p>
@@ -2409,11 +2456,11 @@
           </a:xfrm>
           <a:prstGeom prst="roundRect">
             <a:avLst>
-              <a:gd name="adj" fmla="val 2269"/>
+              <a:gd fmla="val 2269" name="adj"/>
             </a:avLst>
           </a:prstGeom>
           <a:solidFill>
-            <a:srgbClr val="eef7f8"/>
+            <a:srgbClr val="EEF7F8"/>
           </a:solidFill>
           <a:ln w="76320">
             <a:solidFill>
@@ -2429,15 +2476,16 @@
           <a:fontRef idx="minor"/>
         </p:style>
         <p:txBody>
-          <a:bodyPr lIns="0" rIns="137160" tIns="0" bIns="0"/>
-          <a:p>
-            <a:pPr marL="326880" algn="ctr">
+          <a:bodyPr bIns="0" lIns="0" numCol="1" rIns="137160" tIns="0"/>
+          <a:lstStyle/>
+          <a:p>
+            <a:pPr algn="ctr" marL="326880">
               <a:lnSpc>
                 <a:spcPct val="100000"/>
               </a:lnSpc>
             </a:pPr>
             <a:r>
-              <a:rPr b="1" lang="en-US" sz="2900" spc="-1" strike="noStrike">
+              <a:rPr b="1" lang="en-US" spc="-1" strike="noStrike" sz="2900">
                 <a:solidFill>
                   <a:srgbClr val="000000"/>
                 </a:solidFill>
@@ -2446,12 +2494,12 @@
               </a:rPr>
               <a:t>Introduction</a:t>
             </a:r>
-            <a:endParaRPr b="0" lang="en-US" sz="2900" spc="-1" strike="noStrike">
-              <a:latin typeface="Arial"/>
-            </a:endParaRPr>
-          </a:p>
-          <a:p>
-            <a:pPr marL="326880" algn="just">
+            <a:endParaRPr b="0" lang="en-US" spc="-1" strike="noStrike" sz="2900">
+              <a:latin typeface="Arial"/>
+            </a:endParaRPr>
+          </a:p>
+          <a:p>
+            <a:pPr algn="just" marL="326880">
               <a:lnSpc>
                 <a:spcPct val="100000"/>
               </a:lnSpc>
@@ -2460,31 +2508,21 @@
               </a:spcBef>
             </a:pPr>
             <a:r>
-              <a:rPr b="0" lang="en-US" sz="1800" spc="-1" strike="noStrike">
+              <a:rPr b="0" lang="en-US" spc="-1" strike="noStrike" sz="2000">
                 <a:solidFill>
                   <a:srgbClr val="000000"/>
                 </a:solidFill>
                 <a:latin typeface="Arial"/>
                 <a:ea typeface="ＭＳ Ｐゴシック"/>
               </a:rPr>
-              <a:t>	</a:t>
-            </a:r>
-            <a:r>
-              <a:rPr b="0" lang="en-US" sz="2000" spc="-1" strike="noStrike">
-                <a:solidFill>
-                  <a:srgbClr val="000000"/>
-                </a:solidFill>
-                <a:latin typeface="Arial"/>
-                <a:ea typeface="ＭＳ Ｐゴシック"/>
-              </a:rPr>
               <a:t>Most of the existing research in using Machine learning to predict outcomes in hockey games was focused on predicting the win or loss outcome for a given team. Rather than retreaded an old problem space, which would simply amount to wondering if the science has improved in the past few years, or training algorithms have, we decided to look at a new problem: period prediction. An NHL game is divided into 3 periods of twenty minutes each. If the score is still tied after these three regulation periods, a 4th overtime period is played with the current standard being a single 5-minute period. We included these in our analyses as well. Despite the fact that statistics will be different between a full 20-minute period and a shorter 5-minute period, we are looking at predictors for each period individually, so our overall models will not be affected by this bundling.</a:t>
             </a:r>
-            <a:endParaRPr b="0" lang="en-US" sz="2000" spc="-1" strike="noStrike">
-              <a:latin typeface="Arial"/>
-            </a:endParaRPr>
-          </a:p>
-          <a:p>
-            <a:pPr marL="326880" algn="just">
+            <a:endParaRPr b="0" lang="en-US" spc="-1" strike="noStrike" sz="2000">
+              <a:latin typeface="Arial"/>
+            </a:endParaRPr>
+          </a:p>
+          <a:p>
+            <a:pPr algn="just" marL="326880">
               <a:lnSpc>
                 <a:spcPct val="100000"/>
               </a:lnSpc>
@@ -2493,26 +2531,26 @@
               </a:spcBef>
             </a:pPr>
             <a:r>
-              <a:rPr b="0" lang="en-US" sz="2000" spc="-1" strike="noStrike">
+              <a:rPr b="0" lang="en-US" spc="-1" strike="noStrike" sz="2000">
                 <a:solidFill>
                   <a:srgbClr val="000000"/>
                 </a:solidFill>
                 <a:latin typeface="Arial"/>
                 <a:ea typeface="ＭＳ Ｐゴシック"/>
               </a:rPr>
-              <a:t>	</a:t>
-            </a:r>
-            <a:r>
-              <a:rPr b="0" lang="en-US" sz="2000" spc="-1" strike="noStrike">
+              <a:t>T</a:t>
+            </a:r>
+            <a:r>
+              <a:rPr b="0" lang="en-US" spc="-1" strike="noStrike" sz="2000">
                 <a:solidFill>
                   <a:srgbClr val="000000"/>
                 </a:solidFill>
                 <a:latin typeface="Arial"/>
                 <a:ea typeface="ＭＳ Ｐゴシック"/>
               </a:rPr>
-              <a:t>The advantage to such a prediction might be immediately obvious to a coach, although probably not as useful for Vegas. If your team enters the second period trailing by 2, how do you overcome that lead? Our goal is to see if we can find which statistics, taken from the standard metrics used in NHL statkeeping, can be beneficial in predicting the outcome of a period.</a:t>
-            </a:r>
-            <a:endParaRPr b="0" lang="en-US" sz="2000" spc="-1" strike="noStrike">
+              <a:t>he advantage to such a prediction might be immediately obvious to a coach, although probably not as useful for Vegas. If your team enters the second period trailing by 2, how do you overcome that lead? Our goal is to see if we can find which statistics, taken from the standard metrics used in NHL statkeeping, can be beneficial in predicting the outcome of a period.</a:t>
+            </a:r>
+            <a:endParaRPr b="0" lang="en-US" spc="-1" strike="noStrike" sz="2000">
               <a:latin typeface="Arial"/>
             </a:endParaRPr>
           </a:p>
@@ -2531,11 +2569,11 @@
           </a:xfrm>
           <a:prstGeom prst="roundRect">
             <a:avLst>
-              <a:gd name="adj" fmla="val 2269"/>
+              <a:gd fmla="val 2269" name="adj"/>
             </a:avLst>
           </a:prstGeom>
           <a:solidFill>
-            <a:srgbClr val="eef7f8"/>
+            <a:srgbClr val="EEF7F8"/>
           </a:solidFill>
           <a:ln w="76320">
             <a:solidFill>
@@ -2551,15 +2589,16 @@
           <a:fontRef idx="minor"/>
         </p:style>
         <p:txBody>
-          <a:bodyPr lIns="0" rIns="137160" tIns="0" bIns="0"/>
-          <a:p>
-            <a:pPr marL="326880" algn="ctr">
+          <a:bodyPr bIns="0" lIns="0" numCol="1" rIns="137160" tIns="0"/>
+          <a:lstStyle/>
+          <a:p>
+            <a:pPr algn="ctr" marL="326880">
               <a:lnSpc>
                 <a:spcPct val="100000"/>
               </a:lnSpc>
             </a:pPr>
             <a:r>
-              <a:rPr b="1" lang="en-US" sz="2900" spc="-1" strike="noStrike">
+              <a:rPr b="1" lang="en-US" spc="-1" strike="noStrike" sz="2900">
                 <a:solidFill>
                   <a:srgbClr val="000000"/>
                 </a:solidFill>
@@ -2568,12 +2607,12 @@
               </a:rPr>
               <a:t>Results</a:t>
             </a:r>
-            <a:endParaRPr b="0" lang="en-US" sz="2900" spc="-1" strike="noStrike">
-              <a:latin typeface="Arial"/>
-            </a:endParaRPr>
-          </a:p>
-          <a:p>
-            <a:pPr marL="326880" algn="just">
+            <a:endParaRPr b="0" lang="en-US" spc="-1" strike="noStrike" sz="2900">
+              <a:latin typeface="Arial"/>
+            </a:endParaRPr>
+          </a:p>
+          <a:p>
+            <a:pPr algn="just" marL="326880">
               <a:lnSpc>
                 <a:spcPct val="100000"/>
               </a:lnSpc>
@@ -2582,7 +2621,7 @@
               </a:spcBef>
             </a:pPr>
             <a:r>
-              <a:rPr b="0" lang="en-US" sz="2400" spc="-1" strike="noStrike">
+              <a:rPr b="0" lang="en-US" spc="-1" strike="noStrike" sz="2400">
                 <a:solidFill>
                   <a:srgbClr val="000000"/>
                 </a:solidFill>
@@ -2591,7 +2630,7 @@
               </a:rPr>
               <a:t>Our Gradient Boost classifier performed the best of the models that we explored, however, it still did not fully reach our desired prediction accuracy of 60% per period. We were able to achieve accuracies between 35-45% for periods 1 – 3, with the models getting more accurate as the games progressed. Interestingly, the model was capable of predicting the goal differentials of overtime periods with a ~75% accuracy. To achieve these results, the outcomes were binned to fit in {-1,0,1} goal differential, and we used a grid search to optimize the parameters of the model. A forward step-wise feature selection was performed for each period to determine which features were most important in predicting the outcomes of the period. </a:t>
             </a:r>
-            <a:endParaRPr b="0" lang="en-US" sz="2400" spc="-1" strike="noStrike">
+            <a:endParaRPr b="0" lang="en-US" spc="-1" strike="noStrike" sz="2400">
               <a:latin typeface="Arial"/>
             </a:endParaRPr>
           </a:p>
@@ -2610,11 +2649,11 @@
           </a:xfrm>
           <a:prstGeom prst="roundRect">
             <a:avLst>
-              <a:gd name="adj" fmla="val 2269"/>
+              <a:gd fmla="val 2269" name="adj"/>
             </a:avLst>
           </a:prstGeom>
           <a:solidFill>
-            <a:srgbClr val="eef7f8"/>
+            <a:srgbClr val="EEF7F8"/>
           </a:solidFill>
           <a:ln w="76320">
             <a:solidFill>
@@ -2630,15 +2669,16 @@
           <a:fontRef idx="minor"/>
         </p:style>
         <p:txBody>
-          <a:bodyPr lIns="0" rIns="0" tIns="0" bIns="0"/>
-          <a:p>
-            <a:pPr marL="976320" indent="-648360" algn="ctr">
+          <a:bodyPr bIns="0" lIns="0" numCol="1" rIns="0" tIns="0"/>
+          <a:lstStyle/>
+          <a:p>
+            <a:pPr algn="ctr" indent="-648360" marL="976320">
               <a:lnSpc>
                 <a:spcPct val="100000"/>
               </a:lnSpc>
             </a:pPr>
             <a:r>
-              <a:rPr b="1" lang="en-US" sz="2600" spc="-1" strike="noStrike">
+              <a:rPr b="1" lang="en-US" spc="-1" strike="noStrike" sz="2600">
                 <a:solidFill>
                   <a:srgbClr val="000000"/>
                 </a:solidFill>
@@ -2647,12 +2687,12 @@
               </a:rPr>
               <a:t>References</a:t>
             </a:r>
-            <a:endParaRPr b="0" lang="en-US" sz="2600" spc="-1" strike="noStrike">
-              <a:latin typeface="Arial"/>
-            </a:endParaRPr>
-          </a:p>
-          <a:p>
-            <a:pPr marL="976320" indent="-648360">
+            <a:endParaRPr b="0" lang="en-US" spc="-1" strike="noStrike" sz="2600">
+              <a:latin typeface="Arial"/>
+            </a:endParaRPr>
+          </a:p>
+          <a:p>
+            <a:pPr indent="-648360" marL="976320">
               <a:lnSpc>
                 <a:spcPct val="100000"/>
               </a:lnSpc>
@@ -2661,7 +2701,7 @@
               </a:spcBef>
             </a:pPr>
             <a:r>
-              <a:rPr b="0" lang="en-US" sz="1800" spc="-1" strike="noStrike">
+              <a:rPr b="0" lang="en-US" spc="-1" strike="noStrike" sz="1800">
                 <a:solidFill>
                   <a:srgbClr val="000000"/>
                 </a:solidFill>
@@ -2670,12 +2710,12 @@
               </a:rPr>
               <a:t>Weissbock, J., Viktor, H., Inkpen, D.: Use of performance metrics to forecast success in the national hockey league. European Conference on Machine Learning: Sports Analytics and Machine Learning Workshop (2013) http://ceur-ws.org/Vol-1969/paper-06.pdf </a:t>
             </a:r>
-            <a:endParaRPr b="0" lang="en-US" sz="1800" spc="-1" strike="noStrike">
-              <a:latin typeface="Arial"/>
-            </a:endParaRPr>
-          </a:p>
-          <a:p>
-            <a:pPr marL="976320" indent="-648360">
+            <a:endParaRPr b="0" lang="en-US" spc="-1" strike="noStrike" sz="1800">
+              <a:latin typeface="Arial"/>
+            </a:endParaRPr>
+          </a:p>
+          <a:p>
+            <a:pPr indent="-648360" marL="976320">
               <a:lnSpc>
                 <a:spcPct val="100000"/>
               </a:lnSpc>
@@ -2684,7 +2724,7 @@
               </a:spcBef>
             </a:pPr>
             <a:r>
-              <a:rPr b="0" lang="en-US" sz="1800" spc="-1" strike="noStrike">
+              <a:rPr b="0" lang="en-US" spc="-1" strike="noStrike" sz="1800">
                 <a:solidFill>
                   <a:srgbClr val="000000"/>
                 </a:solidFill>
@@ -2693,12 +2733,12 @@
               </a:rPr>
               <a:t>Pischedda, Gianni: Predicting NHL Match Outcomes with ML Models. In: International Journal of Computer Applications (0975 – 8887), Volume 101– No.9, September 2014. (2014) http://citeseerx.ist.psu.edu/viewdoc/download?doi=10.1.1.735.795&amp;rep=rep1&amp;type=pdf</a:t>
             </a:r>
-            <a:endParaRPr b="0" lang="en-US" sz="1800" spc="-1" strike="noStrike">
-              <a:latin typeface="Arial"/>
-            </a:endParaRPr>
-          </a:p>
-          <a:p>
-            <a:pPr marL="976320" indent="-648360">
+            <a:endParaRPr b="0" lang="en-US" spc="-1" strike="noStrike" sz="1800">
+              <a:latin typeface="Arial"/>
+            </a:endParaRPr>
+          </a:p>
+          <a:p>
+            <a:pPr indent="-648360" marL="976320">
               <a:lnSpc>
                 <a:spcPct val="100000"/>
               </a:lnSpc>
@@ -2707,7 +2747,7 @@
               </a:spcBef>
             </a:pPr>
             <a:r>
-              <a:rPr b="0" lang="en-US" sz="1800" spc="-1" strike="noStrike">
+              <a:rPr b="0" lang="en-US" spc="-1" strike="noStrike" sz="1800">
                 <a:solidFill>
                   <a:srgbClr val="000000"/>
                 </a:solidFill>
@@ -2716,12 +2756,12 @@
               </a:rPr>
               <a:t>Weissbock, Josh; Inkpen, Diana: Combining Textual Pre-game Reports and Statistical Data for Predicting Success in the National Hockey League. In:  Advances in Artificial Intelligence 27th Canadian Conference on Artificial Intelligence, Canadian AI 2014, Montréal, QC, Canada, May 6-9, 2014. (2014) </a:t>
             </a:r>
-            <a:endParaRPr b="0" lang="en-US" sz="1800" spc="-1" strike="noStrike">
-              <a:latin typeface="Arial"/>
-            </a:endParaRPr>
-          </a:p>
-          <a:p>
-            <a:pPr marL="976320" indent="-648360">
+            <a:endParaRPr b="0" lang="en-US" spc="-1" strike="noStrike" sz="1800">
+              <a:latin typeface="Arial"/>
+            </a:endParaRPr>
+          </a:p>
+          <a:p>
+            <a:pPr indent="-648360" marL="976320">
               <a:lnSpc>
                 <a:spcPct val="100000"/>
               </a:lnSpc>
@@ -2729,7 +2769,7 @@
                 <a:spcPts val="862"/>
               </a:spcBef>
             </a:pPr>
-            <a:endParaRPr b="0" lang="en-US" sz="1800" spc="-1" strike="noStrike">
+            <a:endParaRPr b="0" lang="en-US" spc="-1" strike="noStrike" sz="1800">
               <a:latin typeface="Arial"/>
             </a:endParaRPr>
           </a:p>
@@ -2737,53 +2777,7 @@
       </p:sp>
       <p:pic>
         <p:nvPicPr>
-          <p:cNvPr id="48" name="Picture 1" descr=""/>
-          <p:cNvPicPr/>
-          <p:nvPr/>
-        </p:nvPicPr>
-        <p:blipFill>
-          <a:blip r:embed="rId1"/>
-          <a:stretch/>
-        </p:blipFill>
-        <p:spPr>
-          <a:xfrm>
-            <a:off x="2971800" y="507960"/>
-            <a:ext cx="4799520" cy="2462760"/>
-          </a:xfrm>
-          <a:prstGeom prst="rect">
-            <a:avLst/>
-          </a:prstGeom>
-          <a:ln>
-            <a:noFill/>
-          </a:ln>
-        </p:spPr>
-      </p:pic>
-      <p:pic>
-        <p:nvPicPr>
-          <p:cNvPr id="49" name="Picture 2" descr=""/>
-          <p:cNvPicPr/>
-          <p:nvPr/>
-        </p:nvPicPr>
-        <p:blipFill>
-          <a:blip r:embed="rId2"/>
-          <a:stretch/>
-        </p:blipFill>
-        <p:spPr>
-          <a:xfrm>
-            <a:off x="25526880" y="457200"/>
-            <a:ext cx="3961440" cy="2970720"/>
-          </a:xfrm>
-          <a:prstGeom prst="rect">
-            <a:avLst/>
-          </a:prstGeom>
-          <a:ln>
-            <a:noFill/>
-          </a:ln>
-        </p:spPr>
-      </p:pic>
-      <p:pic>
-        <p:nvPicPr>
-          <p:cNvPr id="50" name="" descr=""/>
+          <p:cNvPr id="48" name="Picture 1"/>
           <p:cNvPicPr/>
           <p:nvPr/>
         </p:nvPicPr>
@@ -2793,8 +2787,8 @@
         </p:blipFill>
         <p:spPr>
           <a:xfrm>
-            <a:off x="17280360" y="16301520"/>
-            <a:ext cx="4374000" cy="4388760"/>
+            <a:off x="2971800" y="507960"/>
+            <a:ext cx="4799520" cy="2462760"/>
           </a:xfrm>
           <a:prstGeom prst="rect">
             <a:avLst/>
@@ -2804,35 +2798,9 @@
           </a:ln>
         </p:spPr>
       </p:pic>
-      <p:sp>
-        <p:nvSpPr>
-          <p:cNvPr id="51" name="CustomShape 5"/>
-          <p:cNvSpPr/>
-          <p:nvPr/>
-        </p:nvSpPr>
-        <p:spPr>
-          <a:xfrm>
-            <a:off x="18786600" y="15145200"/>
-            <a:ext cx="180360" cy="232200"/>
-          </a:xfrm>
-          <a:prstGeom prst="rect">
-            <a:avLst/>
-          </a:prstGeom>
-          <a:noFill/>
-          <a:ln>
-            <a:noFill/>
-          </a:ln>
-        </p:spPr>
-        <p:style>
-          <a:lnRef idx="0"/>
-          <a:fillRef idx="0"/>
-          <a:effectRef idx="0"/>
-          <a:fontRef idx="minor"/>
-        </p:style>
-      </p:sp>
       <p:pic>
         <p:nvPicPr>
-          <p:cNvPr id="52" name="" descr=""/>
+          <p:cNvPr id="49" name="Picture 2"/>
           <p:cNvPicPr/>
           <p:nvPr/>
         </p:nvPicPr>
@@ -2842,8 +2810,8 @@
         </p:blipFill>
         <p:spPr>
           <a:xfrm>
-            <a:off x="10623960" y="10577520"/>
-            <a:ext cx="6217200" cy="4662720"/>
+            <a:off x="25526880" y="457200"/>
+            <a:ext cx="3961440" cy="2970720"/>
           </a:xfrm>
           <a:prstGeom prst="rect">
             <a:avLst/>
@@ -2855,7 +2823,7 @@
       </p:pic>
       <p:pic>
         <p:nvPicPr>
-          <p:cNvPr id="53" name="" descr=""/>
+          <p:cNvPr id="50" name=""/>
           <p:cNvPicPr/>
           <p:nvPr/>
         </p:nvPicPr>
@@ -2865,8 +2833,8 @@
         </p:blipFill>
         <p:spPr>
           <a:xfrm>
-            <a:off x="16315200" y="10581480"/>
-            <a:ext cx="6217560" cy="4663080"/>
+            <a:off x="17280360" y="16301520"/>
+            <a:ext cx="4374000" cy="4388760"/>
           </a:xfrm>
           <a:prstGeom prst="rect">
             <a:avLst/>
@@ -2878,6 +2846,78 @@
       </p:pic>
       <p:sp>
         <p:nvSpPr>
+          <p:cNvPr id="51" name="CustomShape 5"/>
+          <p:cNvSpPr/>
+          <p:nvPr/>
+        </p:nvSpPr>
+        <p:spPr>
+          <a:xfrm>
+            <a:off x="18786600" y="15145200"/>
+            <a:ext cx="180360" cy="232200"/>
+          </a:xfrm>
+          <a:prstGeom prst="rect">
+            <a:avLst/>
+          </a:prstGeom>
+          <a:noFill/>
+          <a:ln>
+            <a:noFill/>
+          </a:ln>
+        </p:spPr>
+        <p:style>
+          <a:lnRef idx="0"/>
+          <a:fillRef idx="0"/>
+          <a:effectRef idx="0"/>
+          <a:fontRef idx="minor"/>
+        </p:style>
+      </p:sp>
+      <p:pic>
+        <p:nvPicPr>
+          <p:cNvPr id="52" name=""/>
+          <p:cNvPicPr/>
+          <p:nvPr/>
+        </p:nvPicPr>
+        <p:blipFill>
+          <a:blip r:embed="rId6"/>
+          <a:stretch/>
+        </p:blipFill>
+        <p:spPr>
+          <a:xfrm>
+            <a:off x="10623960" y="10577520"/>
+            <a:ext cx="6217200" cy="4662720"/>
+          </a:xfrm>
+          <a:prstGeom prst="rect">
+            <a:avLst/>
+          </a:prstGeom>
+          <a:ln>
+            <a:noFill/>
+          </a:ln>
+        </p:spPr>
+      </p:pic>
+      <p:pic>
+        <p:nvPicPr>
+          <p:cNvPr id="53" name=""/>
+          <p:cNvPicPr/>
+          <p:nvPr/>
+        </p:nvPicPr>
+        <p:blipFill>
+          <a:blip r:embed="rId7"/>
+          <a:stretch/>
+        </p:blipFill>
+        <p:spPr>
+          <a:xfrm>
+            <a:off x="16315200" y="10581480"/>
+            <a:ext cx="6217560" cy="4663080"/>
+          </a:xfrm>
+          <a:prstGeom prst="rect">
+            <a:avLst/>
+          </a:prstGeom>
+          <a:ln>
+            <a:noFill/>
+          </a:ln>
+        </p:spPr>
+      </p:pic>
+      <p:sp>
+        <p:nvSpPr>
           <p:cNvPr id="54" name="CustomShape 6"/>
           <p:cNvSpPr/>
           <p:nvPr/>
@@ -2889,11 +2929,11 @@
           </a:xfrm>
           <a:prstGeom prst="roundRect">
             <a:avLst>
-              <a:gd name="adj" fmla="val 2269"/>
+              <a:gd fmla="val 2269" name="adj"/>
             </a:avLst>
           </a:prstGeom>
           <a:solidFill>
-            <a:srgbClr val="eef7f8"/>
+            <a:srgbClr val="EEF7F8"/>
           </a:solidFill>
           <a:ln w="76320">
             <a:solidFill>
@@ -2909,15 +2949,16 @@
           <a:fontRef idx="minor"/>
         </p:style>
         <p:txBody>
-          <a:bodyPr lIns="0" rIns="137160" tIns="0" bIns="0"/>
-          <a:p>
-            <a:pPr marL="326880" algn="ctr">
+          <a:bodyPr bIns="0" lIns="0" numCol="1" rIns="137160" tIns="0"/>
+          <a:lstStyle/>
+          <a:p>
+            <a:pPr algn="ctr" marL="326880">
               <a:lnSpc>
                 <a:spcPct val="100000"/>
               </a:lnSpc>
             </a:pPr>
             <a:r>
-              <a:rPr b="1" lang="en-US" sz="2900" spc="-1" strike="noStrike">
+              <a:rPr b="1" lang="en-US" spc="-1" strike="noStrike" sz="2900">
                 <a:solidFill>
                   <a:srgbClr val="000000"/>
                 </a:solidFill>
@@ -2926,12 +2967,12 @@
               </a:rPr>
               <a:t>Discussion</a:t>
             </a:r>
-            <a:endParaRPr b="0" lang="en-US" sz="2900" spc="-1" strike="noStrike">
-              <a:latin typeface="Arial"/>
-            </a:endParaRPr>
-          </a:p>
-          <a:p>
-            <a:pPr marL="326880" algn="just">
+            <a:endParaRPr b="0" lang="en-US" spc="-1" strike="noStrike" sz="2900">
+              <a:latin typeface="Arial"/>
+            </a:endParaRPr>
+          </a:p>
+          <a:p>
+            <a:pPr algn="just" marL="326880">
               <a:lnSpc>
                 <a:spcPct val="100000"/>
               </a:lnSpc>
@@ -2940,7 +2981,7 @@
               </a:spcBef>
             </a:pPr>
             <a:r>
-              <a:rPr b="0" lang="en-US" sz="2400" spc="-1" strike="noStrike">
+              <a:rPr b="0" lang="en-US" spc="-1" strike="noStrike" sz="2400">
                 <a:solidFill>
                   <a:srgbClr val="000000"/>
                 </a:solidFill>
@@ -2950,7 +2991,7 @@
               <a:t>	</a:t>
             </a:r>
             <a:r>
-              <a:rPr b="0" lang="en-US" sz="2400" spc="-1" strike="noStrike">
+              <a:rPr b="0" lang="en-US" spc="-1" strike="noStrike" sz="2400">
                 <a:solidFill>
                   <a:srgbClr val="000000"/>
                 </a:solidFill>
@@ -2959,7 +3000,7 @@
               </a:rPr>
               <a:t>The ability to predict the outcome for overtime is considered a significant contribution. While predicting the goal differential for each period was perhaps to difficult for the scope of this research effort, there are a number of reasons why the overtime period was as accurate as it was. First, there less classes of goal differential with a sudden death overtime format. When analyzing the features that were used in the models it was interesting to see how some features changed, while others were important across all the periods. For example, penalty differential was important in all the periods, while the number of hits was most important in the first and overtime periods, or the blocked shot differential only proved important in the third period. In terms of predicting goal differential, we may have had better results if we attempted to calculate a goal differential and allowed non-integer values to be a result, and while goals are only counted in integers, a fractional goal differential extrapolated over an entire season could have a significant impact on a teams placement in the standings.</a:t>
             </a:r>
-            <a:endParaRPr b="0" lang="en-US" sz="2400" spc="-1" strike="noStrike">
+            <a:endParaRPr b="0" lang="en-US" spc="-1" strike="noStrike" sz="2400">
               <a:latin typeface="Arial"/>
             </a:endParaRPr>
           </a:p>
@@ -2978,11 +3019,11 @@
           </a:xfrm>
           <a:prstGeom prst="roundRect">
             <a:avLst>
-              <a:gd name="adj" fmla="val 2269"/>
+              <a:gd fmla="val 2269" name="adj"/>
             </a:avLst>
           </a:prstGeom>
           <a:solidFill>
-            <a:srgbClr val="eef7f8"/>
+            <a:srgbClr val="EEF7F8"/>
           </a:solidFill>
           <a:ln w="76320">
             <a:solidFill>
@@ -2998,15 +3039,16 @@
           <a:fontRef idx="minor"/>
         </p:style>
         <p:txBody>
-          <a:bodyPr lIns="0" rIns="137160" tIns="0" bIns="0"/>
-          <a:p>
-            <a:pPr marL="326880" algn="ctr">
+          <a:bodyPr bIns="0" lIns="0" numCol="1" rIns="137160" tIns="0"/>
+          <a:lstStyle/>
+          <a:p>
+            <a:pPr algn="ctr" marL="326880">
               <a:lnSpc>
                 <a:spcPct val="100000"/>
               </a:lnSpc>
             </a:pPr>
             <a:r>
-              <a:rPr b="1" lang="en-US" sz="2900" spc="-1" strike="noStrike">
+              <a:rPr b="1" lang="en-US" spc="-1" strike="noStrike" sz="2900">
                 <a:solidFill>
                   <a:srgbClr val="000000"/>
                 </a:solidFill>
@@ -3015,12 +3057,12 @@
               </a:rPr>
               <a:t>Methods</a:t>
             </a:r>
-            <a:endParaRPr b="0" lang="en-US" sz="2900" spc="-1" strike="noStrike">
-              <a:latin typeface="Arial"/>
-            </a:endParaRPr>
-          </a:p>
-          <a:p>
-            <a:pPr marL="326880" algn="just">
+            <a:endParaRPr b="0" lang="en-US" spc="-1" strike="noStrike" sz="2900">
+              <a:latin typeface="Arial"/>
+            </a:endParaRPr>
+          </a:p>
+          <a:p>
+            <a:pPr algn="just" marL="326880">
               <a:lnSpc>
                 <a:spcPct val="100000"/>
               </a:lnSpc>
@@ -3029,26 +3071,16 @@
               </a:spcBef>
             </a:pPr>
             <a:r>
-              <a:rPr b="0" lang="en-US" sz="2800" spc="-1" strike="noStrike">
+              <a:rPr b="0" lang="en-US" spc="-1" strike="noStrike" sz="2400">
                 <a:solidFill>
                   <a:srgbClr val="000000"/>
                 </a:solidFill>
                 <a:latin typeface="Arial"/>
                 <a:ea typeface="ＭＳ Ｐゴシック"/>
               </a:rPr>
-              <a:t>	</a:t>
-            </a:r>
-            <a:r>
-              <a:rPr b="0" lang="en-US" sz="2400" spc="-1" strike="noStrike">
-                <a:solidFill>
-                  <a:srgbClr val="000000"/>
-                </a:solidFill>
-                <a:latin typeface="Arial"/>
-                <a:ea typeface="ＭＳ Ｐゴシック"/>
-              </a:rPr>
               <a:t>Our approach to address the problem iterated through three steps over multiple phases. The first step was to prepare the data. Once the data was prepared, we performed a number of visualizations around the data to get an understanding of relationships between features and the end of period goal differential. Once we had an understanding of the relationships between the features, we ran them through different machine learning classifiers based on the results we were seeking. We did not seek a binary prediction, but a goal differential which is a bit more challenging. Furthermore, as we settled on our models we experimented with different normalization approaches and ran a grid search on our classifier to help fine tune the results. Several classifiers will be tested including a gradient boost, random forest, and KNN. The gradient boosting classifier performed the best, and we used that to perform the search for which features were the most important. When our results were output we output confusion matrices to help us interpret how our model was performing relative to the other potential outcomes of the model. We performed forward stepwise selection to determine the best subset of features to be used to predict the outcomes of each period, and used the best subset per period to train and predict the models for the individual periods.</a:t>
             </a:r>
-            <a:endParaRPr b="0" lang="en-US" sz="2400" spc="-1" strike="noStrike">
+            <a:endParaRPr b="0" lang="en-US" spc="-1" strike="noStrike" sz="2400">
               <a:latin typeface="Arial"/>
             </a:endParaRPr>
           </a:p>
@@ -3070,12 +3102,12 @@
         </p:grpSpPr>
         <p:pic>
           <p:nvPicPr>
-            <p:cNvPr id="57" name="" descr=""/>
+            <p:cNvPr id="57" name=""/>
             <p:cNvPicPr/>
             <p:nvPr/>
           </p:nvPicPr>
           <p:blipFill>
-            <a:blip r:embed="rId6"/>
+            <a:blip r:embed="rId8"/>
             <a:stretch/>
           </p:blipFill>
           <p:spPr>
@@ -3111,15 +3143,16 @@
             </a:ln>
           </p:spPr>
           <p:txBody>
-            <a:bodyPr lIns="90000" rIns="90000" tIns="45000" bIns="45000"/>
+            <a:bodyPr bIns="45000" lIns="90000" numCol="1" rIns="90000" tIns="45000"/>
+            <a:lstStyle/>
             <a:p>
               <a:r>
-                <a:rPr b="1" lang="en-US" sz="1800" spc="-1" strike="noStrike">
+                <a:rPr b="1" lang="en-US" spc="-1" strike="noStrike" sz="1800">
                   <a:latin typeface="Arial"/>
                 </a:rPr>
                 <a:t>Overtime Period Confusion Matrix</a:t>
               </a:r>
-              <a:endParaRPr b="0" lang="en-US" sz="1800" spc="-1" strike="noStrike">
+              <a:endParaRPr b="0" lang="en-US" spc="-1" strike="noStrike" sz="1800">
                 <a:latin typeface="Arial"/>
               </a:endParaRPr>
             </a:p>
@@ -3139,11 +3172,11 @@
           </a:xfrm>
           <a:prstGeom prst="roundRect">
             <a:avLst>
-              <a:gd name="adj" fmla="val 2269"/>
+              <a:gd fmla="val 2269" name="adj"/>
             </a:avLst>
           </a:prstGeom>
           <a:solidFill>
-            <a:srgbClr val="eef7f8"/>
+            <a:srgbClr val="EEF7F8"/>
           </a:solidFill>
           <a:ln w="76320">
             <a:solidFill>
@@ -3159,9 +3192,10 @@
           <a:fontRef idx="minor"/>
         </p:style>
         <p:txBody>
-          <a:bodyPr lIns="137160" rIns="137160" tIns="0" bIns="0"/>
-          <a:p>
-            <a:pPr marL="976320" indent="-648360" algn="ctr">
+          <a:bodyPr bIns="0" lIns="137160" numCol="1" rIns="137160" tIns="0"/>
+          <a:lstStyle/>
+          <a:p>
+            <a:pPr algn="ctr" indent="-648360" marL="976320">
               <a:lnSpc>
                 <a:spcPct val="100000"/>
               </a:lnSpc>
@@ -3170,7 +3204,7 @@
               </a:spcBef>
             </a:pPr>
             <a:r>
-              <a:rPr b="1" lang="en-US" sz="2600" spc="-1" strike="noStrike">
+              <a:rPr b="1" lang="en-US" spc="-1" strike="noStrike" sz="2600">
                 <a:solidFill>
                   <a:srgbClr val="000000"/>
                 </a:solidFill>
@@ -3179,121 +3213,121 @@
               </a:rPr>
               <a:t>Data</a:t>
             </a:r>
-            <a:endParaRPr b="0" lang="en-US" sz="2600" spc="-1" strike="noStrike">
+            <a:endParaRPr b="0" lang="en-US" spc="-1" strike="noStrike" sz="2600">
               <a:latin typeface="Arial"/>
             </a:endParaRPr>
           </a:p>
           <a:p>
             <a:pPr algn="just"/>
             <a:r>
-              <a:rPr b="0" lang="en-US" sz="2200" spc="-1" strike="noStrike">
+              <a:rPr b="0" lang="en-US" spc="-1" strike="noStrike" sz="2200">
                 <a:latin typeface="Arial"/>
               </a:rPr>
               <a:t>The data for this work was obtained from Kaggle, </a:t>
             </a:r>
             <a:r>
-              <a:rPr b="0" lang="en-US" sz="2200" spc="-1" strike="noStrike">
+              <a:rPr b="0" lang="en-US" spc="-1" strike="noStrike" sz="2200">
                 <a:latin typeface="Arial"/>
               </a:rPr>
               <a:t>comprised of 3.6 million plays over 11,400 </a:t>
             </a:r>
             <a:r>
-              <a:rPr b="0" lang="en-US" sz="2200" spc="-1" strike="noStrike">
+              <a:rPr b="0" lang="en-US" spc="-1" strike="noStrike" sz="2200">
                 <a:latin typeface="Arial"/>
               </a:rPr>
               <a:t>games over the course of 3 full seasons. The </a:t>
             </a:r>
             <a:r>
-              <a:rPr b="0" lang="en-US" sz="2200" spc="-1" strike="noStrike">
+              <a:rPr b="0" lang="en-US" spc="-1" strike="noStrike" sz="2200">
                 <a:latin typeface="Arial"/>
               </a:rPr>
               <a:t>plays including the standard stats recorded by </a:t>
             </a:r>
             <a:r>
-              <a:rPr b="0" lang="en-US" sz="2200" spc="-1" strike="noStrike">
+              <a:rPr b="0" lang="en-US" spc="-1" strike="noStrike" sz="2200">
                 <a:latin typeface="Arial"/>
               </a:rPr>
               <a:t>the NHL goals, penalties, shots on goal, blocked </a:t>
             </a:r>
             <a:r>
-              <a:rPr b="0" lang="en-US" sz="2200" spc="-1" strike="noStrike">
+              <a:rPr b="0" lang="en-US" spc="-1" strike="noStrike" sz="2200">
                 <a:latin typeface="Arial"/>
               </a:rPr>
               <a:t>shot, hits, faceoffs, takeaways, giveaways, and </a:t>
             </a:r>
             <a:r>
-              <a:rPr b="0" lang="en-US" sz="2200" spc="-1" strike="noStrike">
+              <a:rPr b="0" lang="en-US" spc="-1" strike="noStrike" sz="2200">
                 <a:latin typeface="Arial"/>
               </a:rPr>
               <a:t>missed shots. This data was synchronized with </a:t>
             </a:r>
             <a:r>
-              <a:rPr b="0" lang="en-US" sz="2200" spc="-1" strike="noStrike">
+              <a:rPr b="0" lang="en-US" spc="-1" strike="noStrike" sz="2200">
                 <a:latin typeface="Arial"/>
               </a:rPr>
               <a:t>8.9 million shifts for the same games (a shift is </a:t>
             </a:r>
             <a:r>
-              <a:rPr b="0" lang="en-US" sz="2200" spc="-1" strike="noStrike">
+              <a:rPr b="0" lang="en-US" spc="-1" strike="noStrike" sz="2200">
                 <a:latin typeface="Arial"/>
               </a:rPr>
               <a:t>defined as a consecutive time on ice for a player, </a:t>
             </a:r>
             <a:r>
-              <a:rPr b="0" lang="en-US" sz="2200" spc="-1" strike="noStrike">
+              <a:rPr b="0" lang="en-US" spc="-1" strike="noStrike" sz="2200">
                 <a:latin typeface="Arial"/>
               </a:rPr>
               <a:t>typically 20-40 seconds, and a player might have </a:t>
             </a:r>
             <a:r>
-              <a:rPr b="0" lang="en-US" sz="2200" spc="-1" strike="noStrike">
+              <a:rPr b="0" lang="en-US" spc="-1" strike="noStrike" sz="2200">
                 <a:latin typeface="Arial"/>
               </a:rPr>
               <a:t>40 shifts over the course of a single game). This </a:t>
             </a:r>
             <a:r>
-              <a:rPr b="0" lang="en-US" sz="2200" spc="-1" strike="noStrike">
+              <a:rPr b="0" lang="en-US" spc="-1" strike="noStrike" sz="2200">
                 <a:latin typeface="Arial"/>
               </a:rPr>
               <a:t>data was then split by home and away, the </a:t>
             </a:r>
             <a:r>
-              <a:rPr b="0" lang="en-US" sz="2200" spc="-1" strike="noStrike">
+              <a:rPr b="0" lang="en-US" spc="-1" strike="noStrike" sz="2200">
                 <a:latin typeface="Arial"/>
               </a:rPr>
               <a:t>artificial split we used as the easiest way to </a:t>
             </a:r>
             <a:r>
-              <a:rPr b="0" lang="en-US" sz="2200" spc="-1" strike="noStrike">
+              <a:rPr b="0" lang="en-US" spc="-1" strike="noStrike" sz="2200">
                 <a:latin typeface="Arial"/>
               </a:rPr>
               <a:t>differentiate teams. This resulted in a feature set </a:t>
             </a:r>
             <a:r>
-              <a:rPr b="0" lang="en-US" sz="2200" spc="-1" strike="noStrike">
+              <a:rPr b="0" lang="en-US" spc="-1" strike="noStrike" sz="2200">
                 <a:latin typeface="Arial"/>
               </a:rPr>
               <a:t>made up of 37,589 periods for which we had </a:t>
             </a:r>
             <a:r>
-              <a:rPr b="0" lang="en-US" sz="2200" spc="-1" strike="noStrike">
+              <a:rPr b="0" lang="en-US" spc="-1" strike="noStrike" sz="2200">
                 <a:latin typeface="Arial"/>
               </a:rPr>
               <a:t>valid statistics and 19 statistical measurements, </a:t>
             </a:r>
             <a:r>
-              <a:rPr b="0" lang="en-US" sz="2200" spc="-1" strike="noStrike">
+              <a:rPr b="0" lang="en-US" spc="-1" strike="noStrike" sz="2200">
                 <a:latin typeface="Arial"/>
               </a:rPr>
               <a:t>originally given as raw counts that were </a:t>
             </a:r>
             <a:r>
-              <a:rPr b="0" lang="en-US" sz="2200" spc="-1" strike="noStrike">
+              <a:rPr b="0" lang="en-US" spc="-1" strike="noStrike" sz="2200">
                 <a:latin typeface="Arial"/>
               </a:rPr>
               <a:t>normalized and scaled.</a:t>
             </a:r>
-            <a:endParaRPr b="0" lang="en-US" sz="2200" spc="-1" strike="noStrike">
+            <a:endParaRPr b="0" lang="en-US" spc="-1" strike="noStrike" sz="2200">
               <a:latin typeface="Arial"/>
             </a:endParaRPr>
           </a:p>
@@ -3393,12 +3427,12 @@
         </p:sp>
         <p:pic>
           <p:nvPicPr>
-            <p:cNvPr id="64" name="" descr=""/>
+            <p:cNvPr id="64" name=""/>
             <p:cNvPicPr/>
             <p:nvPr/>
           </p:nvPicPr>
           <p:blipFill>
-            <a:blip r:embed="rId7"/>
+            <a:blip r:embed="rId9"/>
             <a:stretch/>
           </p:blipFill>
           <p:spPr>
@@ -3434,21 +3468,22 @@
             </a:ln>
           </p:spPr>
           <p:txBody>
-            <a:bodyPr lIns="90000" rIns="90000" tIns="45000" bIns="45000"/>
+            <a:bodyPr bIns="45000" lIns="90000" numCol="1" rIns="90000" tIns="45000"/>
+            <a:lstStyle/>
             <a:p>
               <a:r>
-                <a:rPr b="1" lang="en-US" sz="2000" spc="-1" strike="noStrike">
+                <a:rPr b="1" lang="en-US" spc="-1" strike="noStrike" sz="2000">
                   <a:latin typeface="Arial"/>
                 </a:rPr>
                 <a:t>Fig 1.</a:t>
               </a:r>
               <a:r>
-                <a:rPr b="0" lang="en-US" sz="2000" spc="-1" strike="noStrike">
+                <a:rPr b="0" lang="en-US" spc="-1" strike="noStrike" sz="2000">
                   <a:latin typeface="Arial"/>
                 </a:rPr>
                 <a:t> A violin plot of the difference between home and away attributes vs. the outcome.</a:t>
               </a:r>
-              <a:endParaRPr b="1" lang="en-US" sz="2000" spc="-1" strike="noStrike">
+              <a:endParaRPr b="1" lang="en-US" spc="-1" strike="noStrike" sz="2000">
                 <a:latin typeface="Arial"/>
               </a:endParaRPr>
             </a:p>
@@ -3475,21 +3510,22 @@
           </a:ln>
         </p:spPr>
         <p:txBody>
-          <a:bodyPr lIns="90000" rIns="90000" tIns="45000" bIns="45000"/>
-          <a:p>
-            <a:r>
-              <a:rPr b="1" lang="en-US" sz="1800" spc="-1" strike="noStrike">
+          <a:bodyPr bIns="45000" lIns="90000" numCol="1" rIns="90000" tIns="45000"/>
+          <a:lstStyle/>
+          <a:p>
+            <a:r>
+              <a:rPr b="1" lang="en-US" spc="-1" strike="noStrike" sz="1800">
                 <a:latin typeface="Arial"/>
               </a:rPr>
               <a:t>Fig 2.</a:t>
             </a:r>
             <a:r>
-              <a:rPr b="0" lang="en-US" sz="1800" spc="-1" strike="noStrike">
+              <a:rPr b="0" lang="en-US" spc="-1" strike="noStrike" sz="1800">
                 <a:latin typeface="Arial"/>
               </a:rPr>
               <a:t> A density plot of away penalties to goal differential</a:t>
             </a:r>
-            <a:endParaRPr b="1" lang="en-US" sz="1800" spc="-1" strike="noStrike">
+            <a:endParaRPr b="1" lang="en-US" spc="-1" strike="noStrike" sz="1800">
               <a:latin typeface="Arial"/>
             </a:endParaRPr>
           </a:p>
@@ -3515,21 +3551,22 @@
           </a:ln>
         </p:spPr>
         <p:txBody>
-          <a:bodyPr lIns="90000" rIns="90000" tIns="45000" bIns="45000"/>
-          <a:p>
-            <a:r>
-              <a:rPr b="1" lang="en-US" sz="1800" spc="-1" strike="noStrike">
+          <a:bodyPr bIns="45000" lIns="90000" numCol="1" rIns="90000" tIns="45000"/>
+          <a:lstStyle/>
+          <a:p>
+            <a:r>
+              <a:rPr b="1" lang="en-US" spc="-1" strike="noStrike" sz="1800">
                 <a:latin typeface="Arial"/>
               </a:rPr>
               <a:t>Fig 3.</a:t>
             </a:r>
             <a:r>
-              <a:rPr b="0" lang="en-US" sz="1800" spc="-1" strike="noStrike">
+              <a:rPr b="0" lang="en-US" spc="-1" strike="noStrike" sz="1800">
                 <a:latin typeface="Arial"/>
               </a:rPr>
               <a:t> A density plot of home penalties to goal differential</a:t>
             </a:r>
-            <a:endParaRPr b="1" lang="en-US" sz="1800" spc="-1" strike="noStrike">
+            <a:endParaRPr b="1" lang="en-US" spc="-1" strike="noStrike" sz="1800">
               <a:latin typeface="Arial"/>
             </a:endParaRPr>
           </a:p>
@@ -3555,21 +3592,22 @@
           </a:ln>
         </p:spPr>
         <p:txBody>
-          <a:bodyPr lIns="90000" rIns="90000" tIns="45000" bIns="45000"/>
-          <a:p>
-            <a:r>
-              <a:rPr b="1" lang="en-US" sz="1800" spc="-1" strike="noStrike">
+          <a:bodyPr bIns="45000" lIns="90000" numCol="1" rIns="90000" tIns="45000"/>
+          <a:lstStyle/>
+          <a:p>
+            <a:r>
+              <a:rPr b="1" lang="en-US" spc="-1" strike="noStrike" sz="1800">
                 <a:latin typeface="Arial"/>
               </a:rPr>
               <a:t>Fig 4.</a:t>
             </a:r>
             <a:r>
-              <a:rPr b="0" lang="en-US" sz="1800" spc="-1" strike="noStrike">
+              <a:rPr b="0" lang="en-US" spc="-1" strike="noStrike" sz="1800">
                 <a:latin typeface="Arial"/>
               </a:rPr>
               <a:t> A confustion matrix of the goal differential predicted for overtime periods. The model had a 75% accuracy for predicting goal differential.</a:t>
             </a:r>
-            <a:endParaRPr b="1" lang="en-US" sz="1800" spc="-1" strike="noStrike">
+            <a:endParaRPr b="1" lang="en-US" spc="-1" strike="noStrike" sz="1800">
               <a:latin typeface="Arial"/>
             </a:endParaRPr>
           </a:p>
@@ -3595,21 +3633,22 @@
           </a:ln>
         </p:spPr>
         <p:txBody>
-          <a:bodyPr lIns="90000" rIns="90000" tIns="45000" bIns="45000"/>
-          <a:p>
-            <a:r>
-              <a:rPr b="1" lang="en-US" sz="1800" spc="-1" strike="noStrike">
+          <a:bodyPr bIns="45000" lIns="90000" numCol="1" rIns="90000" tIns="45000"/>
+          <a:lstStyle/>
+          <a:p>
+            <a:r>
+              <a:rPr b="1" lang="en-US" spc="-1" strike="noStrike" sz="1800">
                 <a:latin typeface="Arial"/>
               </a:rPr>
               <a:t>Fig 5. </a:t>
             </a:r>
             <a:r>
-              <a:rPr b="0" lang="en-US" sz="1800" spc="-1" strike="noStrike">
+              <a:rPr b="0" lang="en-US" spc="-1" strike="noStrike" sz="1800">
                 <a:latin typeface="Arial"/>
               </a:rPr>
               <a:t>A joint plot of the penalty differential and goal differential for a period.</a:t>
             </a:r>
-            <a:endParaRPr b="1" lang="en-US" sz="1800" spc="-1" strike="noStrike">
+            <a:endParaRPr b="1" lang="en-US" spc="-1" strike="noStrike" sz="1800">
               <a:latin typeface="Arial"/>
             </a:endParaRPr>
           </a:p>
@@ -3620,10 +3659,10 @@
   <p:timing>
     <p:tnLst>
       <p:par>
-        <p:cTn id="1" dur="indefinite" restart="never" nodeType="tmRoot">
+        <p:cTn dur="indefinite" id="1" nodeType="tmRoot" restart="never">
           <p:childTnLst>
             <p:seq>
-              <p:cTn id="2" dur="indefinite" nodeType="mainSeq"/>
+              <p:cTn dur="indefinite" id="2" nodeType="mainSeq"/>
               <p:prevCondLst>
                 <p:cond delay="0" evt="onPrev">
                   <p:tgtEl>
@@ -3652,37 +3691,37 @@
   <a:themeElements>
     <a:clrScheme name="Office">
       <a:dk1>
-        <a:sysClr val="windowText" lastClr="000000"/>
+        <a:sysClr lastClr="000000" val="windowText"/>
       </a:dk1>
       <a:lt1>
-        <a:sysClr val="window" lastClr="FFFFFF"/>
+        <a:sysClr lastClr="FFFFFF" val="window"/>
       </a:lt1>
       <a:dk2>
-        <a:srgbClr val="1f497d"/>
+        <a:srgbClr val="1F497D"/>
       </a:dk2>
       <a:lt2>
-        <a:srgbClr val="eeece1"/>
+        <a:srgbClr val="EEECE1"/>
       </a:lt2>
       <a:accent1>
-        <a:srgbClr val="4f81bd"/>
+        <a:srgbClr val="4F81BD"/>
       </a:accent1>
       <a:accent2>
-        <a:srgbClr val="c0504d"/>
+        <a:srgbClr val="C0504D"/>
       </a:accent2>
       <a:accent3>
-        <a:srgbClr val="9bbb59"/>
+        <a:srgbClr val="9BBB59"/>
       </a:accent3>
       <a:accent4>
-        <a:srgbClr val="8064a2"/>
+        <a:srgbClr val="8064A2"/>
       </a:accent4>
       <a:accent5>
-        <a:srgbClr val="4bacc6"/>
+        <a:srgbClr val="4BACC6"/>
       </a:accent5>
       <a:accent6>
-        <a:srgbClr val="f79646"/>
+        <a:srgbClr val="F79646"/>
       </a:accent6>
       <a:hlink>
-        <a:srgbClr val="0000ff"/>
+        <a:srgbClr val="0000FF"/>
       </a:hlink>
       <a:folHlink>
         <a:srgbClr val="800080"/>
@@ -3753,7 +3792,7 @@
         </a:gradFill>
       </a:fillStyleLst>
       <a:lnStyleLst>
-        <a:ln w="9525" cap="flat" cmpd="sng" algn="ctr">
+        <a:ln algn="ctr" cap="flat" cmpd="sng" w="9525">
           <a:solidFill>
             <a:schemeClr val="phClr">
               <a:shade val="95000"/>
@@ -3762,13 +3801,13 @@
           </a:solidFill>
           <a:prstDash val="solid"/>
         </a:ln>
-        <a:ln w="25400" cap="flat" cmpd="sng" algn="ctr">
+        <a:ln algn="ctr" cap="flat" cmpd="sng" w="25400">
           <a:solidFill>
             <a:schemeClr val="phClr"/>
           </a:solidFill>
           <a:prstDash val="solid"/>
         </a:ln>
-        <a:ln w="38100" cap="flat" cmpd="sng" algn="ctr">
+        <a:ln algn="ctr" cap="flat" cmpd="sng" w="38100">
           <a:solidFill>
             <a:schemeClr val="phClr"/>
           </a:solidFill>
@@ -3778,7 +3817,7 @@
       <a:effectStyleLst>
         <a:effectStyle>
           <a:effectLst>
-            <a:outerShdw blurRad="40000" dist="20000" dir="5400000" rotWithShape="0">
+            <a:outerShdw blurRad="40000" dir="5400000" dist="20000" rotWithShape="0">
               <a:srgbClr val="000000">
                 <a:alpha val="38000"/>
               </a:srgbClr>
@@ -3787,7 +3826,7 @@
         </a:effectStyle>
         <a:effectStyle>
           <a:effectLst>
-            <a:outerShdw blurRad="40000" dist="23000" dir="5400000" rotWithShape="0">
+            <a:outerShdw blurRad="40000" dir="5400000" dist="23000" rotWithShape="0">
               <a:srgbClr val="000000">
                 <a:alpha val="35000"/>
               </a:srgbClr>
@@ -3796,7 +3835,7 @@
         </a:effectStyle>
         <a:effectStyle>
           <a:effectLst>
-            <a:outerShdw blurRad="40000" dist="23000" dir="5400000" rotWithShape="0">
+            <a:outerShdw blurRad="40000" dir="5400000" dist="23000" rotWithShape="0">
               <a:srgbClr val="000000">
                 <a:alpha val="35000"/>
               </a:srgbClr>
@@ -3806,12 +3845,12 @@
             <a:camera prst="orthographicFront">
               <a:rot lat="0" lon="0" rev="0"/>
             </a:camera>
-            <a:lightRig rig="threePt" dir="t">
+            <a:lightRig dir="t" rig="threePt">
               <a:rot lat="0" lon="0" rev="1200000"/>
             </a:lightRig>
           </a:scene3d>
           <a:sp3d>
-            <a:bevelT w="63500" h="25400"/>
+            <a:bevelT h="25400" w="63500"/>
           </a:sp3d>
         </a:effectStyle>
       </a:effectStyleLst>
@@ -3842,7 +3881,7 @@
             </a:gs>
           </a:gsLst>
           <a:path path="circle">
-            <a:fillToRect l="50000" t="-80000" r="50000" b="180000"/>
+            <a:fillToRect b="180000" l="50000" r="50000" t="-80000"/>
           </a:path>
         </a:gradFill>
         <a:gradFill rotWithShape="1">
@@ -3861,7 +3900,7 @@
             </a:gs>
           </a:gsLst>
           <a:path path="circle">
-            <a:fillToRect l="50000" t="50000" r="50000" b="50000"/>
+            <a:fillToRect b="50000" l="50000" r="50000" t="50000"/>
           </a:path>
         </a:gradFill>
       </a:bgFillStyleLst>
@@ -3875,37 +3914,37 @@
   <a:themeElements>
     <a:clrScheme name="Office">
       <a:dk1>
-        <a:sysClr val="windowText" lastClr="000000"/>
+        <a:sysClr lastClr="000000" val="windowText"/>
       </a:dk1>
       <a:lt1>
-        <a:sysClr val="window" lastClr="FFFFFF"/>
+        <a:sysClr lastClr="FFFFFF" val="window"/>
       </a:lt1>
       <a:dk2>
-        <a:srgbClr val="1f497d"/>
+        <a:srgbClr val="1F497D"/>
       </a:dk2>
       <a:lt2>
-        <a:srgbClr val="eeece1"/>
+        <a:srgbClr val="EEECE1"/>
       </a:lt2>
       <a:accent1>
-        <a:srgbClr val="4f81bd"/>
+        <a:srgbClr val="4F81BD"/>
       </a:accent1>
       <a:accent2>
-        <a:srgbClr val="c0504d"/>
+        <a:srgbClr val="C0504D"/>
       </a:accent2>
       <a:accent3>
-        <a:srgbClr val="9bbb59"/>
+        <a:srgbClr val="9BBB59"/>
       </a:accent3>
       <a:accent4>
-        <a:srgbClr val="8064a2"/>
+        <a:srgbClr val="8064A2"/>
       </a:accent4>
       <a:accent5>
-        <a:srgbClr val="4bacc6"/>
+        <a:srgbClr val="4BACC6"/>
       </a:accent5>
       <a:accent6>
-        <a:srgbClr val="f79646"/>
+        <a:srgbClr val="F79646"/>
       </a:accent6>
       <a:hlink>
-        <a:srgbClr val="0000ff"/>
+        <a:srgbClr val="0000FF"/>
       </a:hlink>
       <a:folHlink>
         <a:srgbClr val="800080"/>
@@ -3976,7 +4015,7 @@
         </a:gradFill>
       </a:fillStyleLst>
       <a:lnStyleLst>
-        <a:ln w="9525" cap="flat" cmpd="sng" algn="ctr">
+        <a:ln algn="ctr" cap="flat" cmpd="sng" w="9525">
           <a:solidFill>
             <a:schemeClr val="phClr">
               <a:shade val="95000"/>
@@ -3985,13 +4024,13 @@
           </a:solidFill>
           <a:prstDash val="solid"/>
         </a:ln>
-        <a:ln w="25400" cap="flat" cmpd="sng" algn="ctr">
+        <a:ln algn="ctr" cap="flat" cmpd="sng" w="25400">
           <a:solidFill>
             <a:schemeClr val="phClr"/>
           </a:solidFill>
           <a:prstDash val="solid"/>
         </a:ln>
-        <a:ln w="38100" cap="flat" cmpd="sng" algn="ctr">
+        <a:ln algn="ctr" cap="flat" cmpd="sng" w="38100">
           <a:solidFill>
             <a:schemeClr val="phClr"/>
           </a:solidFill>
@@ -4001,7 +4040,7 @@
       <a:effectStyleLst>
         <a:effectStyle>
           <a:effectLst>
-            <a:outerShdw blurRad="40000" dist="20000" dir="5400000" rotWithShape="0">
+            <a:outerShdw blurRad="40000" dir="5400000" dist="20000" rotWithShape="0">
               <a:srgbClr val="000000">
                 <a:alpha val="38000"/>
               </a:srgbClr>
@@ -4010,7 +4049,7 @@
         </a:effectStyle>
         <a:effectStyle>
           <a:effectLst>
-            <a:outerShdw blurRad="40000" dist="23000" dir="5400000" rotWithShape="0">
+            <a:outerShdw blurRad="40000" dir="5400000" dist="23000" rotWithShape="0">
               <a:srgbClr val="000000">
                 <a:alpha val="35000"/>
               </a:srgbClr>
@@ -4019,7 +4058,7 @@
         </a:effectStyle>
         <a:effectStyle>
           <a:effectLst>
-            <a:outerShdw blurRad="40000" dist="23000" dir="5400000" rotWithShape="0">
+            <a:outerShdw blurRad="40000" dir="5400000" dist="23000" rotWithShape="0">
               <a:srgbClr val="000000">
                 <a:alpha val="35000"/>
               </a:srgbClr>
@@ -4029,12 +4068,12 @@
             <a:camera prst="orthographicFront">
               <a:rot lat="0" lon="0" rev="0"/>
             </a:camera>
-            <a:lightRig rig="threePt" dir="t">
+            <a:lightRig dir="t" rig="threePt">
               <a:rot lat="0" lon="0" rev="1200000"/>
             </a:lightRig>
           </a:scene3d>
           <a:sp3d>
-            <a:bevelT w="63500" h="25400"/>
+            <a:bevelT h="25400" w="63500"/>
           </a:sp3d>
         </a:effectStyle>
       </a:effectStyleLst>
@@ -4065,7 +4104,7 @@
             </a:gs>
           </a:gsLst>
           <a:path path="circle">
-            <a:fillToRect l="50000" t="-80000" r="50000" b="180000"/>
+            <a:fillToRect b="180000" l="50000" r="50000" t="-80000"/>
           </a:path>
         </a:gradFill>
         <a:gradFill rotWithShape="1">
@@ -4084,7 +4123,7 @@
             </a:gs>
           </a:gsLst>
           <a:path path="circle">
-            <a:fillToRect l="50000" t="50000" r="50000" b="50000"/>
+            <a:fillToRect b="50000" l="50000" r="50000" t="50000"/>
           </a:path>
         </a:gradFill>
       </a:bgFillStyleLst>

</xml_diff>